<commit_message>
notas añadidas a presentacion teorica
</commit_message>
<xml_diff>
--- a/02-languages/01-teoria/01 Introducción a Javascript.pptx
+++ b/02-languages/01-teoria/01 Introducción a Javascript.pptx
@@ -562,8 +562,1974 @@
           <a:lstStyle/>
           <a:p>
             <a:r>
+              <a:rPr lang="es-ES" b="0" dirty="0">
+                <a:solidFill>
+                  <a:srgbClr val="D4D4D4"/>
+                </a:solidFill>
+                <a:effectLst/>
+                <a:highlight>
+                  <a:srgbClr val="1E1E1E"/>
+                </a:highlight>
+                <a:latin typeface="Dank Mono Regular" panose="00000509000000000000" pitchFamily="50" charset="0"/>
+              </a:rPr>
+              <a:t>En los albores de internet, cuando los navegadores era poco más que visores de documentos de texto remotos, las páginas </a:t>
+            </a:r>
+            <a:r>
+              <a:rPr lang="es-ES" b="0" dirty="0" err="1">
+                <a:solidFill>
+                  <a:srgbClr val="D4D4D4"/>
+                </a:solidFill>
+                <a:effectLst/>
+                <a:highlight>
+                  <a:srgbClr val="1E1E1E"/>
+                </a:highlight>
+                <a:latin typeface="Dank Mono Regular" panose="00000509000000000000" pitchFamily="50" charset="0"/>
+              </a:rPr>
+              <a:t>consistian</a:t>
+            </a:r>
+            <a:r>
+              <a:rPr lang="es-ES" b="0" dirty="0">
+                <a:solidFill>
+                  <a:srgbClr val="D4D4D4"/>
+                </a:solidFill>
+                <a:effectLst/>
+                <a:highlight>
+                  <a:srgbClr val="1E1E1E"/>
+                </a:highlight>
+                <a:latin typeface="Dank Mono Regular" panose="00000509000000000000" pitchFamily="50" charset="0"/>
+              </a:rPr>
+              <a:t> fundamentalmente en:</a:t>
+            </a:r>
+          </a:p>
+          <a:p>
+            <a:endParaRPr lang="es-ES" b="0" dirty="0">
+              <a:solidFill>
+                <a:srgbClr val="D4D4D4"/>
+              </a:solidFill>
+              <a:effectLst/>
+              <a:highlight>
+                <a:srgbClr val="1E1E1E"/>
+              </a:highlight>
+              <a:latin typeface="Dank Mono Regular" panose="00000509000000000000" pitchFamily="50" charset="0"/>
+            </a:endParaRPr>
+          </a:p>
+          <a:p>
+            <a:pPr marL="171450" indent="-171450">
+              <a:buFont typeface="Arial" panose="020B0604020202020204" pitchFamily="34" charset="0"/>
+              <a:buChar char="•"/>
+            </a:pPr>
+            <a:r>
+              <a:rPr lang="es-ES" b="1" dirty="0">
+                <a:solidFill>
+                  <a:srgbClr val="569CD6"/>
+                </a:solidFill>
+                <a:effectLst/>
+                <a:highlight>
+                  <a:srgbClr val="1E1E1E"/>
+                </a:highlight>
+                <a:latin typeface="Dank Mono Regular" panose="00000509000000000000" pitchFamily="50" charset="0"/>
+              </a:rPr>
+              <a:t>Contenido</a:t>
+            </a:r>
+            <a:r>
+              <a:rPr lang="es-ES" b="0" dirty="0">
+                <a:solidFill>
+                  <a:srgbClr val="D4D4D4"/>
+                </a:solidFill>
+                <a:effectLst/>
+                <a:highlight>
+                  <a:srgbClr val="1E1E1E"/>
+                </a:highlight>
+                <a:latin typeface="Dank Mono Regular" panose="00000509000000000000" pitchFamily="50" charset="0"/>
+              </a:rPr>
+              <a:t>, que se estructuraba gracias al lenguaje de etiquetas </a:t>
+            </a:r>
+            <a:r>
+              <a:rPr lang="es-ES" b="0" dirty="0">
+                <a:solidFill>
+                  <a:srgbClr val="CE9178"/>
+                </a:solidFill>
+                <a:effectLst/>
+                <a:highlight>
+                  <a:srgbClr val="1E1E1E"/>
+                </a:highlight>
+                <a:latin typeface="Dank Mono Regular" panose="00000509000000000000" pitchFamily="50" charset="0"/>
+              </a:rPr>
+              <a:t>`HTML`</a:t>
+            </a:r>
+            <a:r>
+              <a:rPr lang="es-ES" b="0" dirty="0">
+                <a:solidFill>
+                  <a:srgbClr val="D4D4D4"/>
+                </a:solidFill>
+                <a:effectLst/>
+                <a:highlight>
+                  <a:srgbClr val="1E1E1E"/>
+                </a:highlight>
+                <a:latin typeface="Dank Mono Regular" panose="00000509000000000000" pitchFamily="50" charset="0"/>
+              </a:rPr>
+              <a:t>. Proporciona el "esqueleto" de nuestra página.</a:t>
+            </a:r>
+          </a:p>
+          <a:p>
+            <a:pPr marL="171450" indent="-171450">
+              <a:buFont typeface="Arial" panose="020B0604020202020204" pitchFamily="34" charset="0"/>
+              <a:buChar char="•"/>
+            </a:pPr>
+            <a:r>
+              <a:rPr lang="es-ES" b="1" dirty="0">
+                <a:solidFill>
+                  <a:srgbClr val="569CD6"/>
+                </a:solidFill>
+                <a:effectLst/>
+                <a:highlight>
+                  <a:srgbClr val="1E1E1E"/>
+                </a:highlight>
+                <a:latin typeface="Dank Mono Regular" panose="00000509000000000000" pitchFamily="50" charset="0"/>
+              </a:rPr>
+              <a:t>Estilo</a:t>
+            </a:r>
+            <a:r>
+              <a:rPr lang="es-ES" b="0" dirty="0">
+                <a:solidFill>
+                  <a:srgbClr val="D4D4D4"/>
+                </a:solidFill>
+                <a:effectLst/>
+                <a:highlight>
+                  <a:srgbClr val="1E1E1E"/>
+                </a:highlight>
+                <a:latin typeface="Dank Mono Regular" panose="00000509000000000000" pitchFamily="50" charset="0"/>
+              </a:rPr>
+              <a:t>. Para hacer visualmente más atractivos estos documentos, aparece un nuevo lenguaje llamado </a:t>
+            </a:r>
+            <a:r>
+              <a:rPr lang="es-ES" b="0" dirty="0">
+                <a:solidFill>
+                  <a:srgbClr val="CE9178"/>
+                </a:solidFill>
+                <a:effectLst/>
+                <a:highlight>
+                  <a:srgbClr val="1E1E1E"/>
+                </a:highlight>
+                <a:latin typeface="Dank Mono Regular" panose="00000509000000000000" pitchFamily="50" charset="0"/>
+              </a:rPr>
+              <a:t>`CSS`</a:t>
+            </a:r>
+            <a:r>
+              <a:rPr lang="es-ES" b="0" dirty="0">
+                <a:solidFill>
+                  <a:srgbClr val="D4D4D4"/>
+                </a:solidFill>
+                <a:effectLst/>
+                <a:highlight>
+                  <a:srgbClr val="1E1E1E"/>
+                </a:highlight>
+                <a:latin typeface="Dank Mono Regular" panose="00000509000000000000" pitchFamily="50" charset="0"/>
+              </a:rPr>
+              <a:t> que proporciona reglas de estilado que nos permiten adornar o enriquecer el formato de estos documentos: dar color, cambiar la fuente, tamaños, espaciados, etc.</a:t>
+            </a:r>
+          </a:p>
+          <a:p>
+            <a:br>
+              <a:rPr lang="es-ES" b="0" dirty="0">
+                <a:solidFill>
+                  <a:srgbClr val="D4D4D4"/>
+                </a:solidFill>
+                <a:effectLst/>
+                <a:highlight>
+                  <a:srgbClr val="1E1E1E"/>
+                </a:highlight>
+                <a:latin typeface="Dank Mono Regular" panose="00000509000000000000" pitchFamily="50" charset="0"/>
+              </a:rPr>
+            </a:br>
+            <a:r>
+              <a:rPr lang="es-ES" b="0" dirty="0">
+                <a:solidFill>
+                  <a:srgbClr val="D4D4D4"/>
+                </a:solidFill>
+                <a:effectLst/>
+                <a:highlight>
+                  <a:srgbClr val="1E1E1E"/>
+                </a:highlight>
+                <a:latin typeface="Dank Mono Regular" panose="00000509000000000000" pitchFamily="50" charset="0"/>
+              </a:rPr>
+              <a:t>Sin embargo, las páginas no dejaban de ser documentos estáticos con algunas pocas interacciones con el usuario, como </a:t>
+            </a:r>
+            <a:r>
+              <a:rPr lang="es-ES" b="0" dirty="0" err="1">
+                <a:solidFill>
+                  <a:srgbClr val="D4D4D4"/>
+                </a:solidFill>
+                <a:effectLst/>
+                <a:highlight>
+                  <a:srgbClr val="1E1E1E"/>
+                </a:highlight>
+                <a:latin typeface="Dank Mono Regular" panose="00000509000000000000" pitchFamily="50" charset="0"/>
+              </a:rPr>
+              <a:t>clickar</a:t>
+            </a:r>
+            <a:r>
+              <a:rPr lang="es-ES" b="0" dirty="0">
+                <a:solidFill>
+                  <a:srgbClr val="D4D4D4"/>
+                </a:solidFill>
+                <a:effectLst/>
+                <a:highlight>
+                  <a:srgbClr val="1E1E1E"/>
+                </a:highlight>
+                <a:latin typeface="Dank Mono Regular" panose="00000509000000000000" pitchFamily="50" charset="0"/>
+              </a:rPr>
+              <a:t> enlaces o pulsar botones. Faltaba un lenguaje de programación, integrado y ejecutado en el propio navegador, que convirtiese estos documentos en aplicaciones, es decir, que las dotase de </a:t>
+            </a:r>
+            <a:r>
+              <a:rPr lang="es-ES" b="1" dirty="0">
+                <a:solidFill>
+                  <a:srgbClr val="569CD6"/>
+                </a:solidFill>
+                <a:effectLst/>
+                <a:highlight>
+                  <a:srgbClr val="1E1E1E"/>
+                </a:highlight>
+                <a:latin typeface="Dank Mono Regular" panose="00000509000000000000" pitchFamily="50" charset="0"/>
+              </a:rPr>
+              <a:t>comportamiento</a:t>
+            </a:r>
+            <a:r>
+              <a:rPr lang="es-ES" b="0" dirty="0">
+                <a:solidFill>
+                  <a:srgbClr val="D4D4D4"/>
+                </a:solidFill>
+                <a:effectLst/>
+                <a:highlight>
+                  <a:srgbClr val="1E1E1E"/>
+                </a:highlight>
+                <a:latin typeface="Dank Mono Regular" panose="00000509000000000000" pitchFamily="50" charset="0"/>
+              </a:rPr>
+              <a:t>.</a:t>
+            </a:r>
+          </a:p>
+          <a:p>
+            <a:pPr marL="0" marR="0" lvl="0" indent="0" defTabSz="914400" eaLnBrk="1" fontAlgn="auto" latinLnBrk="0" hangingPunct="1">
+              <a:lnSpc>
+                <a:spcPct val="100000"/>
+              </a:lnSpc>
+              <a:spcBef>
+                <a:spcPts val="0"/>
+              </a:spcBef>
+              <a:spcAft>
+                <a:spcPts val="0"/>
+              </a:spcAft>
+              <a:buClrTx/>
+              <a:buSzTx/>
+              <a:buFontTx/>
+              <a:buNone/>
+              <a:tabLst/>
+              <a:defRPr/>
+            </a:pPr>
+            <a:br>
               <a:rPr lang="es-ES" dirty="0"/>
-              <a:t>En resumen:</a:t>
+            </a:br>
+            <a:r>
+              <a:rPr lang="es-ES" b="0" dirty="0">
+                <a:solidFill>
+                  <a:srgbClr val="D4D4D4"/>
+                </a:solidFill>
+                <a:effectLst/>
+                <a:highlight>
+                  <a:srgbClr val="1E1E1E"/>
+                </a:highlight>
+                <a:latin typeface="Dank Mono Regular" panose="00000509000000000000" pitchFamily="50" charset="0"/>
+              </a:rPr>
+              <a:t>Y aquí es donde entró en juego </a:t>
+            </a:r>
+            <a:r>
+              <a:rPr lang="es-ES" b="1" dirty="0">
+                <a:solidFill>
+                  <a:srgbClr val="D4D4D4"/>
+                </a:solidFill>
+                <a:effectLst/>
+                <a:highlight>
+                  <a:srgbClr val="1E1E1E"/>
+                </a:highlight>
+                <a:latin typeface="Dank Mono Regular" panose="00000509000000000000" pitchFamily="50" charset="0"/>
+              </a:rPr>
+              <a:t>JavaScript</a:t>
+            </a:r>
+            <a:r>
+              <a:rPr lang="es-ES" b="0" dirty="0">
+                <a:solidFill>
+                  <a:srgbClr val="D4D4D4"/>
+                </a:solidFill>
+                <a:effectLst/>
+                <a:highlight>
+                  <a:srgbClr val="1E1E1E"/>
+                </a:highlight>
+                <a:latin typeface="Dank Mono Regular" panose="00000509000000000000" pitchFamily="50" charset="0"/>
+              </a:rPr>
+              <a:t>. JavaScript nació como un lenguaje específicamente diseñado para enriquecer páginas o aplicaciones web, de </a:t>
+            </a:r>
+            <a:r>
+              <a:rPr lang="es-ES" b="0" dirty="0" err="1">
+                <a:solidFill>
+                  <a:srgbClr val="D4D4D4"/>
+                </a:solidFill>
+                <a:effectLst/>
+                <a:highlight>
+                  <a:srgbClr val="1E1E1E"/>
+                </a:highlight>
+                <a:latin typeface="Dank Mono Regular" panose="00000509000000000000" pitchFamily="50" charset="0"/>
+              </a:rPr>
+              <a:t>ahi</a:t>
+            </a:r>
+            <a:r>
+              <a:rPr lang="es-ES" b="0" dirty="0">
+                <a:solidFill>
+                  <a:srgbClr val="D4D4D4"/>
+                </a:solidFill>
+                <a:effectLst/>
+                <a:highlight>
+                  <a:srgbClr val="1E1E1E"/>
+                </a:highlight>
+                <a:latin typeface="Dank Mono Regular" panose="00000509000000000000" pitchFamily="50" charset="0"/>
+              </a:rPr>
+              <a:t> que esté estrechamente vinculado al </a:t>
+            </a:r>
+            <a:r>
+              <a:rPr lang="es-ES" b="0" dirty="0" err="1">
+                <a:solidFill>
+                  <a:srgbClr val="D4D4D4"/>
+                </a:solidFill>
+                <a:effectLst/>
+                <a:highlight>
+                  <a:srgbClr val="1E1E1E"/>
+                </a:highlight>
+                <a:latin typeface="Dank Mono Regular" panose="00000509000000000000" pitchFamily="50" charset="0"/>
+              </a:rPr>
+              <a:t>frontend</a:t>
+            </a:r>
+            <a:r>
+              <a:rPr lang="es-ES" b="0" dirty="0">
+                <a:solidFill>
+                  <a:srgbClr val="D4D4D4"/>
+                </a:solidFill>
+                <a:effectLst/>
+                <a:highlight>
+                  <a:srgbClr val="1E1E1E"/>
+                </a:highlight>
+                <a:latin typeface="Dank Mono Regular" panose="00000509000000000000" pitchFamily="50" charset="0"/>
+              </a:rPr>
+              <a:t>. Tal fue su éxito que a </a:t>
+            </a:r>
+            <a:r>
+              <a:rPr lang="es-ES" b="0" dirty="0" err="1">
+                <a:solidFill>
+                  <a:srgbClr val="D4D4D4"/>
+                </a:solidFill>
+                <a:effectLst/>
+                <a:highlight>
+                  <a:srgbClr val="1E1E1E"/>
+                </a:highlight>
+                <a:latin typeface="Dank Mono Regular" panose="00000509000000000000" pitchFamily="50" charset="0"/>
+              </a:rPr>
+              <a:t>dia</a:t>
+            </a:r>
+            <a:r>
+              <a:rPr lang="es-ES" b="0" dirty="0">
+                <a:solidFill>
+                  <a:srgbClr val="D4D4D4"/>
+                </a:solidFill>
+                <a:effectLst/>
+                <a:highlight>
+                  <a:srgbClr val="1E1E1E"/>
+                </a:highlight>
+                <a:latin typeface="Dank Mono Regular" panose="00000509000000000000" pitchFamily="50" charset="0"/>
+              </a:rPr>
+              <a:t> de hoy se ha convertido, </a:t>
+            </a:r>
+            <a:r>
+              <a:rPr lang="es-ES" b="0" i="1" dirty="0">
+                <a:solidFill>
+                  <a:srgbClr val="D4D4D4"/>
+                </a:solidFill>
+                <a:effectLst/>
+                <a:highlight>
+                  <a:srgbClr val="1E1E1E"/>
+                </a:highlight>
+                <a:latin typeface="Dank Mono Regular" panose="00000509000000000000" pitchFamily="50" charset="0"/>
+              </a:rPr>
+              <a:t>_de facto_</a:t>
+            </a:r>
+            <a:r>
+              <a:rPr lang="es-ES" b="0" dirty="0">
+                <a:solidFill>
+                  <a:srgbClr val="D4D4D4"/>
+                </a:solidFill>
+                <a:effectLst/>
+                <a:highlight>
+                  <a:srgbClr val="1E1E1E"/>
+                </a:highlight>
+                <a:latin typeface="Dank Mono Regular" panose="00000509000000000000" pitchFamily="50" charset="0"/>
+              </a:rPr>
+              <a:t>, en el lenguaje de la web, y podemos encontrarlo integrado en todo tipo de dispositivos conectados.</a:t>
+            </a:r>
+            <a:br>
+              <a:rPr lang="es-ES" b="0" dirty="0">
+                <a:solidFill>
+                  <a:srgbClr val="D4D4D4"/>
+                </a:solidFill>
+                <a:effectLst/>
+                <a:highlight>
+                  <a:srgbClr val="1E1E1E"/>
+                </a:highlight>
+                <a:latin typeface="Dank Mono Regular" panose="00000509000000000000" pitchFamily="50" charset="0"/>
+              </a:rPr>
+            </a:br>
+            <a:br>
+              <a:rPr lang="es-ES" b="0" dirty="0">
+                <a:solidFill>
+                  <a:srgbClr val="D4D4D4"/>
+                </a:solidFill>
+                <a:effectLst/>
+                <a:highlight>
+                  <a:srgbClr val="1E1E1E"/>
+                </a:highlight>
+                <a:latin typeface="Dank Mono Regular" panose="00000509000000000000" pitchFamily="50" charset="0"/>
+              </a:rPr>
+            </a:br>
+            <a:r>
+              <a:rPr lang="es-ES" b="0" dirty="0">
+                <a:solidFill>
+                  <a:srgbClr val="D4D4D4"/>
+                </a:solidFill>
+                <a:effectLst/>
+                <a:highlight>
+                  <a:srgbClr val="1E1E1E"/>
+                </a:highlight>
+                <a:latin typeface="Dank Mono Regular" panose="00000509000000000000" pitchFamily="50" charset="0"/>
+              </a:rPr>
+              <a:t>NOTA: En esta </a:t>
+            </a:r>
+            <a:r>
+              <a:rPr lang="es-ES" b="0" dirty="0" err="1">
+                <a:solidFill>
+                  <a:srgbClr val="D4D4D4"/>
+                </a:solidFill>
+                <a:effectLst/>
+                <a:highlight>
+                  <a:srgbClr val="1E1E1E"/>
+                </a:highlight>
+                <a:latin typeface="Dank Mono Regular" panose="00000509000000000000" pitchFamily="50" charset="0"/>
+              </a:rPr>
+              <a:t>slide</a:t>
+            </a:r>
+            <a:r>
+              <a:rPr lang="es-ES" b="0" dirty="0">
+                <a:solidFill>
+                  <a:srgbClr val="D4D4D4"/>
+                </a:solidFill>
+                <a:effectLst/>
+                <a:highlight>
+                  <a:srgbClr val="1E1E1E"/>
+                </a:highlight>
+                <a:latin typeface="Dank Mono Regular" panose="00000509000000000000" pitchFamily="50" charset="0"/>
+              </a:rPr>
+              <a:t> hemos representado la “receta” de la web con sus 3 ingredientes fundamentales. Sin embargo, los hemos pintado de forma proporcional o equitativa: con el mismo tamaño. Esto pudo ser así durante el nacimiento de JS puesto que su misión era apoyar a los otros 2 lenguajes añadiendo capacidades ligeras de scriptings, es decir, permitiendo ejecutar pequeños trozos de código puntualmente para hacer laguna que otra tarea. La realidad es que a medida que maduraban las aplicaciones, lo hacían gracias al enorme crecimiento de JavaScript con respecto a los otros 2. JS ha tomando un gran peso e impacto a la hora de confeccionar aplicaciones web en la actualidad.</a:t>
+            </a:r>
+            <a:endParaRPr lang="es-ES" dirty="0"/>
+          </a:p>
+        </p:txBody>
+      </p:sp>
+    </p:spTree>
+    <p:extLst>
+      <p:ext uri="{BB962C8B-B14F-4D97-AF65-F5344CB8AC3E}">
+        <p14:creationId xmlns:p14="http://schemas.microsoft.com/office/powerpoint/2010/main" val="891860792"/>
+      </p:ext>
+    </p:extLst>
+  </p:cSld>
+  <p:clrMapOvr>
+    <a:masterClrMapping/>
+  </p:clrMapOvr>
+</p:notes>
+</file>
+
+<file path=ppt/notesSlides/notesSlide2.xml><?xml version="1.0" encoding="utf-8"?>
+<p:notes xmlns:a="http://schemas.openxmlformats.org/drawingml/2006/main" xmlns:r="http://schemas.openxmlformats.org/officeDocument/2006/relationships" xmlns:p="http://schemas.openxmlformats.org/presentationml/2006/main">
+  <p:cSld>
+    <p:spTree>
+      <p:nvGrpSpPr>
+        <p:cNvPr id="1" name=""/>
+        <p:cNvGrpSpPr/>
+        <p:nvPr/>
+      </p:nvGrpSpPr>
+      <p:grpSpPr>
+        <a:xfrm>
+          <a:off x="0" y="0"/>
+          <a:ext cx="0" cy="0"/>
+          <a:chOff x="0" y="0"/>
+          <a:chExt cx="0" cy="0"/>
+        </a:xfrm>
+      </p:grpSpPr>
+      <p:sp>
+        <p:nvSpPr>
+          <p:cNvPr id="2" name="Marcador de imagen de diapositiva 1"/>
+          <p:cNvSpPr>
+            <a:spLocks noGrp="1" noRot="1" noChangeAspect="1"/>
+          </p:cNvSpPr>
+          <p:nvPr>
+            <p:ph type="sldImg"/>
+          </p:nvPr>
+        </p:nvSpPr>
+        <p:spPr>
+          <a:xfrm>
+            <a:off x="381000" y="685800"/>
+            <a:ext cx="6096000" cy="3429000"/>
+          </a:xfrm>
+        </p:spPr>
+      </p:sp>
+      <p:sp>
+        <p:nvSpPr>
+          <p:cNvPr id="3" name="Marcador de notas 2"/>
+          <p:cNvSpPr>
+            <a:spLocks noGrp="1"/>
+          </p:cNvSpPr>
+          <p:nvPr>
+            <p:ph type="body" idx="1"/>
+          </p:nvPr>
+        </p:nvSpPr>
+        <p:spPr/>
+        <p:txBody>
+          <a:bodyPr/>
+          <a:lstStyle/>
+          <a:p>
+            <a:r>
+              <a:rPr lang="es-ES" dirty="0"/>
+              <a:t>Si atendemos al peso real que tiene cada ingrediente en la actualidad, la foto cambiaría significativamente.</a:t>
+            </a:r>
+            <a:br>
+              <a:rPr lang="es-ES" dirty="0"/>
+            </a:br>
+            <a:br>
+              <a:rPr lang="es-ES" dirty="0"/>
+            </a:br>
+            <a:r>
+              <a:rPr lang="es-ES" dirty="0"/>
+              <a:t>JavaScript, que originalmente vino a cubrir la necesidad de un lenguaje de propósito general para las tareas mas comunes de la web, se ha convertido en el protagonista. Tanto es así, que los </a:t>
+            </a:r>
+            <a:r>
+              <a:rPr lang="es-ES" dirty="0" err="1"/>
+              <a:t>frameworks</a:t>
+            </a:r>
+            <a:r>
+              <a:rPr lang="es-ES" dirty="0"/>
+              <a:t> modernos (basados en JS) para la construcción de aplicaciones web permiten la generación dinámica de contenido (HTML) y estilo (CSS) desde el propio lenguaje JS. Esto es, no necesitamos recurrir a la forma clásica de hacer aplicaciones con páginas físicas (HTML + CSS) reales que una vez cargadas en el Navegador se traducen al DOM (modelo en memoria que representa el documento visible), sino que dicho documento será generado dinámicamente desde el lenguaje JS una vez se ejecute nuestra aplicación, inyectando nodos al DOM y sus reglas de estilo. Es posible hacerlo gracias a la incorporación de sintaxis que permiten simular HTML desde JS (JSX) o reglas de estilo desde JS (</a:t>
+            </a:r>
+            <a:r>
+              <a:rPr lang="es-ES" dirty="0" err="1"/>
+              <a:t>css</a:t>
+            </a:r>
+            <a:r>
+              <a:rPr lang="es-ES" dirty="0"/>
+              <a:t>-</a:t>
+            </a:r>
+            <a:r>
+              <a:rPr lang="es-ES" dirty="0" err="1"/>
+              <a:t>in-js</a:t>
+            </a:r>
+            <a:r>
+              <a:rPr lang="es-ES" dirty="0"/>
+              <a:t>).</a:t>
+            </a:r>
+          </a:p>
+          <a:p>
+            <a:br>
+              <a:rPr lang="es-ES" dirty="0"/>
+            </a:br>
+            <a:r>
+              <a:rPr lang="es-ES" dirty="0"/>
+              <a:t>Se puede decir que JS le ha robado protagonismo a los otros 2 ingredientes, ahora más que nunca.</a:t>
+            </a:r>
+          </a:p>
+        </p:txBody>
+      </p:sp>
+    </p:spTree>
+    <p:extLst>
+      <p:ext uri="{BB962C8B-B14F-4D97-AF65-F5344CB8AC3E}">
+        <p14:creationId xmlns:p14="http://schemas.microsoft.com/office/powerpoint/2010/main" val="4064694548"/>
+      </p:ext>
+    </p:extLst>
+  </p:cSld>
+  <p:clrMapOvr>
+    <a:masterClrMapping/>
+  </p:clrMapOvr>
+</p:notes>
+</file>
+
+<file path=ppt/notesSlides/notesSlide3.xml><?xml version="1.0" encoding="utf-8"?>
+<p:notes xmlns:a="http://schemas.openxmlformats.org/drawingml/2006/main" xmlns:r="http://schemas.openxmlformats.org/officeDocument/2006/relationships" xmlns:p="http://schemas.openxmlformats.org/presentationml/2006/main">
+  <p:cSld>
+    <p:spTree>
+      <p:nvGrpSpPr>
+        <p:cNvPr id="1" name=""/>
+        <p:cNvGrpSpPr/>
+        <p:nvPr/>
+      </p:nvGrpSpPr>
+      <p:grpSpPr>
+        <a:xfrm>
+          <a:off x="0" y="0"/>
+          <a:ext cx="0" cy="0"/>
+          <a:chOff x="0" y="0"/>
+          <a:chExt cx="0" cy="0"/>
+        </a:xfrm>
+      </p:grpSpPr>
+      <p:sp>
+        <p:nvSpPr>
+          <p:cNvPr id="2" name="Marcador de imagen de diapositiva 1"/>
+          <p:cNvSpPr>
+            <a:spLocks noGrp="1" noRot="1" noChangeAspect="1"/>
+          </p:cNvSpPr>
+          <p:nvPr>
+            <p:ph type="sldImg"/>
+          </p:nvPr>
+        </p:nvSpPr>
+        <p:spPr>
+          <a:xfrm>
+            <a:off x="381000" y="685800"/>
+            <a:ext cx="6096000" cy="3429000"/>
+          </a:xfrm>
+        </p:spPr>
+      </p:sp>
+      <p:sp>
+        <p:nvSpPr>
+          <p:cNvPr id="3" name="Marcador de notas 2"/>
+          <p:cNvSpPr>
+            <a:spLocks noGrp="1"/>
+          </p:cNvSpPr>
+          <p:nvPr>
+            <p:ph type="body" idx="1"/>
+          </p:nvPr>
+        </p:nvSpPr>
+        <p:spPr/>
+        <p:txBody>
+          <a:bodyPr/>
+          <a:lstStyle/>
+          <a:p>
+            <a:r>
+              <a:rPr lang="es-ES" b="0" dirty="0">
+                <a:solidFill>
+                  <a:srgbClr val="D4D4D4"/>
+                </a:solidFill>
+                <a:effectLst/>
+                <a:highlight>
+                  <a:srgbClr val="1E1E1E"/>
+                </a:highlight>
+                <a:latin typeface="Dank Mono Regular" panose="00000509000000000000" pitchFamily="50" charset="0"/>
+              </a:rPr>
+              <a:t>- En los comienzos de internet, </a:t>
+            </a:r>
+            <a:r>
+              <a:rPr lang="es-ES" b="1" dirty="0">
+                <a:solidFill>
+                  <a:srgbClr val="569CD6"/>
+                </a:solidFill>
+                <a:effectLst/>
+                <a:highlight>
+                  <a:srgbClr val="1E1E1E"/>
+                </a:highlight>
+                <a:latin typeface="Dank Mono Regular" panose="00000509000000000000" pitchFamily="50" charset="0"/>
+              </a:rPr>
+              <a:t>Netscape</a:t>
+            </a:r>
+            <a:r>
+              <a:rPr lang="es-ES" b="0" dirty="0">
+                <a:solidFill>
+                  <a:srgbClr val="D4D4D4"/>
+                </a:solidFill>
+                <a:effectLst/>
+                <a:highlight>
+                  <a:srgbClr val="1E1E1E"/>
+                </a:highlight>
+                <a:latin typeface="Dank Mono Regular" panose="00000509000000000000" pitchFamily="50" charset="0"/>
+              </a:rPr>
+              <a:t> aliado con </a:t>
+            </a:r>
+            <a:r>
+              <a:rPr lang="es-ES" b="1" dirty="0" err="1">
+                <a:solidFill>
+                  <a:srgbClr val="569CD6"/>
+                </a:solidFill>
+                <a:effectLst/>
+                <a:highlight>
+                  <a:srgbClr val="1E1E1E"/>
+                </a:highlight>
+                <a:latin typeface="Dank Mono Regular" panose="00000509000000000000" pitchFamily="50" charset="0"/>
+              </a:rPr>
+              <a:t>Sun</a:t>
+            </a:r>
+            <a:r>
+              <a:rPr lang="es-ES" b="1" dirty="0">
+                <a:solidFill>
+                  <a:srgbClr val="569CD6"/>
+                </a:solidFill>
+                <a:effectLst/>
+                <a:highlight>
+                  <a:srgbClr val="1E1E1E"/>
+                </a:highlight>
+                <a:latin typeface="Dank Mono Regular" panose="00000509000000000000" pitchFamily="50" charset="0"/>
+              </a:rPr>
+              <a:t> Microsystems</a:t>
+            </a:r>
+            <a:r>
+              <a:rPr lang="es-ES" b="0" dirty="0">
+                <a:solidFill>
+                  <a:srgbClr val="D4D4D4"/>
+                </a:solidFill>
+                <a:effectLst/>
+                <a:highlight>
+                  <a:srgbClr val="1E1E1E"/>
+                </a:highlight>
+                <a:latin typeface="Dank Mono Regular" panose="00000509000000000000" pitchFamily="50" charset="0"/>
+              </a:rPr>
+              <a:t> competían con </a:t>
+            </a:r>
+            <a:r>
+              <a:rPr lang="es-ES" b="1" dirty="0">
+                <a:solidFill>
+                  <a:srgbClr val="569CD6"/>
+                </a:solidFill>
+                <a:effectLst/>
+                <a:highlight>
+                  <a:srgbClr val="1E1E1E"/>
+                </a:highlight>
+                <a:latin typeface="Dank Mono Regular" panose="00000509000000000000" pitchFamily="50" charset="0"/>
+              </a:rPr>
+              <a:t>Microsoft</a:t>
+            </a:r>
+            <a:r>
+              <a:rPr lang="es-ES" b="0" dirty="0">
+                <a:solidFill>
+                  <a:srgbClr val="D4D4D4"/>
+                </a:solidFill>
+                <a:effectLst/>
+                <a:highlight>
+                  <a:srgbClr val="1E1E1E"/>
+                </a:highlight>
+                <a:latin typeface="Dank Mono Regular" panose="00000509000000000000" pitchFamily="50" charset="0"/>
+              </a:rPr>
+              <a:t> en tecnologías web.</a:t>
+            </a:r>
+          </a:p>
+          <a:p>
+            <a:r>
+              <a:rPr lang="es-ES" b="0" dirty="0">
+                <a:solidFill>
+                  <a:srgbClr val="D4D4D4"/>
+                </a:solidFill>
+                <a:effectLst/>
+                <a:highlight>
+                  <a:srgbClr val="1E1E1E"/>
+                </a:highlight>
+                <a:latin typeface="Dank Mono Regular" panose="00000509000000000000" pitchFamily="50" charset="0"/>
+              </a:rPr>
+              <a:t>- Se necesitaba un lenguaje de scripting ligero para dotar de comportamiento a las páginas web, hasta ahora simples documentos de texto, y convertirlas en aplicaciones ricas, completas, capaces de resolver problemas de propósito general. Quedaros con la palabra “script” que estaba de moda en aquella época, pues daba la sensación de potencia y ligereza a la vez.</a:t>
+            </a:r>
+          </a:p>
+          <a:p>
+            <a:r>
+              <a:rPr lang="es-ES" b="0" dirty="0">
+                <a:solidFill>
+                  <a:srgbClr val="D4D4D4"/>
+                </a:solidFill>
+                <a:effectLst/>
+                <a:highlight>
+                  <a:srgbClr val="1E1E1E"/>
+                </a:highlight>
+                <a:latin typeface="Dank Mono Regular" panose="00000509000000000000" pitchFamily="50" charset="0"/>
+              </a:rPr>
+              <a:t>- También estaba de moda Java, era el rey de la escena, pero se desechó la idea de utilizarlo. </a:t>
+            </a:r>
+            <a:r>
+              <a:rPr lang="es-ES" b="1" dirty="0">
+                <a:solidFill>
+                  <a:srgbClr val="569CD6"/>
+                </a:solidFill>
+                <a:effectLst/>
+                <a:highlight>
+                  <a:srgbClr val="1E1E1E"/>
+                </a:highlight>
+                <a:latin typeface="Dank Mono Regular" panose="00000509000000000000" pitchFamily="50" charset="0"/>
+              </a:rPr>
+              <a:t>Brendan </a:t>
+            </a:r>
+            <a:r>
+              <a:rPr lang="es-ES" b="1" dirty="0" err="1">
+                <a:solidFill>
+                  <a:srgbClr val="569CD6"/>
+                </a:solidFill>
+                <a:effectLst/>
+                <a:highlight>
+                  <a:srgbClr val="1E1E1E"/>
+                </a:highlight>
+                <a:latin typeface="Dank Mono Regular" panose="00000509000000000000" pitchFamily="50" charset="0"/>
+              </a:rPr>
+              <a:t>Eich</a:t>
+            </a:r>
+            <a:r>
+              <a:rPr lang="es-ES" b="0" dirty="0">
+                <a:solidFill>
+                  <a:srgbClr val="D4D4D4"/>
+                </a:solidFill>
+                <a:effectLst/>
+                <a:highlight>
+                  <a:srgbClr val="1E1E1E"/>
+                </a:highlight>
+                <a:latin typeface="Dank Mono Regular" panose="00000509000000000000" pitchFamily="50" charset="0"/>
+              </a:rPr>
+              <a:t> fue contratado para desarrollar el prototipo de este lenguaje, para lo que tardó </a:t>
+            </a:r>
+            <a:r>
+              <a:rPr lang="es-ES" b="1" dirty="0">
+                <a:solidFill>
+                  <a:srgbClr val="569CD6"/>
+                </a:solidFill>
+                <a:effectLst/>
+                <a:highlight>
+                  <a:srgbClr val="1E1E1E"/>
+                </a:highlight>
+                <a:latin typeface="Dank Mono Regular" panose="00000509000000000000" pitchFamily="50" charset="0"/>
+              </a:rPr>
+              <a:t>10 días</a:t>
+            </a:r>
+            <a:r>
+              <a:rPr lang="es-ES" b="0" dirty="0">
+                <a:solidFill>
+                  <a:srgbClr val="D4D4D4"/>
+                </a:solidFill>
+                <a:effectLst/>
+                <a:highlight>
+                  <a:srgbClr val="1E1E1E"/>
+                </a:highlight>
+                <a:latin typeface="Dank Mono Regular" panose="00000509000000000000" pitchFamily="50" charset="0"/>
+              </a:rPr>
+              <a:t>. Era 1995.</a:t>
+            </a:r>
+          </a:p>
+          <a:p>
+            <a:r>
+              <a:rPr lang="es-ES" b="0" dirty="0">
+                <a:solidFill>
+                  <a:srgbClr val="D4D4D4"/>
+                </a:solidFill>
+                <a:effectLst/>
+                <a:highlight>
+                  <a:srgbClr val="1E1E1E"/>
+                </a:highlight>
+                <a:latin typeface="Dank Mono Regular" panose="00000509000000000000" pitchFamily="50" charset="0"/>
+              </a:rPr>
+              <a:t>- Como casi siempre ocurre con los prototipos, se convirtió mágicamente en producto final por falta de tiempo para probarlo y experimentar con el.</a:t>
+            </a:r>
+          </a:p>
+          <a:p>
+            <a:r>
+              <a:rPr lang="es-ES" b="0" dirty="0">
+                <a:solidFill>
+                  <a:srgbClr val="D4D4D4"/>
+                </a:solidFill>
+                <a:effectLst/>
+                <a:highlight>
+                  <a:srgbClr val="1E1E1E"/>
+                </a:highlight>
+                <a:latin typeface="Dank Mono Regular" panose="00000509000000000000" pitchFamily="50" charset="0"/>
+              </a:rPr>
+              <a:t>- Su nombre en clave era </a:t>
+            </a:r>
+            <a:r>
+              <a:rPr lang="es-ES" b="0" i="1" dirty="0">
+                <a:solidFill>
+                  <a:srgbClr val="D4D4D4"/>
+                </a:solidFill>
+                <a:effectLst/>
+                <a:highlight>
+                  <a:srgbClr val="1E1E1E"/>
+                </a:highlight>
+                <a:latin typeface="Dank Mono Regular" panose="00000509000000000000" pitchFamily="50" charset="0"/>
+              </a:rPr>
+              <a:t>Mocha</a:t>
+            </a:r>
+            <a:r>
+              <a:rPr lang="es-ES" b="0" dirty="0">
+                <a:solidFill>
+                  <a:srgbClr val="D4D4D4"/>
+                </a:solidFill>
+                <a:effectLst/>
+                <a:highlight>
+                  <a:srgbClr val="1E1E1E"/>
+                </a:highlight>
+                <a:latin typeface="Dank Mono Regular" panose="00000509000000000000" pitchFamily="50" charset="0"/>
+              </a:rPr>
+              <a:t>, mientras que oficialmente se le bautizó como </a:t>
+            </a:r>
+            <a:r>
+              <a:rPr lang="es-ES" b="0" i="1" dirty="0" err="1">
+                <a:solidFill>
+                  <a:srgbClr val="D4D4D4"/>
+                </a:solidFill>
+                <a:effectLst/>
+                <a:highlight>
+                  <a:srgbClr val="1E1E1E"/>
+                </a:highlight>
+                <a:latin typeface="Dank Mono Regular" panose="00000509000000000000" pitchFamily="50" charset="0"/>
+              </a:rPr>
+              <a:t>LiveScript</a:t>
+            </a:r>
+            <a:r>
+              <a:rPr lang="es-ES" b="0" dirty="0">
+                <a:solidFill>
+                  <a:srgbClr val="D4D4D4"/>
+                </a:solidFill>
+                <a:effectLst/>
+                <a:highlight>
+                  <a:srgbClr val="1E1E1E"/>
+                </a:highlight>
+                <a:latin typeface="Dank Mono Regular" panose="00000509000000000000" pitchFamily="50" charset="0"/>
+              </a:rPr>
+              <a:t>. Pero poco más tarde, por ganar tracción con al popularidad de Java, se le rebautizó como </a:t>
+            </a:r>
+            <a:r>
+              <a:rPr lang="es-ES" b="1" dirty="0">
+                <a:solidFill>
+                  <a:srgbClr val="569CD6"/>
+                </a:solidFill>
+                <a:effectLst/>
+                <a:highlight>
+                  <a:srgbClr val="1E1E1E"/>
+                </a:highlight>
+                <a:latin typeface="Dank Mono Regular" panose="00000509000000000000" pitchFamily="50" charset="0"/>
+              </a:rPr>
+              <a:t>JavaScript</a:t>
+            </a:r>
+            <a:r>
+              <a:rPr lang="es-ES" b="0" dirty="0">
+                <a:solidFill>
+                  <a:srgbClr val="D4D4D4"/>
+                </a:solidFill>
+                <a:effectLst/>
+                <a:highlight>
+                  <a:srgbClr val="1E1E1E"/>
+                </a:highlight>
+                <a:latin typeface="Dank Mono Regular" panose="00000509000000000000" pitchFamily="50" charset="0"/>
+              </a:rPr>
+              <a:t>. Si bien su sintaxis se parece a la de Java (que a su vez se inspira en C) no tiene nada que ver con este lenguaje.</a:t>
+            </a:r>
+          </a:p>
+          <a:p>
+            <a:pPr marL="0" marR="0" lvl="0" indent="0" defTabSz="914400" eaLnBrk="1" fontAlgn="auto" latinLnBrk="0" hangingPunct="1">
+              <a:lnSpc>
+                <a:spcPct val="100000"/>
+              </a:lnSpc>
+              <a:spcBef>
+                <a:spcPts val="0"/>
+              </a:spcBef>
+              <a:spcAft>
+                <a:spcPts val="0"/>
+              </a:spcAft>
+              <a:buClrTx/>
+              <a:buSzTx/>
+              <a:buFontTx/>
+              <a:buNone/>
+              <a:tabLst/>
+              <a:defRPr/>
+            </a:pPr>
+            <a:r>
+              <a:rPr lang="es-ES" b="0" dirty="0">
+                <a:solidFill>
+                  <a:srgbClr val="D4D4D4"/>
+                </a:solidFill>
+                <a:effectLst/>
+                <a:highlight>
+                  <a:srgbClr val="1E1E1E"/>
+                </a:highlight>
+                <a:latin typeface="Dank Mono Regular" panose="00000509000000000000" pitchFamily="50" charset="0"/>
+              </a:rPr>
+              <a:t>- En 1996 su máximo competidor, Microsoft, decide unirse al enemigo y acaba adoptándolo, marcando así el comienzo de la gran popularidad de este lenguaje que finalmente fue estandarizado en 1997 por la organización ECMA International con el nombre técnico de </a:t>
+            </a:r>
+            <a:r>
+              <a:rPr lang="es-ES" b="1" dirty="0">
+                <a:solidFill>
+                  <a:srgbClr val="569CD6"/>
+                </a:solidFill>
+                <a:effectLst/>
+                <a:highlight>
+                  <a:srgbClr val="1E1E1E"/>
+                </a:highlight>
+                <a:latin typeface="Dank Mono Regular" panose="00000509000000000000" pitchFamily="50" charset="0"/>
+              </a:rPr>
+              <a:t>ECMAScript</a:t>
+            </a:r>
+            <a:r>
+              <a:rPr lang="es-ES" b="0" dirty="0">
+                <a:solidFill>
+                  <a:srgbClr val="D4D4D4"/>
+                </a:solidFill>
+                <a:effectLst/>
+                <a:highlight>
+                  <a:srgbClr val="1E1E1E"/>
+                </a:highlight>
+                <a:latin typeface="Dank Mono Regular" panose="00000509000000000000" pitchFamily="50" charset="0"/>
+              </a:rPr>
+              <a:t>. (ECMA = </a:t>
+            </a:r>
+            <a:r>
+              <a:rPr lang="es-ES" b="0" dirty="0" err="1">
+                <a:solidFill>
+                  <a:srgbClr val="D4D4D4"/>
+                </a:solidFill>
+                <a:effectLst/>
+                <a:highlight>
+                  <a:srgbClr val="1E1E1E"/>
+                </a:highlight>
+                <a:latin typeface="Dank Mono Regular" panose="00000509000000000000" pitchFamily="50" charset="0"/>
+              </a:rPr>
+              <a:t>European</a:t>
+            </a:r>
+            <a:r>
+              <a:rPr lang="es-ES" b="0" dirty="0">
+                <a:solidFill>
+                  <a:srgbClr val="D4D4D4"/>
+                </a:solidFill>
+                <a:effectLst/>
+                <a:highlight>
+                  <a:srgbClr val="1E1E1E"/>
+                </a:highlight>
+                <a:latin typeface="Dank Mono Regular" panose="00000509000000000000" pitchFamily="50" charset="0"/>
+              </a:rPr>
+              <a:t> </a:t>
+            </a:r>
+            <a:r>
+              <a:rPr lang="es-ES" b="0" dirty="0" err="1">
+                <a:solidFill>
+                  <a:srgbClr val="D4D4D4"/>
+                </a:solidFill>
+                <a:effectLst/>
+                <a:highlight>
+                  <a:srgbClr val="1E1E1E"/>
+                </a:highlight>
+                <a:latin typeface="Dank Mono Regular" panose="00000509000000000000" pitchFamily="50" charset="0"/>
+              </a:rPr>
+              <a:t>Computer</a:t>
+            </a:r>
+            <a:r>
+              <a:rPr lang="es-ES" b="0" dirty="0">
+                <a:solidFill>
+                  <a:srgbClr val="D4D4D4"/>
+                </a:solidFill>
+                <a:effectLst/>
+                <a:highlight>
+                  <a:srgbClr val="1E1E1E"/>
+                </a:highlight>
+                <a:latin typeface="Dank Mono Regular" panose="00000509000000000000" pitchFamily="50" charset="0"/>
+              </a:rPr>
+              <a:t> Manufacture </a:t>
+            </a:r>
+            <a:r>
+              <a:rPr lang="es-ES" b="0" dirty="0" err="1">
+                <a:solidFill>
+                  <a:srgbClr val="D4D4D4"/>
+                </a:solidFill>
+                <a:effectLst/>
+                <a:highlight>
+                  <a:srgbClr val="1E1E1E"/>
+                </a:highlight>
+                <a:latin typeface="Dank Mono Regular" panose="00000509000000000000" pitchFamily="50" charset="0"/>
+              </a:rPr>
+              <a:t>Association</a:t>
+            </a:r>
+            <a:r>
+              <a:rPr lang="es-ES" b="0" dirty="0">
+                <a:solidFill>
+                  <a:srgbClr val="D4D4D4"/>
+                </a:solidFill>
+                <a:effectLst/>
+                <a:highlight>
+                  <a:srgbClr val="1E1E1E"/>
+                </a:highlight>
+                <a:latin typeface="Dank Mono Regular" panose="00000509000000000000" pitchFamily="50" charset="0"/>
+              </a:rPr>
+              <a:t>, si bien empezó siendo una asociación de fabricantes europeos de ordenadores, a día de hoy es una institución que estandariza procesos, lenguajes y demás elementos relacionados con IT).</a:t>
+            </a:r>
+            <a:br>
+              <a:rPr lang="es-ES" b="0" dirty="0">
+                <a:solidFill>
+                  <a:srgbClr val="D4D4D4"/>
+                </a:solidFill>
+                <a:effectLst/>
+                <a:highlight>
+                  <a:srgbClr val="1E1E1E"/>
+                </a:highlight>
+                <a:latin typeface="Dank Mono Regular" panose="00000509000000000000" pitchFamily="50" charset="0"/>
+              </a:rPr>
+            </a:br>
+            <a:br>
+              <a:rPr lang="es-ES" b="0" dirty="0">
+                <a:solidFill>
+                  <a:srgbClr val="D4D4D4"/>
+                </a:solidFill>
+                <a:effectLst/>
+                <a:highlight>
+                  <a:srgbClr val="1E1E1E"/>
+                </a:highlight>
+                <a:latin typeface="Dank Mono Regular" panose="00000509000000000000" pitchFamily="50" charset="0"/>
+              </a:rPr>
+            </a:br>
+            <a:r>
+              <a:rPr lang="es-ES" b="0" dirty="0">
+                <a:solidFill>
+                  <a:srgbClr val="D4D4D4"/>
+                </a:solidFill>
+                <a:effectLst/>
+                <a:highlight>
+                  <a:srgbClr val="1E1E1E"/>
+                </a:highlight>
+                <a:latin typeface="Dank Mono Regular" panose="00000509000000000000" pitchFamily="50" charset="0"/>
+              </a:rPr>
+              <a:t>A día de hoy es habitual llamar a este lenguaje con su nombre oficial JavaScript (abreviado como JS), o su nombre técnico ECMAScript (abreviado como ES).</a:t>
+            </a:r>
+          </a:p>
+          <a:p>
+            <a:endParaRPr lang="es-ES" b="0" u="sng" dirty="0">
+              <a:solidFill>
+                <a:srgbClr val="D4D4D4"/>
+              </a:solidFill>
+              <a:effectLst/>
+              <a:highlight>
+                <a:srgbClr val="1E1E1E"/>
+              </a:highlight>
+              <a:latin typeface="Dank Mono Regular" panose="00000509000000000000" pitchFamily="50" charset="0"/>
+            </a:endParaRPr>
+          </a:p>
+          <a:p>
+            <a:endParaRPr lang="es-ES" dirty="0"/>
+          </a:p>
+        </p:txBody>
+      </p:sp>
+    </p:spTree>
+    <p:extLst>
+      <p:ext uri="{BB962C8B-B14F-4D97-AF65-F5344CB8AC3E}">
+        <p14:creationId xmlns:p14="http://schemas.microsoft.com/office/powerpoint/2010/main" val="3432464847"/>
+      </p:ext>
+    </p:extLst>
+  </p:cSld>
+  <p:clrMapOvr>
+    <a:masterClrMapping/>
+  </p:clrMapOvr>
+</p:notes>
+</file>
+
+<file path=ppt/notesSlides/notesSlide4.xml><?xml version="1.0" encoding="utf-8"?>
+<p:notes xmlns:a="http://schemas.openxmlformats.org/drawingml/2006/main" xmlns:r="http://schemas.openxmlformats.org/officeDocument/2006/relationships" xmlns:p="http://schemas.openxmlformats.org/presentationml/2006/main">
+  <p:cSld>
+    <p:spTree>
+      <p:nvGrpSpPr>
+        <p:cNvPr id="1" name=""/>
+        <p:cNvGrpSpPr/>
+        <p:nvPr/>
+      </p:nvGrpSpPr>
+      <p:grpSpPr>
+        <a:xfrm>
+          <a:off x="0" y="0"/>
+          <a:ext cx="0" cy="0"/>
+          <a:chOff x="0" y="0"/>
+          <a:chExt cx="0" cy="0"/>
+        </a:xfrm>
+      </p:grpSpPr>
+      <p:sp>
+        <p:nvSpPr>
+          <p:cNvPr id="2" name="Marcador de imagen de diapositiva 1"/>
+          <p:cNvSpPr>
+            <a:spLocks noGrp="1" noRot="1" noChangeAspect="1"/>
+          </p:cNvSpPr>
+          <p:nvPr>
+            <p:ph type="sldImg"/>
+          </p:nvPr>
+        </p:nvSpPr>
+        <p:spPr>
+          <a:xfrm>
+            <a:off x="381000" y="685800"/>
+            <a:ext cx="6096000" cy="3429000"/>
+          </a:xfrm>
+        </p:spPr>
+      </p:sp>
+      <p:sp>
+        <p:nvSpPr>
+          <p:cNvPr id="3" name="Marcador de notas 2"/>
+          <p:cNvSpPr>
+            <a:spLocks noGrp="1"/>
+          </p:cNvSpPr>
+          <p:nvPr>
+            <p:ph type="body" idx="1"/>
+          </p:nvPr>
+        </p:nvSpPr>
+        <p:spPr/>
+        <p:txBody>
+          <a:bodyPr/>
+          <a:lstStyle/>
+          <a:p>
+            <a:r>
+              <a:rPr lang="es-ES" b="0" dirty="0">
+                <a:solidFill>
+                  <a:srgbClr val="D4D4D4"/>
+                </a:solidFill>
+                <a:effectLst/>
+                <a:highlight>
+                  <a:srgbClr val="1E1E1E"/>
+                </a:highlight>
+                <a:latin typeface="Dank Mono Regular" panose="00000509000000000000" pitchFamily="50" charset="0"/>
+              </a:rPr>
+              <a:t>- </a:t>
+            </a:r>
+            <a:r>
+              <a:rPr lang="es-ES" b="1" dirty="0">
+                <a:solidFill>
+                  <a:srgbClr val="569CD6"/>
+                </a:solidFill>
+                <a:effectLst/>
+                <a:highlight>
+                  <a:srgbClr val="1E1E1E"/>
+                </a:highlight>
+                <a:latin typeface="Dank Mono Regular" panose="00000509000000000000" pitchFamily="50" charset="0"/>
+              </a:rPr>
+              <a:t>Multiparadigma</a:t>
+            </a:r>
+            <a:r>
+              <a:rPr lang="es-ES" b="0" dirty="0">
+                <a:solidFill>
+                  <a:srgbClr val="D4D4D4"/>
+                </a:solidFill>
+                <a:effectLst/>
+                <a:highlight>
+                  <a:srgbClr val="1E1E1E"/>
+                </a:highlight>
+                <a:latin typeface="Dank Mono Regular" panose="00000509000000000000" pitchFamily="50" charset="0"/>
+              </a:rPr>
+              <a:t>. Si bien JS se considera un lenguaje orientado a prototipos, soporta diferentes paradigmas. Esto significa que podemos adoptar distintos enfoques de entre los más habituales en el mundo de la programación, como por ejemplo:</a:t>
+            </a:r>
+          </a:p>
+          <a:p>
+            <a:br>
+              <a:rPr lang="es-ES" b="0" dirty="0">
+                <a:solidFill>
+                  <a:srgbClr val="D4D4D4"/>
+                </a:solidFill>
+                <a:effectLst/>
+                <a:highlight>
+                  <a:srgbClr val="1E1E1E"/>
+                </a:highlight>
+                <a:latin typeface="Dank Mono Regular" panose="00000509000000000000" pitchFamily="50" charset="0"/>
+              </a:rPr>
+            </a:br>
+            <a:r>
+              <a:rPr lang="es-ES" b="0" dirty="0">
+                <a:solidFill>
+                  <a:srgbClr val="D4D4D4"/>
+                </a:solidFill>
+                <a:effectLst/>
+                <a:highlight>
+                  <a:srgbClr val="1E1E1E"/>
+                </a:highlight>
+                <a:latin typeface="Dank Mono Regular" panose="00000509000000000000" pitchFamily="50" charset="0"/>
+              </a:rPr>
+              <a:t>  - Programación orientada a objetos (OOP), donde las clases son la pieza fundamental y en ellas abstraemos datos y manejo de esos datos.</a:t>
+            </a:r>
+          </a:p>
+          <a:p>
+            <a:r>
+              <a:rPr lang="es-ES" b="0" dirty="0">
+                <a:solidFill>
+                  <a:srgbClr val="D4D4D4"/>
+                </a:solidFill>
+                <a:effectLst/>
+                <a:highlight>
+                  <a:srgbClr val="1E1E1E"/>
+                </a:highlight>
+                <a:latin typeface="Dank Mono Regular" panose="00000509000000000000" pitchFamily="50" charset="0"/>
+              </a:rPr>
+              <a:t>  - Programación funcional, en cuyo caso las funciones son el elemento estrella.</a:t>
+            </a:r>
+          </a:p>
+          <a:p>
+            <a:r>
+              <a:rPr lang="es-ES" b="0" dirty="0">
+                <a:solidFill>
+                  <a:srgbClr val="D4D4D4"/>
+                </a:solidFill>
+                <a:effectLst/>
+                <a:highlight>
+                  <a:srgbClr val="1E1E1E"/>
+                </a:highlight>
+                <a:latin typeface="Dank Mono Regular" panose="00000509000000000000" pitchFamily="50" charset="0"/>
+              </a:rPr>
+              <a:t>  - O la programación imperativa donde no abstraemos en clases o funciones e indicamos paso a paso las instrucciones a realizar para conseguir una tarea.</a:t>
+            </a:r>
+          </a:p>
+          <a:p>
+            <a:br>
+              <a:rPr lang="es-ES" b="0" dirty="0">
+                <a:solidFill>
+                  <a:srgbClr val="D4D4D4"/>
+                </a:solidFill>
+                <a:effectLst/>
+                <a:highlight>
+                  <a:srgbClr val="1E1E1E"/>
+                </a:highlight>
+                <a:latin typeface="Dank Mono Regular" panose="00000509000000000000" pitchFamily="50" charset="0"/>
+              </a:rPr>
+            </a:br>
+            <a:r>
+              <a:rPr lang="es-ES" b="0" dirty="0">
+                <a:solidFill>
+                  <a:srgbClr val="D4D4D4"/>
+                </a:solidFill>
+                <a:effectLst/>
+                <a:highlight>
+                  <a:srgbClr val="1E1E1E"/>
+                </a:highlight>
+                <a:latin typeface="Dank Mono Regular" panose="00000509000000000000" pitchFamily="50" charset="0"/>
+              </a:rPr>
+              <a:t>- </a:t>
+            </a:r>
+            <a:r>
+              <a:rPr lang="es-ES" b="1" dirty="0">
+                <a:solidFill>
+                  <a:srgbClr val="569CD6"/>
+                </a:solidFill>
+                <a:effectLst/>
+                <a:highlight>
+                  <a:srgbClr val="1E1E1E"/>
+                </a:highlight>
+                <a:latin typeface="Dank Mono Regular" panose="00000509000000000000" pitchFamily="50" charset="0"/>
+              </a:rPr>
+              <a:t>Dinámico e Interpretado</a:t>
+            </a:r>
+            <a:r>
+              <a:rPr lang="es-ES" b="0" dirty="0">
+                <a:solidFill>
+                  <a:srgbClr val="D4D4D4"/>
+                </a:solidFill>
+                <a:effectLst/>
+                <a:highlight>
+                  <a:srgbClr val="1E1E1E"/>
+                </a:highlight>
+                <a:latin typeface="Dank Mono Regular" panose="00000509000000000000" pitchFamily="50" charset="0"/>
+              </a:rPr>
+              <a:t>. Lo que implica que no se requiera de una compilación previa con la que obtener los artefactos de salida que finalmente serán ejecutados, como puede pasar por ejemplo con C que es compilado a binario, sino que el lenguaje que nosotros escribimos es directamente consumido por el navegador, quien lo interpreta y lo ejecuta**.</a:t>
+            </a:r>
+          </a:p>
+          <a:p>
+            <a:endParaRPr lang="es-ES" b="0" dirty="0">
+              <a:solidFill>
+                <a:srgbClr val="D4D4D4"/>
+              </a:solidFill>
+              <a:effectLst/>
+              <a:highlight>
+                <a:srgbClr val="1E1E1E"/>
+              </a:highlight>
+              <a:latin typeface="Dank Mono Regular" panose="00000509000000000000" pitchFamily="50" charset="0"/>
+            </a:endParaRPr>
+          </a:p>
+          <a:p>
+            <a:r>
+              <a:rPr lang="es-ES" b="0" dirty="0">
+                <a:solidFill>
+                  <a:srgbClr val="D4D4D4"/>
+                </a:solidFill>
+                <a:effectLst/>
+                <a:highlight>
+                  <a:srgbClr val="1E1E1E"/>
+                </a:highlight>
+                <a:latin typeface="Dank Mono Regular" panose="00000509000000000000" pitchFamily="50" charset="0"/>
+              </a:rPr>
+              <a:t>NOTA**: Hay que añadir un matiz importante a estas definiciones, y es que se suelen usar para clasificar los lenguajes de forma binaria en lenguajes dinámicos vs estáticos, o lenguajes compilados vs interpretados. Sin embargo no siempre las cosas son blancas o negras, y al realidad es que, si bien JS está mas cerca de ser un lenguaje dinámico e interpretado para el desarrollador, el motor o intérprete que ejecuta JS si que realiza una compilación previa del mismo, en la que además puede aplicar ciertas optimizaciones o incluso detectar errores y evitar totalmente la ejecución. Lo que sucede es que esta compilación es lo que se conoce como compilación JIT (</a:t>
+            </a:r>
+            <a:r>
+              <a:rPr lang="es-ES" b="0" dirty="0" err="1">
+                <a:solidFill>
+                  <a:srgbClr val="D4D4D4"/>
+                </a:solidFill>
+                <a:effectLst/>
+                <a:highlight>
+                  <a:srgbClr val="1E1E1E"/>
+                </a:highlight>
+                <a:latin typeface="Dank Mono Regular" panose="00000509000000000000" pitchFamily="50" charset="0"/>
+              </a:rPr>
+              <a:t>just</a:t>
+            </a:r>
+            <a:r>
+              <a:rPr lang="es-ES" b="0" dirty="0">
+                <a:solidFill>
+                  <a:srgbClr val="D4D4D4"/>
+                </a:solidFill>
+                <a:effectLst/>
+                <a:highlight>
+                  <a:srgbClr val="1E1E1E"/>
+                </a:highlight>
+                <a:latin typeface="Dank Mono Regular" panose="00000509000000000000" pitchFamily="50" charset="0"/>
+              </a:rPr>
+              <a:t>-</a:t>
+            </a:r>
+            <a:r>
+              <a:rPr lang="es-ES" b="0" dirty="0" err="1">
+                <a:solidFill>
+                  <a:srgbClr val="D4D4D4"/>
+                </a:solidFill>
+                <a:effectLst/>
+                <a:highlight>
+                  <a:srgbClr val="1E1E1E"/>
+                </a:highlight>
+                <a:latin typeface="Dank Mono Regular" panose="00000509000000000000" pitchFamily="50" charset="0"/>
+              </a:rPr>
+              <a:t>in-time</a:t>
+            </a:r>
+            <a:r>
+              <a:rPr lang="es-ES" b="0" dirty="0">
+                <a:solidFill>
+                  <a:srgbClr val="D4D4D4"/>
+                </a:solidFill>
+                <a:effectLst/>
+                <a:highlight>
+                  <a:srgbClr val="1E1E1E"/>
+                </a:highlight>
+                <a:latin typeface="Dank Mono Regular" panose="00000509000000000000" pitchFamily="50" charset="0"/>
+              </a:rPr>
+              <a:t>) o ‘al vuelo’, y es transparente para el desarrollador y el usuario puesto que la hace el motor en caliente a medida que </a:t>
+            </a:r>
+            <a:r>
+              <a:rPr lang="es-ES" b="0" dirty="0" err="1">
+                <a:solidFill>
+                  <a:srgbClr val="D4D4D4"/>
+                </a:solidFill>
+                <a:effectLst/>
+                <a:highlight>
+                  <a:srgbClr val="1E1E1E"/>
+                </a:highlight>
+                <a:latin typeface="Dank Mono Regular" panose="00000509000000000000" pitchFamily="50" charset="0"/>
+              </a:rPr>
+              <a:t>parsea</a:t>
+            </a:r>
+            <a:r>
+              <a:rPr lang="es-ES" b="0" dirty="0">
+                <a:solidFill>
+                  <a:srgbClr val="D4D4D4"/>
+                </a:solidFill>
+                <a:effectLst/>
+                <a:highlight>
+                  <a:srgbClr val="1E1E1E"/>
+                </a:highlight>
+                <a:latin typeface="Dank Mono Regular" panose="00000509000000000000" pitchFamily="50" charset="0"/>
+              </a:rPr>
+              <a:t> y ejecuta la aplicación.</a:t>
+            </a:r>
+          </a:p>
+          <a:p>
+            <a:br>
+              <a:rPr lang="es-ES" b="0" dirty="0">
+                <a:solidFill>
+                  <a:srgbClr val="D4D4D4"/>
+                </a:solidFill>
+                <a:effectLst/>
+                <a:highlight>
+                  <a:srgbClr val="1E1E1E"/>
+                </a:highlight>
+                <a:latin typeface="Dank Mono Regular" panose="00000509000000000000" pitchFamily="50" charset="0"/>
+              </a:rPr>
+            </a:br>
+            <a:r>
+              <a:rPr lang="es-ES" b="0" dirty="0">
+                <a:solidFill>
+                  <a:srgbClr val="D4D4D4"/>
+                </a:solidFill>
+                <a:effectLst/>
+                <a:highlight>
+                  <a:srgbClr val="1E1E1E"/>
+                </a:highlight>
+                <a:latin typeface="Dank Mono Regular" panose="00000509000000000000" pitchFamily="50" charset="0"/>
+              </a:rPr>
+              <a:t>- </a:t>
+            </a:r>
+            <a:r>
+              <a:rPr lang="es-ES" b="1" dirty="0">
+                <a:solidFill>
+                  <a:srgbClr val="569CD6"/>
+                </a:solidFill>
+                <a:effectLst/>
+                <a:highlight>
+                  <a:srgbClr val="1E1E1E"/>
+                </a:highlight>
+                <a:latin typeface="Dank Mono Regular" panose="00000509000000000000" pitchFamily="50" charset="0"/>
+              </a:rPr>
+              <a:t>Multipropósito</a:t>
+            </a:r>
+            <a:r>
+              <a:rPr lang="es-ES" b="0" dirty="0">
+                <a:solidFill>
+                  <a:srgbClr val="D4D4D4"/>
+                </a:solidFill>
+                <a:effectLst/>
+                <a:highlight>
+                  <a:srgbClr val="1E1E1E"/>
+                </a:highlight>
+                <a:latin typeface="Dank Mono Regular" panose="00000509000000000000" pitchFamily="50" charset="0"/>
+              </a:rPr>
+              <a:t>. No sólo puede emplearse de lado de cliente, es decir, en el navegador, sino también de lado del servidor. </a:t>
+            </a:r>
+            <a:br>
+              <a:rPr lang="es-ES" b="0" dirty="0">
+                <a:solidFill>
+                  <a:srgbClr val="D4D4D4"/>
+                </a:solidFill>
+                <a:effectLst/>
+                <a:highlight>
+                  <a:srgbClr val="1E1E1E"/>
+                </a:highlight>
+                <a:latin typeface="Dank Mono Regular" panose="00000509000000000000" pitchFamily="50" charset="0"/>
+              </a:rPr>
+            </a:br>
+            <a:endParaRPr lang="es-ES" b="0" dirty="0">
+              <a:solidFill>
+                <a:srgbClr val="D4D4D4"/>
+              </a:solidFill>
+              <a:effectLst/>
+              <a:highlight>
+                <a:srgbClr val="1E1E1E"/>
+              </a:highlight>
+              <a:latin typeface="Dank Mono Regular" panose="00000509000000000000" pitchFamily="50" charset="0"/>
+            </a:endParaRPr>
+          </a:p>
+          <a:p>
+            <a:r>
+              <a:rPr lang="es-ES" b="0" dirty="0">
+                <a:solidFill>
+                  <a:srgbClr val="D4D4D4"/>
+                </a:solidFill>
+                <a:effectLst/>
+                <a:highlight>
+                  <a:srgbClr val="1E1E1E"/>
+                </a:highlight>
+                <a:latin typeface="Dank Mono Regular" panose="00000509000000000000" pitchFamily="50" charset="0"/>
+              </a:rPr>
+              <a:t>Esto es posible gracias a plataformas como Node.js. </a:t>
+            </a:r>
+            <a:r>
+              <a:rPr lang="es-ES" b="0" dirty="0" err="1">
+                <a:solidFill>
+                  <a:srgbClr val="D4D4D4"/>
+                </a:solidFill>
+                <a:effectLst/>
+                <a:highlight>
+                  <a:srgbClr val="1E1E1E"/>
+                </a:highlight>
+                <a:latin typeface="Dank Mono Regular" panose="00000509000000000000" pitchFamily="50" charset="0"/>
+              </a:rPr>
+              <a:t>Node</a:t>
+            </a:r>
+            <a:r>
+              <a:rPr lang="es-ES" b="0" dirty="0">
+                <a:solidFill>
+                  <a:srgbClr val="D4D4D4"/>
+                </a:solidFill>
+                <a:effectLst/>
+                <a:highlight>
+                  <a:srgbClr val="1E1E1E"/>
+                </a:highlight>
+                <a:latin typeface="Dank Mono Regular" panose="00000509000000000000" pitchFamily="50" charset="0"/>
+              </a:rPr>
+              <a:t> es fundamentalmente el motor V8 de Google extraído o “portado” como una aplicación </a:t>
+            </a:r>
+            <a:r>
+              <a:rPr lang="es-ES" b="0" i="1" dirty="0" err="1">
+                <a:solidFill>
+                  <a:srgbClr val="D4D4D4"/>
+                </a:solidFill>
+                <a:effectLst/>
+                <a:highlight>
+                  <a:srgbClr val="1E1E1E"/>
+                </a:highlight>
+                <a:latin typeface="Dank Mono Regular" panose="00000509000000000000" pitchFamily="50" charset="0"/>
+              </a:rPr>
+              <a:t>standalone</a:t>
+            </a:r>
+            <a:r>
+              <a:rPr lang="es-ES" b="0" dirty="0">
+                <a:solidFill>
+                  <a:srgbClr val="D4D4D4"/>
+                </a:solidFill>
+                <a:effectLst/>
+                <a:highlight>
+                  <a:srgbClr val="1E1E1E"/>
+                </a:highlight>
+                <a:latin typeface="Dank Mono Regular" panose="00000509000000000000" pitchFamily="50" charset="0"/>
+              </a:rPr>
+              <a:t> que podemos instalar en cualquier máquina. Este motor v8 es la pieza que utiliza el navegador </a:t>
+            </a:r>
+            <a:r>
+              <a:rPr lang="es-ES" b="0" dirty="0" err="1">
+                <a:solidFill>
+                  <a:srgbClr val="D4D4D4"/>
+                </a:solidFill>
+                <a:effectLst/>
+                <a:highlight>
+                  <a:srgbClr val="1E1E1E"/>
+                </a:highlight>
+                <a:latin typeface="Dank Mono Regular" panose="00000509000000000000" pitchFamily="50" charset="0"/>
+              </a:rPr>
+              <a:t>Chromium</a:t>
+            </a:r>
+            <a:r>
+              <a:rPr lang="es-ES" b="0" dirty="0">
+                <a:solidFill>
+                  <a:srgbClr val="D4D4D4"/>
+                </a:solidFill>
+                <a:effectLst/>
+                <a:highlight>
+                  <a:srgbClr val="1E1E1E"/>
+                </a:highlight>
+                <a:latin typeface="Dank Mono Regular" panose="00000509000000000000" pitchFamily="50" charset="0"/>
+              </a:rPr>
+              <a:t> para poder interpretar y ejecutar código JavaScript.</a:t>
+            </a:r>
+          </a:p>
+          <a:p>
+            <a:br>
+              <a:rPr lang="es-ES" b="0" dirty="0">
+                <a:solidFill>
+                  <a:srgbClr val="D4D4D4"/>
+                </a:solidFill>
+                <a:effectLst/>
+                <a:highlight>
+                  <a:srgbClr val="1E1E1E"/>
+                </a:highlight>
+                <a:latin typeface="Dank Mono Regular" panose="00000509000000000000" pitchFamily="50" charset="0"/>
+              </a:rPr>
+            </a:br>
+            <a:r>
+              <a:rPr lang="es-ES" b="0" dirty="0">
+                <a:solidFill>
+                  <a:srgbClr val="D4D4D4"/>
+                </a:solidFill>
+                <a:effectLst/>
+                <a:highlight>
+                  <a:srgbClr val="1E1E1E"/>
+                </a:highlight>
+                <a:latin typeface="Dank Mono Regular" panose="00000509000000000000" pitchFamily="50" charset="0"/>
+              </a:rPr>
+              <a:t>Por lo tanto, gracias a </a:t>
+            </a:r>
+            <a:r>
+              <a:rPr lang="es-ES" b="0" dirty="0" err="1">
+                <a:solidFill>
+                  <a:srgbClr val="D4D4D4"/>
+                </a:solidFill>
+                <a:effectLst/>
+                <a:highlight>
+                  <a:srgbClr val="1E1E1E"/>
+                </a:highlight>
+                <a:latin typeface="Dank Mono Regular" panose="00000509000000000000" pitchFamily="50" charset="0"/>
+              </a:rPr>
+              <a:t>Node</a:t>
+            </a:r>
+            <a:r>
+              <a:rPr lang="es-ES" b="0" dirty="0">
+                <a:solidFill>
+                  <a:srgbClr val="D4D4D4"/>
+                </a:solidFill>
+                <a:effectLst/>
+                <a:highlight>
+                  <a:srgbClr val="1E1E1E"/>
+                </a:highlight>
+                <a:latin typeface="Dank Mono Regular" panose="00000509000000000000" pitchFamily="50" charset="0"/>
+              </a:rPr>
+              <a:t>, ahora tenemos el </a:t>
+            </a:r>
+            <a:r>
+              <a:rPr lang="es-ES" b="0" dirty="0" err="1">
+                <a:solidFill>
+                  <a:srgbClr val="D4D4D4"/>
+                </a:solidFill>
+                <a:effectLst/>
+                <a:highlight>
+                  <a:srgbClr val="1E1E1E"/>
+                </a:highlight>
+                <a:latin typeface="Dank Mono Regular" panose="00000509000000000000" pitchFamily="50" charset="0"/>
+              </a:rPr>
+              <a:t>engine</a:t>
+            </a:r>
+            <a:r>
+              <a:rPr lang="es-ES" b="0" dirty="0">
+                <a:solidFill>
+                  <a:srgbClr val="D4D4D4"/>
+                </a:solidFill>
+                <a:effectLst/>
+                <a:highlight>
+                  <a:srgbClr val="1E1E1E"/>
+                </a:highlight>
+                <a:latin typeface="Dank Mono Regular" panose="00000509000000000000" pitchFamily="50" charset="0"/>
+              </a:rPr>
+              <a:t> de Chrome allá donde queramos, haciendo posible ejecutar JavaScript fuera de un navegador, por ejemplo, en un servidor.</a:t>
+            </a:r>
+          </a:p>
+          <a:p>
+            <a:br>
+              <a:rPr lang="es-ES" b="0" dirty="0">
+                <a:solidFill>
+                  <a:srgbClr val="D4D4D4"/>
+                </a:solidFill>
+                <a:effectLst/>
+                <a:highlight>
+                  <a:srgbClr val="1E1E1E"/>
+                </a:highlight>
+                <a:latin typeface="Dank Mono Regular" panose="00000509000000000000" pitchFamily="50" charset="0"/>
+              </a:rPr>
+            </a:br>
+            <a:r>
+              <a:rPr lang="es-ES" b="0" dirty="0">
+                <a:solidFill>
+                  <a:srgbClr val="D4D4D4"/>
+                </a:solidFill>
+                <a:effectLst/>
+                <a:highlight>
+                  <a:srgbClr val="1E1E1E"/>
+                </a:highlight>
+                <a:latin typeface="Dank Mono Regular" panose="00000509000000000000" pitchFamily="50" charset="0"/>
+              </a:rPr>
+              <a:t>- </a:t>
+            </a:r>
+            <a:r>
+              <a:rPr lang="es-ES" b="1" dirty="0">
+                <a:solidFill>
+                  <a:srgbClr val="569CD6"/>
+                </a:solidFill>
+                <a:effectLst/>
+                <a:highlight>
+                  <a:srgbClr val="1E1E1E"/>
+                </a:highlight>
+                <a:latin typeface="Dank Mono Regular" panose="00000509000000000000" pitchFamily="50" charset="0"/>
+              </a:rPr>
+              <a:t>Objetos y Prototipos</a:t>
+            </a:r>
+            <a:r>
+              <a:rPr lang="es-ES" b="0" dirty="0">
+                <a:solidFill>
+                  <a:srgbClr val="D4D4D4"/>
+                </a:solidFill>
+                <a:effectLst/>
+                <a:highlight>
+                  <a:srgbClr val="1E1E1E"/>
+                </a:highlight>
+                <a:latin typeface="Dank Mono Regular" panose="00000509000000000000" pitchFamily="50" charset="0"/>
+              </a:rPr>
+              <a:t>. El lenguaje nos da de serie los objetos y los prototipos, lo que permite tener un sistema de herencia considerada más potente que la herencia clásica con clases.</a:t>
+            </a:r>
+          </a:p>
+          <a:p>
+            <a:br>
+              <a:rPr lang="es-ES" b="0" dirty="0">
+                <a:solidFill>
+                  <a:srgbClr val="D4D4D4"/>
+                </a:solidFill>
+                <a:effectLst/>
+                <a:highlight>
+                  <a:srgbClr val="1E1E1E"/>
+                </a:highlight>
+                <a:latin typeface="Dank Mono Regular" panose="00000509000000000000" pitchFamily="50" charset="0"/>
+              </a:rPr>
+            </a:br>
+            <a:r>
+              <a:rPr lang="es-ES" b="0" dirty="0">
+                <a:solidFill>
+                  <a:srgbClr val="D4D4D4"/>
+                </a:solidFill>
+                <a:effectLst/>
+                <a:highlight>
+                  <a:srgbClr val="1E1E1E"/>
+                </a:highlight>
+                <a:latin typeface="Dank Mono Regular" panose="00000509000000000000" pitchFamily="50" charset="0"/>
+              </a:rPr>
+              <a:t>- </a:t>
+            </a:r>
+            <a:r>
+              <a:rPr lang="es-ES" b="1" dirty="0">
+                <a:solidFill>
+                  <a:srgbClr val="569CD6"/>
+                </a:solidFill>
+                <a:effectLst/>
+                <a:highlight>
+                  <a:srgbClr val="1E1E1E"/>
+                </a:highlight>
+                <a:latin typeface="Dank Mono Regular" panose="00000509000000000000" pitchFamily="50" charset="0"/>
+              </a:rPr>
+              <a:t>JSON</a:t>
+            </a:r>
+            <a:r>
+              <a:rPr lang="es-ES" b="0" dirty="0">
+                <a:solidFill>
+                  <a:srgbClr val="D4D4D4"/>
+                </a:solidFill>
+                <a:effectLst/>
+                <a:highlight>
+                  <a:srgbClr val="1E1E1E"/>
+                </a:highlight>
+                <a:latin typeface="Dank Mono Regular" panose="00000509000000000000" pitchFamily="50" charset="0"/>
+              </a:rPr>
+              <a:t>. También de serie nos proporciona una notación literal de objetos, con lo que poder serializar objetos hacia afuera de nuestro código (es decir, exportar, por ejemplo hacia un fichero de texto) y </a:t>
+            </a:r>
+            <a:r>
+              <a:rPr lang="es-ES" b="0" dirty="0" err="1">
+                <a:solidFill>
+                  <a:srgbClr val="D4D4D4"/>
+                </a:solidFill>
+                <a:effectLst/>
+                <a:highlight>
+                  <a:srgbClr val="1E1E1E"/>
+                </a:highlight>
+                <a:latin typeface="Dank Mono Regular" panose="00000509000000000000" pitchFamily="50" charset="0"/>
+              </a:rPr>
+              <a:t>deserializar</a:t>
+            </a:r>
+            <a:r>
+              <a:rPr lang="es-ES" b="0" dirty="0">
+                <a:solidFill>
+                  <a:srgbClr val="D4D4D4"/>
+                </a:solidFill>
+                <a:effectLst/>
+                <a:highlight>
+                  <a:srgbClr val="1E1E1E"/>
+                </a:highlight>
+                <a:latin typeface="Dank Mono Regular" panose="00000509000000000000" pitchFamily="50" charset="0"/>
+              </a:rPr>
+              <a:t> (lo que equivale a importar objetos desde el exterior hacia nuestro código).</a:t>
+            </a:r>
+          </a:p>
+          <a:p>
+            <a:br>
+              <a:rPr lang="es-ES" b="0" dirty="0">
+                <a:solidFill>
+                  <a:srgbClr val="D4D4D4"/>
+                </a:solidFill>
+                <a:effectLst/>
+                <a:highlight>
+                  <a:srgbClr val="1E1E1E"/>
+                </a:highlight>
+                <a:latin typeface="Dank Mono Regular" panose="00000509000000000000" pitchFamily="50" charset="0"/>
+              </a:rPr>
+            </a:br>
+            <a:r>
+              <a:rPr lang="es-ES" b="0" dirty="0">
+                <a:solidFill>
+                  <a:srgbClr val="D4D4D4"/>
+                </a:solidFill>
+                <a:effectLst/>
+                <a:highlight>
+                  <a:srgbClr val="1E1E1E"/>
+                </a:highlight>
+                <a:latin typeface="Dank Mono Regular" panose="00000509000000000000" pitchFamily="50" charset="0"/>
+              </a:rPr>
+              <a:t>- </a:t>
+            </a:r>
+            <a:r>
+              <a:rPr lang="es-ES" b="1" dirty="0">
+                <a:solidFill>
+                  <a:srgbClr val="569CD6"/>
+                </a:solidFill>
+                <a:effectLst/>
+                <a:highlight>
+                  <a:srgbClr val="1E1E1E"/>
+                </a:highlight>
+                <a:latin typeface="Dank Mono Regular" panose="00000509000000000000" pitchFamily="50" charset="0"/>
+              </a:rPr>
+              <a:t>Popularidad e Importancia</a:t>
+            </a:r>
+            <a:r>
+              <a:rPr lang="es-ES" b="0" dirty="0">
+                <a:solidFill>
+                  <a:srgbClr val="D4D4D4"/>
+                </a:solidFill>
+                <a:effectLst/>
+                <a:highlight>
+                  <a:srgbClr val="1E1E1E"/>
+                </a:highlight>
+                <a:latin typeface="Dank Mono Regular" panose="00000509000000000000" pitchFamily="50" charset="0"/>
+              </a:rPr>
+              <a:t>. JavaScript es el estándar de la web y esto lo convierte en el lenguaje más utilizado del mundo.</a:t>
+            </a:r>
+          </a:p>
+          <a:p>
+            <a:endParaRPr lang="es-ES" dirty="0"/>
+          </a:p>
+        </p:txBody>
+      </p:sp>
+    </p:spTree>
+    <p:extLst>
+      <p:ext uri="{BB962C8B-B14F-4D97-AF65-F5344CB8AC3E}">
+        <p14:creationId xmlns:p14="http://schemas.microsoft.com/office/powerpoint/2010/main" val="3147683687"/>
+      </p:ext>
+    </p:extLst>
+  </p:cSld>
+  <p:clrMapOvr>
+    <a:masterClrMapping/>
+  </p:clrMapOvr>
+</p:notes>
+</file>
+
+<file path=ppt/notesSlides/notesSlide5.xml><?xml version="1.0" encoding="utf-8"?>
+<p:notes xmlns:a="http://schemas.openxmlformats.org/drawingml/2006/main" xmlns:r="http://schemas.openxmlformats.org/officeDocument/2006/relationships" xmlns:p="http://schemas.openxmlformats.org/presentationml/2006/main">
+  <p:cSld>
+    <p:spTree>
+      <p:nvGrpSpPr>
+        <p:cNvPr id="1" name=""/>
+        <p:cNvGrpSpPr/>
+        <p:nvPr/>
+      </p:nvGrpSpPr>
+      <p:grpSpPr>
+        <a:xfrm>
+          <a:off x="0" y="0"/>
+          <a:ext cx="0" cy="0"/>
+          <a:chOff x="0" y="0"/>
+          <a:chExt cx="0" cy="0"/>
+        </a:xfrm>
+      </p:grpSpPr>
+      <p:sp>
+        <p:nvSpPr>
+          <p:cNvPr id="2" name="Marcador de imagen de diapositiva 1"/>
+          <p:cNvSpPr>
+            <a:spLocks noGrp="1" noRot="1" noChangeAspect="1"/>
+          </p:cNvSpPr>
+          <p:nvPr>
+            <p:ph type="sldImg"/>
+          </p:nvPr>
+        </p:nvSpPr>
+        <p:spPr>
+          <a:xfrm>
+            <a:off x="381000" y="685800"/>
+            <a:ext cx="6096000" cy="3429000"/>
+          </a:xfrm>
+        </p:spPr>
+      </p:sp>
+      <p:sp>
+        <p:nvSpPr>
+          <p:cNvPr id="3" name="Marcador de notas 2"/>
+          <p:cNvSpPr>
+            <a:spLocks noGrp="1"/>
+          </p:cNvSpPr>
+          <p:nvPr>
+            <p:ph type="body" idx="1"/>
+          </p:nvPr>
+        </p:nvSpPr>
+        <p:spPr/>
+        <p:txBody>
+          <a:bodyPr/>
+          <a:lstStyle/>
+          <a:p>
+            <a:r>
+              <a:rPr lang="es-ES" dirty="0"/>
+              <a:t>Nos vamos a detener brevemente a tratar un tema de gran importancia en el ecosistema web como es la compatibilidad, y veremos el tipo de compatibilidad que ofrece cada lenguaje involucrado. En resumen:</a:t>
             </a:r>
           </a:p>
           <a:p>
@@ -658,7 +2624,35 @@
                 <a:effectLst/>
                 <a:latin typeface="Slack-Lato"/>
               </a:rPr>
-              <a:t> 'no entiende', pero como es lógico, en un programa de scripting como JS esto no tendría mucho sentido. Sin embargo, lenguajes de propósito reducido como HTML o CSS si que son compatibles hacia adelante y no hacia atrás.</a:t>
+              <a:t> 'no entiende', pero como es lógico, en un programa de propósito general como JS esto no tendría mucho sentido porque no sería factible. Sin embargo, en lenguajes de propósito reducido como HTML o CSS si que se puede aplicar la compatibilidad hacia adelante y no hacia atrás: estos lenguajes son mucho más declarativos y representan un conjunto de reglas (CSS) o conjunto de etiquetas/nodos (HTML) y por tanto podemos obviar aquellas reglas o etiquetas que no entendamos sin interferir con el resto.</a:t>
+            </a:r>
+            <a:br>
+              <a:rPr lang="es-ES" b="0" i="0" dirty="0">
+                <a:solidFill>
+                  <a:srgbClr val="D1D2D3"/>
+                </a:solidFill>
+                <a:effectLst/>
+                <a:latin typeface="Slack-Lato"/>
+              </a:rPr>
+            </a:br>
+            <a:br>
+              <a:rPr lang="es-ES" b="0" i="0" dirty="0">
+                <a:solidFill>
+                  <a:srgbClr val="D1D2D3"/>
+                </a:solidFill>
+                <a:effectLst/>
+                <a:latin typeface="Slack-Lato"/>
+              </a:rPr>
+            </a:br>
+            <a:r>
+              <a:rPr lang="es-ES" b="0" i="0" dirty="0">
+                <a:solidFill>
+                  <a:srgbClr val="D1D2D3"/>
+                </a:solidFill>
+                <a:effectLst/>
+                <a:latin typeface="Slack-Lato"/>
+              </a:rPr>
+              <a:t>Como Nota al margen: la gran mayoría de los comportamientos que se critican a JS tienen que ver con su compatibilidad hacia atrás. Lo que es liberado en JS tiene que permanecer siempre, no podemos borrarlo o rehacerlo. Pagaremos el precio de arrastrar dichos comportamientos, pero a cambio evitamos que se rompa la web.</a:t>
             </a:r>
           </a:p>
           <a:p>
@@ -670,6 +2664,1160 @@
     <p:extLst>
       <p:ext uri="{BB962C8B-B14F-4D97-AF65-F5344CB8AC3E}">
         <p14:creationId xmlns:p14="http://schemas.microsoft.com/office/powerpoint/2010/main" val="2554531523"/>
+      </p:ext>
+    </p:extLst>
+  </p:cSld>
+  <p:clrMapOvr>
+    <a:masterClrMapping/>
+  </p:clrMapOvr>
+</p:notes>
+</file>
+
+<file path=ppt/notesSlides/notesSlide6.xml><?xml version="1.0" encoding="utf-8"?>
+<p:notes xmlns:a="http://schemas.openxmlformats.org/drawingml/2006/main" xmlns:r="http://schemas.openxmlformats.org/officeDocument/2006/relationships" xmlns:p="http://schemas.openxmlformats.org/presentationml/2006/main">
+  <p:cSld>
+    <p:spTree>
+      <p:nvGrpSpPr>
+        <p:cNvPr id="1" name=""/>
+        <p:cNvGrpSpPr/>
+        <p:nvPr/>
+      </p:nvGrpSpPr>
+      <p:grpSpPr>
+        <a:xfrm>
+          <a:off x="0" y="0"/>
+          <a:ext cx="0" cy="0"/>
+          <a:chOff x="0" y="0"/>
+          <a:chExt cx="0" cy="0"/>
+        </a:xfrm>
+      </p:grpSpPr>
+      <p:sp>
+        <p:nvSpPr>
+          <p:cNvPr id="2" name="Marcador de imagen de diapositiva 1"/>
+          <p:cNvSpPr>
+            <a:spLocks noGrp="1" noRot="1" noChangeAspect="1"/>
+          </p:cNvSpPr>
+          <p:nvPr>
+            <p:ph type="sldImg"/>
+          </p:nvPr>
+        </p:nvSpPr>
+        <p:spPr>
+          <a:xfrm>
+            <a:off x="381000" y="685800"/>
+            <a:ext cx="6096000" cy="3429000"/>
+          </a:xfrm>
+        </p:spPr>
+      </p:sp>
+      <p:sp>
+        <p:nvSpPr>
+          <p:cNvPr id="3" name="Marcador de notas 2"/>
+          <p:cNvSpPr>
+            <a:spLocks noGrp="1"/>
+          </p:cNvSpPr>
+          <p:nvPr>
+            <p:ph type="body" idx="1"/>
+          </p:nvPr>
+        </p:nvSpPr>
+        <p:spPr/>
+        <p:txBody>
+          <a:bodyPr/>
+          <a:lstStyle/>
+          <a:p>
+            <a:r>
+              <a:rPr lang="es-ES" b="0" dirty="0">
+                <a:solidFill>
+                  <a:srgbClr val="D4D4D4"/>
+                </a:solidFill>
+                <a:effectLst/>
+                <a:highlight>
+                  <a:srgbClr val="1E1E1E"/>
+                </a:highlight>
+                <a:latin typeface="Dank Mono Regular" panose="00000509000000000000" pitchFamily="50" charset="0"/>
+              </a:rPr>
+              <a:t>JavaScript evoluciona en base a </a:t>
+            </a:r>
+            <a:r>
+              <a:rPr lang="es-ES" b="0" i="1" dirty="0" err="1">
+                <a:solidFill>
+                  <a:srgbClr val="D4D4D4"/>
+                </a:solidFill>
+                <a:effectLst/>
+                <a:highlight>
+                  <a:srgbClr val="1E1E1E"/>
+                </a:highlight>
+                <a:latin typeface="Dank Mono Regular" panose="00000509000000000000" pitchFamily="50" charset="0"/>
+              </a:rPr>
+              <a:t>releases</a:t>
+            </a:r>
+            <a:r>
+              <a:rPr lang="es-ES" b="0" dirty="0">
+                <a:solidFill>
+                  <a:srgbClr val="D4D4D4"/>
+                </a:solidFill>
+                <a:effectLst/>
+                <a:highlight>
+                  <a:srgbClr val="1E1E1E"/>
+                </a:highlight>
+                <a:latin typeface="Dank Mono Regular" panose="00000509000000000000" pitchFamily="50" charset="0"/>
+              </a:rPr>
+              <a:t>, es decir, se liberan nuevas versiones del lenguaje con un conjunto de nuevas características.</a:t>
+            </a:r>
+          </a:p>
+          <a:p>
+            <a:br>
+              <a:rPr lang="es-ES" b="0" dirty="0">
+                <a:solidFill>
+                  <a:srgbClr val="D4D4D4"/>
+                </a:solidFill>
+                <a:effectLst/>
+                <a:highlight>
+                  <a:srgbClr val="1E1E1E"/>
+                </a:highlight>
+                <a:latin typeface="Dank Mono Regular" panose="00000509000000000000" pitchFamily="50" charset="0"/>
+              </a:rPr>
+            </a:br>
+            <a:r>
+              <a:rPr lang="es-ES" b="0" dirty="0">
+                <a:solidFill>
+                  <a:srgbClr val="D4D4D4"/>
+                </a:solidFill>
+                <a:effectLst/>
+                <a:highlight>
+                  <a:srgbClr val="1E1E1E"/>
+                </a:highlight>
+                <a:latin typeface="Dank Mono Regular" panose="00000509000000000000" pitchFamily="50" charset="0"/>
+              </a:rPr>
+              <a:t>Si bien las primeras versiones o </a:t>
+            </a:r>
+            <a:r>
+              <a:rPr lang="es-ES" b="0" dirty="0" err="1">
+                <a:solidFill>
+                  <a:srgbClr val="D4D4D4"/>
+                </a:solidFill>
+                <a:effectLst/>
+                <a:highlight>
+                  <a:srgbClr val="1E1E1E"/>
+                </a:highlight>
+                <a:latin typeface="Dank Mono Regular" panose="00000509000000000000" pitchFamily="50" charset="0"/>
+              </a:rPr>
+              <a:t>releases</a:t>
+            </a:r>
+            <a:r>
+              <a:rPr lang="es-ES" b="0" dirty="0">
+                <a:solidFill>
+                  <a:srgbClr val="D4D4D4"/>
+                </a:solidFill>
+                <a:effectLst/>
+                <a:highlight>
+                  <a:srgbClr val="1E1E1E"/>
+                </a:highlight>
+                <a:latin typeface="Dank Mono Regular" panose="00000509000000000000" pitchFamily="50" charset="0"/>
+              </a:rPr>
+              <a:t> fueron un poco caóticas, menos regulares o más </a:t>
+            </a:r>
+            <a:r>
+              <a:rPr lang="es-ES" b="0" dirty="0" err="1">
+                <a:solidFill>
+                  <a:srgbClr val="D4D4D4"/>
+                </a:solidFill>
+                <a:effectLst/>
+                <a:highlight>
+                  <a:srgbClr val="1E1E1E"/>
+                </a:highlight>
+                <a:latin typeface="Dank Mono Regular" panose="00000509000000000000" pitchFamily="50" charset="0"/>
+              </a:rPr>
+              <a:t>organicas</a:t>
+            </a:r>
+            <a:r>
+              <a:rPr lang="es-ES" b="0" dirty="0">
+                <a:solidFill>
+                  <a:srgbClr val="D4D4D4"/>
+                </a:solidFill>
+                <a:effectLst/>
+                <a:highlight>
+                  <a:srgbClr val="1E1E1E"/>
+                </a:highlight>
+                <a:latin typeface="Dank Mono Regular" panose="00000509000000000000" pitchFamily="50" charset="0"/>
+              </a:rPr>
+              <a:t>, principalmente debido a que sucedieron a medida que se necesitaban nuevas características del lenguaje, a partir de 2015 se decidió estandarizar las </a:t>
+            </a:r>
+            <a:r>
+              <a:rPr lang="es-ES" b="0" dirty="0" err="1">
+                <a:solidFill>
+                  <a:srgbClr val="D4D4D4"/>
+                </a:solidFill>
+                <a:effectLst/>
+                <a:highlight>
+                  <a:srgbClr val="1E1E1E"/>
+                </a:highlight>
+                <a:latin typeface="Dank Mono Regular" panose="00000509000000000000" pitchFamily="50" charset="0"/>
+              </a:rPr>
+              <a:t>releases</a:t>
+            </a:r>
+            <a:r>
+              <a:rPr lang="es-ES" b="0" dirty="0">
+                <a:solidFill>
+                  <a:srgbClr val="D4D4D4"/>
+                </a:solidFill>
+                <a:effectLst/>
+                <a:highlight>
+                  <a:srgbClr val="1E1E1E"/>
+                </a:highlight>
+                <a:latin typeface="Dank Mono Regular" panose="00000509000000000000" pitchFamily="50" charset="0"/>
+              </a:rPr>
+              <a:t> y hacerlas anuales.</a:t>
+            </a:r>
+          </a:p>
+          <a:p>
+            <a:br>
+              <a:rPr lang="es-ES" b="0" dirty="0">
+                <a:solidFill>
+                  <a:srgbClr val="D4D4D4"/>
+                </a:solidFill>
+                <a:effectLst/>
+                <a:highlight>
+                  <a:srgbClr val="1E1E1E"/>
+                </a:highlight>
+                <a:latin typeface="Dank Mono Regular" panose="00000509000000000000" pitchFamily="50" charset="0"/>
+              </a:rPr>
+            </a:br>
+            <a:r>
+              <a:rPr lang="es-ES" b="0" dirty="0">
+                <a:solidFill>
+                  <a:srgbClr val="D4D4D4"/>
+                </a:solidFill>
+                <a:effectLst/>
+                <a:highlight>
+                  <a:srgbClr val="1E1E1E"/>
+                </a:highlight>
+                <a:latin typeface="Dank Mono Regular" panose="00000509000000000000" pitchFamily="50" charset="0"/>
+              </a:rPr>
+              <a:t>En este </a:t>
+            </a:r>
+            <a:r>
+              <a:rPr lang="es-ES" b="0" dirty="0" err="1">
+                <a:solidFill>
+                  <a:srgbClr val="D4D4D4"/>
+                </a:solidFill>
+                <a:effectLst/>
+                <a:highlight>
+                  <a:srgbClr val="1E1E1E"/>
+                </a:highlight>
+                <a:latin typeface="Dank Mono Regular" panose="00000509000000000000" pitchFamily="50" charset="0"/>
+              </a:rPr>
+              <a:t>proces</a:t>
+            </a:r>
+            <a:r>
+              <a:rPr lang="es-ES" b="0" dirty="0">
+                <a:solidFill>
+                  <a:srgbClr val="D4D4D4"/>
+                </a:solidFill>
+                <a:effectLst/>
+                <a:highlight>
+                  <a:srgbClr val="1E1E1E"/>
+                </a:highlight>
+                <a:latin typeface="Dank Mono Regular" panose="00000509000000000000" pitchFamily="50" charset="0"/>
+              </a:rPr>
+              <a:t> estandarizado, existe un comité de expertos llamado TC39 que apadrina las nuevas propuestas que la comunidad sugiere (cualquiera de nosotros puede hacerlo) y las promociona en diferentes </a:t>
+            </a:r>
+            <a:r>
+              <a:rPr lang="es-ES" b="0" i="1" dirty="0" err="1">
+                <a:solidFill>
+                  <a:srgbClr val="D4D4D4"/>
+                </a:solidFill>
+                <a:effectLst/>
+                <a:highlight>
+                  <a:srgbClr val="1E1E1E"/>
+                </a:highlight>
+                <a:latin typeface="Dank Mono Regular" panose="00000509000000000000" pitchFamily="50" charset="0"/>
+              </a:rPr>
+              <a:t>stages</a:t>
+            </a:r>
+            <a:r>
+              <a:rPr lang="es-ES" b="0" dirty="0">
+                <a:solidFill>
+                  <a:srgbClr val="D4D4D4"/>
+                </a:solidFill>
+                <a:effectLst/>
+                <a:highlight>
+                  <a:srgbClr val="1E1E1E"/>
+                </a:highlight>
+                <a:latin typeface="Dank Mono Regular" panose="00000509000000000000" pitchFamily="50" charset="0"/>
+              </a:rPr>
+              <a:t> del 1 al 4 en función del grado de madurez. De modo que si una nueva característica alcanza el </a:t>
+            </a:r>
+            <a:r>
+              <a:rPr lang="es-ES" b="0" i="1" dirty="0" err="1">
+                <a:solidFill>
+                  <a:srgbClr val="D4D4D4"/>
+                </a:solidFill>
+                <a:effectLst/>
+                <a:highlight>
+                  <a:srgbClr val="1E1E1E"/>
+                </a:highlight>
+                <a:latin typeface="Dank Mono Regular" panose="00000509000000000000" pitchFamily="50" charset="0"/>
+              </a:rPr>
+              <a:t>stage</a:t>
+            </a:r>
+            <a:r>
+              <a:rPr lang="es-ES" b="0" dirty="0">
+                <a:solidFill>
+                  <a:srgbClr val="D4D4D4"/>
+                </a:solidFill>
+                <a:effectLst/>
+                <a:highlight>
+                  <a:srgbClr val="1E1E1E"/>
+                </a:highlight>
+                <a:latin typeface="Dank Mono Regular" panose="00000509000000000000" pitchFamily="50" charset="0"/>
+              </a:rPr>
+              <a:t> 4 significa que va a ser liberada con la siguiente </a:t>
+            </a:r>
+            <a:r>
+              <a:rPr lang="es-ES" b="0" dirty="0" err="1">
+                <a:solidFill>
+                  <a:srgbClr val="D4D4D4"/>
+                </a:solidFill>
+                <a:effectLst/>
+                <a:highlight>
+                  <a:srgbClr val="1E1E1E"/>
+                </a:highlight>
+                <a:latin typeface="Dank Mono Regular" panose="00000509000000000000" pitchFamily="50" charset="0"/>
+              </a:rPr>
+              <a:t>release</a:t>
+            </a:r>
+            <a:r>
+              <a:rPr lang="es-ES" b="0" dirty="0">
+                <a:solidFill>
+                  <a:srgbClr val="D4D4D4"/>
+                </a:solidFill>
+                <a:effectLst/>
+                <a:highlight>
+                  <a:srgbClr val="1E1E1E"/>
+                </a:highlight>
+                <a:latin typeface="Dank Mono Regular" panose="00000509000000000000" pitchFamily="50" charset="0"/>
+              </a:rPr>
+              <a:t> anual.</a:t>
+            </a:r>
+          </a:p>
+          <a:p>
+            <a:endParaRPr lang="es-ES" b="0" dirty="0">
+              <a:solidFill>
+                <a:srgbClr val="D4D4D4"/>
+              </a:solidFill>
+              <a:effectLst/>
+              <a:highlight>
+                <a:srgbClr val="1E1E1E"/>
+              </a:highlight>
+              <a:latin typeface="Dank Mono Regular" panose="00000509000000000000" pitchFamily="50" charset="0"/>
+            </a:endParaRPr>
+          </a:p>
+          <a:p>
+            <a:r>
+              <a:rPr lang="es-ES" b="0" dirty="0">
+                <a:solidFill>
+                  <a:srgbClr val="D4D4D4"/>
+                </a:solidFill>
+                <a:effectLst/>
+                <a:highlight>
+                  <a:srgbClr val="1E1E1E"/>
+                </a:highlight>
+                <a:latin typeface="Dank Mono Regular" panose="00000509000000000000" pitchFamily="50" charset="0"/>
+              </a:rPr>
+              <a:t>Lo cierto es que en cuanto a compatibilidad lo importante no es tanto la versión sino la característica en si. Es decir, cada nueva característica se lanza englobada en una </a:t>
+            </a:r>
+            <a:r>
+              <a:rPr lang="es-ES" b="0" dirty="0" err="1">
+                <a:solidFill>
+                  <a:srgbClr val="D4D4D4"/>
+                </a:solidFill>
+                <a:effectLst/>
+                <a:highlight>
+                  <a:srgbClr val="1E1E1E"/>
+                </a:highlight>
+                <a:latin typeface="Dank Mono Regular" panose="00000509000000000000" pitchFamily="50" charset="0"/>
+              </a:rPr>
+              <a:t>release</a:t>
+            </a:r>
+            <a:r>
+              <a:rPr lang="es-ES" b="0" dirty="0">
+                <a:solidFill>
+                  <a:srgbClr val="D4D4D4"/>
+                </a:solidFill>
+                <a:effectLst/>
+                <a:highlight>
+                  <a:srgbClr val="1E1E1E"/>
+                </a:highlight>
+                <a:latin typeface="Dank Mono Regular" panose="00000509000000000000" pitchFamily="50" charset="0"/>
+              </a:rPr>
+              <a:t>, esto es cierto, pero un navegador o plataforma podría soportar total o parcialmente dicha </a:t>
+            </a:r>
+            <a:r>
+              <a:rPr lang="es-ES" b="0" dirty="0" err="1">
+                <a:solidFill>
+                  <a:srgbClr val="D4D4D4"/>
+                </a:solidFill>
+                <a:effectLst/>
+                <a:highlight>
+                  <a:srgbClr val="1E1E1E"/>
+                </a:highlight>
+                <a:latin typeface="Dank Mono Regular" panose="00000509000000000000" pitchFamily="50" charset="0"/>
+              </a:rPr>
+              <a:t>release</a:t>
+            </a:r>
+            <a:r>
+              <a:rPr lang="es-ES" b="0" dirty="0">
+                <a:solidFill>
+                  <a:srgbClr val="D4D4D4"/>
+                </a:solidFill>
+                <a:effectLst/>
+                <a:highlight>
+                  <a:srgbClr val="1E1E1E"/>
+                </a:highlight>
+                <a:latin typeface="Dank Mono Regular" panose="00000509000000000000" pitchFamily="50" charset="0"/>
+              </a:rPr>
+              <a:t>. En la práctica, la compatibilidad se especifica por característica y no tanto por </a:t>
+            </a:r>
+            <a:r>
+              <a:rPr lang="es-ES" b="0" dirty="0" err="1">
+                <a:solidFill>
+                  <a:srgbClr val="D4D4D4"/>
+                </a:solidFill>
+                <a:effectLst/>
+                <a:highlight>
+                  <a:srgbClr val="1E1E1E"/>
+                </a:highlight>
+                <a:latin typeface="Dank Mono Regular" panose="00000509000000000000" pitchFamily="50" charset="0"/>
+              </a:rPr>
+              <a:t>release</a:t>
+            </a:r>
+            <a:r>
+              <a:rPr lang="es-ES" b="0" dirty="0">
+                <a:solidFill>
+                  <a:srgbClr val="D4D4D4"/>
+                </a:solidFill>
+                <a:effectLst/>
+                <a:highlight>
+                  <a:srgbClr val="1E1E1E"/>
+                </a:highlight>
+                <a:latin typeface="Dank Mono Regular" panose="00000509000000000000" pitchFamily="50" charset="0"/>
+              </a:rPr>
+              <a:t>. Por ello tenemos una matriz famosa de compatibilidad en donde se listan todas las características del lenguaje y los navegadores o </a:t>
+            </a:r>
+            <a:r>
+              <a:rPr lang="es-ES" b="0" dirty="0" err="1">
+                <a:solidFill>
+                  <a:srgbClr val="D4D4D4"/>
+                </a:solidFill>
+                <a:effectLst/>
+                <a:highlight>
+                  <a:srgbClr val="1E1E1E"/>
+                </a:highlight>
+                <a:latin typeface="Dank Mono Regular" panose="00000509000000000000" pitchFamily="50" charset="0"/>
+              </a:rPr>
+              <a:t>engines</a:t>
+            </a:r>
+            <a:r>
+              <a:rPr lang="es-ES" b="0" dirty="0">
+                <a:solidFill>
+                  <a:srgbClr val="D4D4D4"/>
+                </a:solidFill>
+                <a:effectLst/>
+                <a:highlight>
+                  <a:srgbClr val="1E1E1E"/>
+                </a:highlight>
+                <a:latin typeface="Dank Mono Regular" panose="00000509000000000000" pitchFamily="50" charset="0"/>
+              </a:rPr>
+              <a:t> (disponibles a </a:t>
+            </a:r>
+            <a:r>
+              <a:rPr lang="es-ES" b="0" dirty="0" err="1">
+                <a:solidFill>
+                  <a:srgbClr val="D4D4D4"/>
+                </a:solidFill>
+                <a:effectLst/>
+                <a:highlight>
+                  <a:srgbClr val="1E1E1E"/>
+                </a:highlight>
+                <a:latin typeface="Dank Mono Regular" panose="00000509000000000000" pitchFamily="50" charset="0"/>
+              </a:rPr>
+              <a:t>dia</a:t>
+            </a:r>
+            <a:r>
+              <a:rPr lang="es-ES" b="0" dirty="0">
+                <a:solidFill>
+                  <a:srgbClr val="D4D4D4"/>
+                </a:solidFill>
+                <a:effectLst/>
+                <a:highlight>
+                  <a:srgbClr val="1E1E1E"/>
+                </a:highlight>
+                <a:latin typeface="Dank Mono Regular" panose="00000509000000000000" pitchFamily="50" charset="0"/>
+              </a:rPr>
+              <a:t> de hoy) que las soportan. Como curiosidad, se dice que los </a:t>
+            </a:r>
+            <a:r>
+              <a:rPr lang="es-ES" b="0" i="1" dirty="0" err="1">
+                <a:solidFill>
+                  <a:srgbClr val="D4D4D4"/>
+                </a:solidFill>
+                <a:effectLst/>
+                <a:highlight>
+                  <a:srgbClr val="1E1E1E"/>
+                </a:highlight>
+                <a:latin typeface="Dank Mono Regular" panose="00000509000000000000" pitchFamily="50" charset="0"/>
+              </a:rPr>
+              <a:t>ever</a:t>
+            </a:r>
+            <a:r>
+              <a:rPr lang="es-ES" b="0" i="1" dirty="0">
+                <a:solidFill>
+                  <a:srgbClr val="D4D4D4"/>
+                </a:solidFill>
+                <a:effectLst/>
+                <a:highlight>
+                  <a:srgbClr val="1E1E1E"/>
+                </a:highlight>
+                <a:latin typeface="Dank Mono Regular" panose="00000509000000000000" pitchFamily="50" charset="0"/>
+              </a:rPr>
+              <a:t> </a:t>
+            </a:r>
+            <a:r>
+              <a:rPr lang="es-ES" b="0" i="1" dirty="0" err="1">
+                <a:solidFill>
+                  <a:srgbClr val="D4D4D4"/>
+                </a:solidFill>
+                <a:effectLst/>
+                <a:highlight>
+                  <a:srgbClr val="1E1E1E"/>
+                </a:highlight>
+                <a:latin typeface="Dank Mono Regular" panose="00000509000000000000" pitchFamily="50" charset="0"/>
+              </a:rPr>
+              <a:t>green</a:t>
+            </a:r>
+            <a:r>
+              <a:rPr lang="es-ES" b="0" i="1" dirty="0">
+                <a:solidFill>
+                  <a:srgbClr val="D4D4D4"/>
+                </a:solidFill>
+                <a:effectLst/>
+                <a:highlight>
+                  <a:srgbClr val="1E1E1E"/>
+                </a:highlight>
+                <a:latin typeface="Dank Mono Regular" panose="00000509000000000000" pitchFamily="50" charset="0"/>
+              </a:rPr>
+              <a:t> browsers</a:t>
+            </a:r>
+            <a:r>
+              <a:rPr lang="es-ES" b="0" dirty="0">
+                <a:solidFill>
+                  <a:srgbClr val="D4D4D4"/>
+                </a:solidFill>
+                <a:effectLst/>
+                <a:highlight>
+                  <a:srgbClr val="1E1E1E"/>
+                </a:highlight>
+                <a:latin typeface="Dank Mono Regular" panose="00000509000000000000" pitchFamily="50" charset="0"/>
+              </a:rPr>
+              <a:t> o simplemente </a:t>
+            </a:r>
+            <a:r>
+              <a:rPr lang="es-ES" b="0" i="1" dirty="0" err="1">
+                <a:solidFill>
+                  <a:srgbClr val="D4D4D4"/>
+                </a:solidFill>
+                <a:effectLst/>
+                <a:highlight>
+                  <a:srgbClr val="1E1E1E"/>
+                </a:highlight>
+                <a:latin typeface="Dank Mono Regular" panose="00000509000000000000" pitchFamily="50" charset="0"/>
+              </a:rPr>
+              <a:t>green</a:t>
+            </a:r>
+            <a:r>
+              <a:rPr lang="es-ES" b="0" i="1" dirty="0">
+                <a:solidFill>
+                  <a:srgbClr val="D4D4D4"/>
+                </a:solidFill>
+                <a:effectLst/>
+                <a:highlight>
+                  <a:srgbClr val="1E1E1E"/>
+                </a:highlight>
+                <a:latin typeface="Dank Mono Regular" panose="00000509000000000000" pitchFamily="50" charset="0"/>
+              </a:rPr>
+              <a:t> browsers</a:t>
+            </a:r>
+            <a:r>
+              <a:rPr lang="es-ES" b="0" dirty="0">
+                <a:solidFill>
+                  <a:srgbClr val="D4D4D4"/>
+                </a:solidFill>
+                <a:effectLst/>
+                <a:highlight>
+                  <a:srgbClr val="1E1E1E"/>
+                </a:highlight>
+                <a:latin typeface="Dank Mono Regular" panose="00000509000000000000" pitchFamily="50" charset="0"/>
+              </a:rPr>
+              <a:t> son aquellos que siempre están en verde, es decir, que soportan todas las características (no importa cuantas liberen, hacen un gran esfuerzo por mantenerse siempre actualizados).</a:t>
+            </a:r>
+          </a:p>
+          <a:p>
+            <a:br>
+              <a:rPr lang="es-ES" b="0" dirty="0">
+                <a:solidFill>
+                  <a:srgbClr val="D4D4D4"/>
+                </a:solidFill>
+                <a:effectLst/>
+                <a:highlight>
+                  <a:srgbClr val="1E1E1E"/>
+                </a:highlight>
+                <a:latin typeface="Dank Mono Regular" panose="00000509000000000000" pitchFamily="50" charset="0"/>
+              </a:rPr>
+            </a:br>
+            <a:r>
+              <a:rPr lang="es-ES" b="0" i="1" dirty="0">
+                <a:solidFill>
+                  <a:srgbClr val="D4D4D4"/>
+                </a:solidFill>
+                <a:effectLst/>
+                <a:highlight>
+                  <a:srgbClr val="1E1E1E"/>
+                </a:highlight>
+                <a:latin typeface="Dank Mono Regular" panose="00000509000000000000" pitchFamily="50" charset="0"/>
+              </a:rPr>
+              <a:t>&gt; De entre todas las </a:t>
+            </a:r>
+            <a:r>
+              <a:rPr lang="es-ES" b="0" i="1" dirty="0" err="1">
+                <a:solidFill>
+                  <a:srgbClr val="D4D4D4"/>
+                </a:solidFill>
+                <a:effectLst/>
+                <a:highlight>
+                  <a:srgbClr val="1E1E1E"/>
+                </a:highlight>
+                <a:latin typeface="Dank Mono Regular" panose="00000509000000000000" pitchFamily="50" charset="0"/>
+              </a:rPr>
+              <a:t>releases</a:t>
+            </a:r>
+            <a:r>
+              <a:rPr lang="es-ES" b="0" i="1" dirty="0">
+                <a:solidFill>
+                  <a:srgbClr val="D4D4D4"/>
+                </a:solidFill>
+                <a:effectLst/>
+                <a:highlight>
+                  <a:srgbClr val="1E1E1E"/>
+                </a:highlight>
+                <a:latin typeface="Dank Mono Regular" panose="00000509000000000000" pitchFamily="50" charset="0"/>
+              </a:rPr>
+              <a:t>, hay una de bastante importancia que solemos llamar el </a:t>
+            </a:r>
+            <a:r>
+              <a:rPr lang="es-ES" b="0" i="1" dirty="0" err="1">
+                <a:solidFill>
+                  <a:srgbClr val="D4D4D4"/>
+                </a:solidFill>
+                <a:effectLst/>
+                <a:highlight>
+                  <a:srgbClr val="1E1E1E"/>
+                </a:highlight>
+                <a:latin typeface="Dank Mono Regular" panose="00000509000000000000" pitchFamily="50" charset="0"/>
+              </a:rPr>
+              <a:t>baseline</a:t>
+            </a:r>
+            <a:r>
+              <a:rPr lang="es-ES" b="0" i="1" dirty="0">
+                <a:solidFill>
+                  <a:srgbClr val="D4D4D4"/>
+                </a:solidFill>
+                <a:effectLst/>
+                <a:highlight>
+                  <a:srgbClr val="1E1E1E"/>
+                </a:highlight>
+                <a:latin typeface="Dank Mono Regular" panose="00000509000000000000" pitchFamily="50" charset="0"/>
+              </a:rPr>
+              <a:t>. Se trata de la versión 5.0 o 5.1, y decimos que es el </a:t>
+            </a:r>
+            <a:r>
+              <a:rPr lang="es-ES" b="0" i="1" dirty="0" err="1">
+                <a:solidFill>
+                  <a:srgbClr val="D4D4D4"/>
+                </a:solidFill>
+                <a:effectLst/>
+                <a:highlight>
+                  <a:srgbClr val="1E1E1E"/>
+                </a:highlight>
+                <a:latin typeface="Dank Mono Regular" panose="00000509000000000000" pitchFamily="50" charset="0"/>
+              </a:rPr>
+              <a:t>baseline</a:t>
+            </a:r>
+            <a:r>
+              <a:rPr lang="es-ES" b="0" i="1" dirty="0">
+                <a:solidFill>
+                  <a:srgbClr val="D4D4D4"/>
+                </a:solidFill>
+                <a:effectLst/>
+                <a:highlight>
+                  <a:srgbClr val="1E1E1E"/>
+                </a:highlight>
+                <a:latin typeface="Dank Mono Regular" panose="00000509000000000000" pitchFamily="50" charset="0"/>
+              </a:rPr>
+              <a:t> porque todos los navegadores y plataformas que ejecutan JS, soportan todas las características contenidas hasta, al menos, dicho </a:t>
+            </a:r>
+            <a:r>
+              <a:rPr lang="es-ES" b="0" i="1" dirty="0" err="1">
+                <a:solidFill>
+                  <a:srgbClr val="D4D4D4"/>
+                </a:solidFill>
+                <a:effectLst/>
+                <a:highlight>
+                  <a:srgbClr val="1E1E1E"/>
+                </a:highlight>
+                <a:latin typeface="Dank Mono Regular" panose="00000509000000000000" pitchFamily="50" charset="0"/>
+              </a:rPr>
+              <a:t>baseline</a:t>
+            </a:r>
+            <a:r>
+              <a:rPr lang="es-ES" b="0" i="1" dirty="0">
+                <a:solidFill>
+                  <a:srgbClr val="D4D4D4"/>
+                </a:solidFill>
+                <a:effectLst/>
+                <a:highlight>
+                  <a:srgbClr val="1E1E1E"/>
+                </a:highlight>
+                <a:latin typeface="Dank Mono Regular" panose="00000509000000000000" pitchFamily="50" charset="0"/>
+              </a:rPr>
+              <a:t>.</a:t>
+            </a:r>
+          </a:p>
+          <a:p>
+            <a:endParaRPr lang="es-ES" b="0" i="1" dirty="0">
+              <a:solidFill>
+                <a:srgbClr val="D4D4D4"/>
+              </a:solidFill>
+              <a:effectLst/>
+              <a:highlight>
+                <a:srgbClr val="1E1E1E"/>
+              </a:highlight>
+              <a:latin typeface="Dank Mono Regular" panose="00000509000000000000" pitchFamily="50" charset="0"/>
+            </a:endParaRPr>
+          </a:p>
+          <a:p>
+            <a:r>
+              <a:rPr lang="es-ES" b="0" i="0" dirty="0">
+                <a:solidFill>
+                  <a:srgbClr val="D4D4D4"/>
+                </a:solidFill>
+                <a:effectLst/>
+                <a:highlight>
+                  <a:srgbClr val="1E1E1E"/>
+                </a:highlight>
+                <a:latin typeface="Dank Mono Regular" panose="00000509000000000000" pitchFamily="50" charset="0"/>
+              </a:rPr>
+              <a:t>Todo lo anterior al </a:t>
+            </a:r>
+            <a:r>
+              <a:rPr lang="es-ES" b="0" i="1" dirty="0" err="1">
+                <a:solidFill>
+                  <a:srgbClr val="D4D4D4"/>
+                </a:solidFill>
+                <a:effectLst/>
+                <a:highlight>
+                  <a:srgbClr val="1E1E1E"/>
+                </a:highlight>
+                <a:latin typeface="Dank Mono Regular" panose="00000509000000000000" pitchFamily="50" charset="0"/>
+              </a:rPr>
+              <a:t>baseline</a:t>
+            </a:r>
+            <a:r>
+              <a:rPr lang="es-ES" b="0" i="0" dirty="0">
+                <a:solidFill>
+                  <a:srgbClr val="D4D4D4"/>
+                </a:solidFill>
+                <a:effectLst/>
+                <a:highlight>
+                  <a:srgbClr val="1E1E1E"/>
+                </a:highlight>
+                <a:latin typeface="Dank Mono Regular" panose="00000509000000000000" pitchFamily="50" charset="0"/>
+              </a:rPr>
+              <a:t> podemos etiquetarlo como JS clásico, mientras que todo lo posterior se suele llamar JS moderno, o también </a:t>
+            </a:r>
+            <a:r>
+              <a:rPr lang="es-ES" b="0" i="0" dirty="0" err="1">
+                <a:solidFill>
+                  <a:srgbClr val="D4D4D4"/>
+                </a:solidFill>
+                <a:effectLst/>
+                <a:highlight>
+                  <a:srgbClr val="1E1E1E"/>
+                </a:highlight>
+                <a:latin typeface="Dank Mono Regular" panose="00000509000000000000" pitchFamily="50" charset="0"/>
+              </a:rPr>
+              <a:t>ESNext</a:t>
+            </a:r>
+            <a:r>
+              <a:rPr lang="es-ES" b="0" i="0" dirty="0">
+                <a:solidFill>
+                  <a:srgbClr val="D4D4D4"/>
+                </a:solidFill>
+                <a:effectLst/>
+                <a:highlight>
+                  <a:srgbClr val="1E1E1E"/>
+                </a:highlight>
+                <a:latin typeface="Dank Mono Regular" panose="00000509000000000000" pitchFamily="50" charset="0"/>
+              </a:rPr>
+              <a:t>. El motivo de tener un </a:t>
+            </a:r>
+            <a:r>
+              <a:rPr lang="es-ES" b="0" i="0" dirty="0" err="1">
+                <a:solidFill>
+                  <a:srgbClr val="D4D4D4"/>
+                </a:solidFill>
+                <a:effectLst/>
+                <a:highlight>
+                  <a:srgbClr val="1E1E1E"/>
+                </a:highlight>
+                <a:latin typeface="Dank Mono Regular" panose="00000509000000000000" pitchFamily="50" charset="0"/>
+              </a:rPr>
+              <a:t>baseline</a:t>
+            </a:r>
+            <a:r>
+              <a:rPr lang="es-ES" b="0" i="0" dirty="0">
+                <a:solidFill>
+                  <a:srgbClr val="D4D4D4"/>
+                </a:solidFill>
+                <a:effectLst/>
+                <a:highlight>
+                  <a:srgbClr val="1E1E1E"/>
+                </a:highlight>
+                <a:latin typeface="Dank Mono Regular" panose="00000509000000000000" pitchFamily="50" charset="0"/>
+              </a:rPr>
+              <a:t> es contar con una referencia de código que siempre será ejecutable sin errores, da igual en que navegador. Por otro lado, si como desarrollador quiero usar una característica que no está en el </a:t>
+            </a:r>
+            <a:r>
+              <a:rPr lang="es-ES" b="0" i="0" dirty="0" err="1">
+                <a:solidFill>
+                  <a:srgbClr val="D4D4D4"/>
+                </a:solidFill>
+                <a:effectLst/>
+                <a:highlight>
+                  <a:srgbClr val="1E1E1E"/>
+                </a:highlight>
+                <a:latin typeface="Dank Mono Regular" panose="00000509000000000000" pitchFamily="50" charset="0"/>
+              </a:rPr>
+              <a:t>baseline</a:t>
+            </a:r>
+            <a:r>
+              <a:rPr lang="es-ES" b="0" i="0" dirty="0">
+                <a:solidFill>
+                  <a:srgbClr val="D4D4D4"/>
+                </a:solidFill>
+                <a:effectLst/>
+                <a:highlight>
+                  <a:srgbClr val="1E1E1E"/>
+                </a:highlight>
+                <a:latin typeface="Dank Mono Regular" panose="00000509000000000000" pitchFamily="50" charset="0"/>
+              </a:rPr>
+              <a:t>, debo tener en cuenta que podría fallar en algún navegador que no la soporte. ¿Qué hacemos en tales casos? </a:t>
+            </a:r>
+            <a:r>
+              <a:rPr lang="es-ES" b="0" i="0" dirty="0" err="1">
+                <a:solidFill>
+                  <a:srgbClr val="D4D4D4"/>
+                </a:solidFill>
+                <a:effectLst/>
+                <a:highlight>
+                  <a:srgbClr val="1E1E1E"/>
+                </a:highlight>
+                <a:latin typeface="Dank Mono Regular" panose="00000509000000000000" pitchFamily="50" charset="0"/>
+              </a:rPr>
+              <a:t>Transpilar</a:t>
+            </a:r>
+            <a:r>
+              <a:rPr lang="es-ES" b="0" i="0" dirty="0">
+                <a:solidFill>
+                  <a:srgbClr val="D4D4D4"/>
+                </a:solidFill>
+                <a:effectLst/>
+                <a:highlight>
+                  <a:srgbClr val="1E1E1E"/>
+                </a:highlight>
+                <a:latin typeface="Dank Mono Regular" panose="00000509000000000000" pitchFamily="50" charset="0"/>
+              </a:rPr>
+              <a:t> para aplicar </a:t>
+            </a:r>
+            <a:r>
+              <a:rPr lang="es-ES" b="0" i="0" dirty="0" err="1">
+                <a:solidFill>
+                  <a:srgbClr val="D4D4D4"/>
+                </a:solidFill>
+                <a:effectLst/>
+                <a:highlight>
+                  <a:srgbClr val="1E1E1E"/>
+                </a:highlight>
+                <a:latin typeface="Dank Mono Regular" panose="00000509000000000000" pitchFamily="50" charset="0"/>
+              </a:rPr>
+              <a:t>polyfills</a:t>
+            </a:r>
+            <a:r>
+              <a:rPr lang="es-ES" b="0" i="0" dirty="0">
+                <a:solidFill>
+                  <a:srgbClr val="D4D4D4"/>
+                </a:solidFill>
+                <a:effectLst/>
+                <a:highlight>
+                  <a:srgbClr val="1E1E1E"/>
+                </a:highlight>
+                <a:latin typeface="Dank Mono Regular" panose="00000509000000000000" pitchFamily="50" charset="0"/>
+              </a:rPr>
+              <a:t> con los que compatibilizar mi código.</a:t>
+            </a:r>
+            <a:br>
+              <a:rPr lang="es-ES" b="0" i="0" dirty="0">
+                <a:solidFill>
+                  <a:srgbClr val="D4D4D4"/>
+                </a:solidFill>
+                <a:effectLst/>
+                <a:highlight>
+                  <a:srgbClr val="1E1E1E"/>
+                </a:highlight>
+                <a:latin typeface="Dank Mono Regular" panose="00000509000000000000" pitchFamily="50" charset="0"/>
+              </a:rPr>
+            </a:br>
+            <a:endParaRPr lang="es-ES" b="0" i="0" dirty="0">
+              <a:solidFill>
+                <a:srgbClr val="D4D4D4"/>
+              </a:solidFill>
+              <a:effectLst/>
+              <a:highlight>
+                <a:srgbClr val="1E1E1E"/>
+              </a:highlight>
+              <a:latin typeface="Dank Mono Regular" panose="00000509000000000000" pitchFamily="50" charset="0"/>
+            </a:endParaRPr>
+          </a:p>
+          <a:p>
+            <a:br>
+              <a:rPr lang="es-ES" b="0" dirty="0">
+                <a:solidFill>
+                  <a:srgbClr val="D4D4D4"/>
+                </a:solidFill>
+                <a:effectLst/>
+                <a:highlight>
+                  <a:srgbClr val="1E1E1E"/>
+                </a:highlight>
+                <a:latin typeface="Dank Mono Regular" panose="00000509000000000000" pitchFamily="50" charset="0"/>
+              </a:rPr>
+            </a:br>
+            <a:endParaRPr lang="es-ES" b="0" dirty="0">
+              <a:solidFill>
+                <a:srgbClr val="D4D4D4"/>
+              </a:solidFill>
+              <a:effectLst/>
+              <a:highlight>
+                <a:srgbClr val="1E1E1E"/>
+              </a:highlight>
+              <a:latin typeface="Dank Mono Regular" panose="00000509000000000000" pitchFamily="50" charset="0"/>
+            </a:endParaRPr>
+          </a:p>
+          <a:p>
+            <a:br>
+              <a:rPr lang="es-ES" b="0" dirty="0">
+                <a:solidFill>
+                  <a:srgbClr val="D4D4D4"/>
+                </a:solidFill>
+                <a:effectLst/>
+                <a:highlight>
+                  <a:srgbClr val="1E1E1E"/>
+                </a:highlight>
+                <a:latin typeface="Dank Mono Regular" panose="00000509000000000000" pitchFamily="50" charset="0"/>
+              </a:rPr>
+            </a:br>
+            <a:endParaRPr lang="es-ES" b="0" dirty="0">
+              <a:solidFill>
+                <a:srgbClr val="D4D4D4"/>
+              </a:solidFill>
+              <a:effectLst/>
+              <a:highlight>
+                <a:srgbClr val="1E1E1E"/>
+              </a:highlight>
+              <a:latin typeface="Dank Mono Regular" panose="00000509000000000000" pitchFamily="50" charset="0"/>
+            </a:endParaRPr>
+          </a:p>
+          <a:p>
+            <a:endParaRPr lang="es-ES" dirty="0"/>
+          </a:p>
+        </p:txBody>
+      </p:sp>
+    </p:spTree>
+    <p:extLst>
+      <p:ext uri="{BB962C8B-B14F-4D97-AF65-F5344CB8AC3E}">
+        <p14:creationId xmlns:p14="http://schemas.microsoft.com/office/powerpoint/2010/main" val="1189325127"/>
+      </p:ext>
+    </p:extLst>
+  </p:cSld>
+  <p:clrMapOvr>
+    <a:masterClrMapping/>
+  </p:clrMapOvr>
+</p:notes>
+</file>
+
+<file path=ppt/notesSlides/notesSlide7.xml><?xml version="1.0" encoding="utf-8"?>
+<p:notes xmlns:a="http://schemas.openxmlformats.org/drawingml/2006/main" xmlns:r="http://schemas.openxmlformats.org/officeDocument/2006/relationships" xmlns:p="http://schemas.openxmlformats.org/presentationml/2006/main">
+  <p:cSld>
+    <p:spTree>
+      <p:nvGrpSpPr>
+        <p:cNvPr id="1" name=""/>
+        <p:cNvGrpSpPr/>
+        <p:nvPr/>
+      </p:nvGrpSpPr>
+      <p:grpSpPr>
+        <a:xfrm>
+          <a:off x="0" y="0"/>
+          <a:ext cx="0" cy="0"/>
+          <a:chOff x="0" y="0"/>
+          <a:chExt cx="0" cy="0"/>
+        </a:xfrm>
+      </p:grpSpPr>
+      <p:sp>
+        <p:nvSpPr>
+          <p:cNvPr id="2" name="Marcador de imagen de diapositiva 1"/>
+          <p:cNvSpPr>
+            <a:spLocks noGrp="1" noRot="1" noChangeAspect="1"/>
+          </p:cNvSpPr>
+          <p:nvPr>
+            <p:ph type="sldImg"/>
+          </p:nvPr>
+        </p:nvSpPr>
+        <p:spPr>
+          <a:xfrm>
+            <a:off x="381000" y="685800"/>
+            <a:ext cx="6096000" cy="3429000"/>
+          </a:xfrm>
+        </p:spPr>
+      </p:sp>
+      <p:sp>
+        <p:nvSpPr>
+          <p:cNvPr id="3" name="Marcador de notas 2"/>
+          <p:cNvSpPr>
+            <a:spLocks noGrp="1"/>
+          </p:cNvSpPr>
+          <p:nvPr>
+            <p:ph type="body" idx="1"/>
+          </p:nvPr>
+        </p:nvSpPr>
+        <p:spPr/>
+        <p:txBody>
+          <a:bodyPr/>
+          <a:lstStyle/>
+          <a:p>
+            <a:r>
+              <a:rPr lang="es-ES" dirty="0"/>
+              <a:t>Esta </a:t>
+            </a:r>
+            <a:r>
+              <a:rPr lang="es-ES" i="1" dirty="0" err="1"/>
+              <a:t>slide</a:t>
+            </a:r>
+            <a:r>
+              <a:rPr lang="es-ES" dirty="0"/>
+              <a:t> se entiende mucho mejor con un ejemplo:</a:t>
+            </a:r>
+            <a:br>
+              <a:rPr lang="es-ES" dirty="0"/>
+            </a:br>
+            <a:br>
+              <a:rPr lang="es-ES" dirty="0"/>
+            </a:br>
+            <a:r>
+              <a:rPr lang="es-ES" dirty="0"/>
+              <a:t>“Supongamos que somos desarrolladores y queremos usar el nuevo, flamante y recién liberado operador que nos va a hacer la vida mucho más sencilla en nuestro código. Pero sabemos que si lo utilizamos, podría haber navegadores que peten al ejecutar nuestra web, puesto que no soportan dicho operador. ¿Qué hacemos? ¿Dejamos de usar algo que nos interesa para que el usuario no experimente problemas en su navegador antiguo? ¿O miramos para nosotros, trabajamos con lo nuevo y que le den al usuario? Pues ni una cosa ni la otra.”</a:t>
+            </a:r>
+            <a:br>
+              <a:rPr lang="es-ES" dirty="0"/>
+            </a:br>
+            <a:br>
+              <a:rPr lang="es-ES" dirty="0"/>
+            </a:br>
+            <a:r>
+              <a:rPr lang="es-ES" dirty="0"/>
+              <a:t>- Como desarrolladores nos interesa maximizar nuestra productividad y calidad de código. Deberíamos contar con las últimas novedades del lenguaje que nos permitirán ser más eficientes y efectivos.</a:t>
+            </a:r>
+            <a:br>
+              <a:rPr lang="es-ES" dirty="0"/>
+            </a:br>
+            <a:r>
+              <a:rPr lang="es-ES" dirty="0"/>
+              <a:t>- Como usuarios, nos interesa que toda aplicación que ejecutemos en nuestro entorno (navegador, dispositivo, plataforma) tenga un código suficientemente compatible para no experimentar errores ni malfuncionamiento.</a:t>
+            </a:r>
+            <a:br>
+              <a:rPr lang="es-ES" dirty="0"/>
+            </a:br>
+            <a:br>
+              <a:rPr lang="es-ES" dirty="0"/>
+            </a:br>
+            <a:r>
+              <a:rPr lang="es-ES" dirty="0"/>
+              <a:t>LA SOLUCIÓN: </a:t>
+            </a:r>
+            <a:r>
+              <a:rPr lang="es-ES" dirty="0" err="1"/>
+              <a:t>Transpilar</a:t>
+            </a:r>
+            <a:r>
+              <a:rPr lang="es-ES" dirty="0"/>
+              <a:t> el código durante su desarrollo para compatibilizarlo. Las diferencias con la compilación mencionada anteriormente radica fundamentalmente en:</a:t>
+            </a:r>
+            <a:br>
+              <a:rPr lang="es-ES" dirty="0"/>
+            </a:br>
+            <a:r>
+              <a:rPr lang="es-ES" dirty="0"/>
+              <a:t>- En la compilación, a partir de un lenguaje de alto nivel se obtiene como resultado otro de bajo nivel, adaptado a la arquitectura o plataforma donde va a ser ejecutado.</a:t>
+            </a:r>
+          </a:p>
+          <a:p>
+            <a:r>
+              <a:rPr lang="es-ES" dirty="0"/>
+              <a:t>- En la </a:t>
+            </a:r>
+            <a:r>
+              <a:rPr lang="es-ES" dirty="0" err="1"/>
+              <a:t>transpilación</a:t>
+            </a:r>
+            <a:r>
+              <a:rPr lang="es-ES" dirty="0"/>
+              <a:t>, sin embargo, la entrada y la salida sigue siendo un lenguaje de alto nivel (normalmente el mismo) que simplemente es transformado en el proceso.</a:t>
+            </a:r>
+            <a:br>
+              <a:rPr lang="es-ES" dirty="0"/>
+            </a:br>
+            <a:r>
+              <a:rPr lang="es-ES" dirty="0"/>
+              <a:t>Esa transformación, en nuestro caso, consiste en reemplazar el código que contiene características modernas o candidatas a no ser compatibles, con código equivalente (es decir, que haga lo mismo) escrito con características que si son compatibles. A esos “parches” de código que nos proporcionan </a:t>
+            </a:r>
+            <a:r>
+              <a:rPr lang="es-ES" u="none" dirty="0"/>
+              <a:t>compatibilidad</a:t>
+            </a:r>
+            <a:r>
+              <a:rPr lang="es-ES" dirty="0"/>
+              <a:t> los llamamos </a:t>
+            </a:r>
+            <a:r>
+              <a:rPr lang="es-ES" i="1" dirty="0" err="1"/>
+              <a:t>polyfills</a:t>
+            </a:r>
+            <a:r>
+              <a:rPr lang="es-ES" dirty="0"/>
+              <a:t>.</a:t>
+            </a:r>
+          </a:p>
+        </p:txBody>
+      </p:sp>
+    </p:spTree>
+    <p:extLst>
+      <p:ext uri="{BB962C8B-B14F-4D97-AF65-F5344CB8AC3E}">
+        <p14:creationId xmlns:p14="http://schemas.microsoft.com/office/powerpoint/2010/main" val="791509554"/>
       </p:ext>
     </p:extLst>
   </p:cSld>
@@ -2380,7 +5528,7 @@
           </a:ln>
           <a:extLst>
             <a:ext uri="{C572A759-6A51-4108-AA02-DFA0A04FC94B}">
-              <ma14:wrappingTextBoxFlag xmlns="" xmlns:m="http://schemas.openxmlformats.org/officeDocument/2006/math" xmlns:a14="http://schemas.microsoft.com/office/drawing/2010/main" xmlns:ma14="http://schemas.microsoft.com/office/mac/drawingml/2011/main" val="1"/>
+              <ma14:wrappingTextBoxFlag xmlns:ma14="http://schemas.microsoft.com/office/mac/drawingml/2011/main" xmlns:a14="http://schemas.microsoft.com/office/drawing/2010/main" xmlns:m="http://schemas.openxmlformats.org/officeDocument/2006/math" xmlns="" val="1"/>
             </a:ext>
           </a:extLst>
         </p:spPr>
@@ -2419,7 +5567,7 @@
           </a:ln>
           <a:extLst>
             <a:ext uri="{C572A759-6A51-4108-AA02-DFA0A04FC94B}">
-              <ma14:wrappingTextBoxFlag xmlns="" xmlns:m="http://schemas.openxmlformats.org/officeDocument/2006/math" xmlns:a14="http://schemas.microsoft.com/office/drawing/2010/main" xmlns:ma14="http://schemas.microsoft.com/office/mac/drawingml/2011/main" val="1"/>
+              <ma14:wrappingTextBoxFlag xmlns:ma14="http://schemas.microsoft.com/office/mac/drawingml/2011/main" xmlns:a14="http://schemas.microsoft.com/office/drawing/2010/main" xmlns:m="http://schemas.openxmlformats.org/officeDocument/2006/math" xmlns="" val="1"/>
             </a:ext>
           </a:extLst>
         </p:spPr>
@@ -3377,7 +6525,7 @@
           </a:ln>
           <a:extLst>
             <a:ext uri="{C572A759-6A51-4108-AA02-DFA0A04FC94B}">
-              <ma14:wrappingTextBoxFlag xmlns="" xmlns:m="http://schemas.openxmlformats.org/officeDocument/2006/math" xmlns:a14="http://schemas.microsoft.com/office/drawing/2010/main" xmlns:ma14="http://schemas.microsoft.com/office/mac/drawingml/2011/main" val="1"/>
+              <ma14:wrappingTextBoxFlag xmlns:ma14="http://schemas.microsoft.com/office/mac/drawingml/2011/main" xmlns:a14="http://schemas.microsoft.com/office/drawing/2010/main" xmlns:m="http://schemas.openxmlformats.org/officeDocument/2006/math" xmlns="" val="1"/>
             </a:ext>
           </a:extLst>
         </p:spPr>
@@ -3427,7 +6575,7 @@
           </a:ln>
           <a:extLst>
             <a:ext uri="{C572A759-6A51-4108-AA02-DFA0A04FC94B}">
-              <ma14:wrappingTextBoxFlag xmlns="" xmlns:m="http://schemas.openxmlformats.org/officeDocument/2006/math" xmlns:a14="http://schemas.microsoft.com/office/drawing/2010/main" xmlns:ma14="http://schemas.microsoft.com/office/mac/drawingml/2011/main" val="1"/>
+              <ma14:wrappingTextBoxFlag xmlns:ma14="http://schemas.microsoft.com/office/mac/drawingml/2011/main" xmlns:a14="http://schemas.microsoft.com/office/drawing/2010/main" xmlns:m="http://schemas.openxmlformats.org/officeDocument/2006/math" xmlns="" val="1"/>
             </a:ext>
           </a:extLst>
         </p:spPr>
@@ -3716,7 +6864,7 @@
             <a:effectLst/>
             <a:extLst>
               <a:ext uri="{C572A759-6A51-4108-AA02-DFA0A04FC94B}">
-                <ma14:wrappingTextBoxFlag xmlns="" xmlns:m="http://schemas.openxmlformats.org/officeDocument/2006/math" xmlns:a14="http://schemas.microsoft.com/office/drawing/2010/main" xmlns:ma14="http://schemas.microsoft.com/office/mac/drawingml/2011/main" val="1"/>
+                <ma14:wrappingTextBoxFlag xmlns:ma14="http://schemas.microsoft.com/office/mac/drawingml/2011/main" xmlns:a14="http://schemas.microsoft.com/office/drawing/2010/main" xmlns:m="http://schemas.openxmlformats.org/officeDocument/2006/math" xmlns="" val="1"/>
               </a:ext>
             </a:extLst>
           </p:spPr>
@@ -3766,7 +6914,7 @@
             <a:effectLst/>
             <a:extLst>
               <a:ext uri="{C572A759-6A51-4108-AA02-DFA0A04FC94B}">
-                <ma14:wrappingTextBoxFlag xmlns="" xmlns:m="http://schemas.openxmlformats.org/officeDocument/2006/math" xmlns:a14="http://schemas.microsoft.com/office/drawing/2010/main" xmlns:ma14="http://schemas.microsoft.com/office/mac/drawingml/2011/main" val="1"/>
+                <ma14:wrappingTextBoxFlag xmlns:ma14="http://schemas.microsoft.com/office/mac/drawingml/2011/main" xmlns:a14="http://schemas.microsoft.com/office/drawing/2010/main" xmlns:m="http://schemas.openxmlformats.org/officeDocument/2006/math" xmlns="" val="1"/>
               </a:ext>
             </a:extLst>
           </p:spPr>
@@ -3816,7 +6964,7 @@
             <a:effectLst/>
             <a:extLst>
               <a:ext uri="{C572A759-6A51-4108-AA02-DFA0A04FC94B}">
-                <ma14:wrappingTextBoxFlag xmlns="" xmlns:m="http://schemas.openxmlformats.org/officeDocument/2006/math" xmlns:a14="http://schemas.microsoft.com/office/drawing/2010/main" xmlns:ma14="http://schemas.microsoft.com/office/mac/drawingml/2011/main" val="1"/>
+                <ma14:wrappingTextBoxFlag xmlns:ma14="http://schemas.microsoft.com/office/mac/drawingml/2011/main" xmlns:a14="http://schemas.microsoft.com/office/drawing/2010/main" xmlns:m="http://schemas.openxmlformats.org/officeDocument/2006/math" xmlns="" val="1"/>
               </a:ext>
             </a:extLst>
           </p:spPr>
@@ -3866,7 +7014,7 @@
             <a:effectLst/>
             <a:extLst>
               <a:ext uri="{C572A759-6A51-4108-AA02-DFA0A04FC94B}">
-                <ma14:wrappingTextBoxFlag xmlns="" xmlns:m="http://schemas.openxmlformats.org/officeDocument/2006/math" xmlns:a14="http://schemas.microsoft.com/office/drawing/2010/main" xmlns:ma14="http://schemas.microsoft.com/office/mac/drawingml/2011/main" val="1"/>
+                <ma14:wrappingTextBoxFlag xmlns:ma14="http://schemas.microsoft.com/office/mac/drawingml/2011/main" xmlns:a14="http://schemas.microsoft.com/office/drawing/2010/main" xmlns:m="http://schemas.openxmlformats.org/officeDocument/2006/math" xmlns="" val="1"/>
               </a:ext>
             </a:extLst>
           </p:spPr>
@@ -4037,13 +7185,13 @@
           <p:nvPr/>
         </p:nvPicPr>
         <p:blipFill>
-          <a:blip r:embed="rId2">
+          <a:blip r:embed="rId3">
             <a:extLst>
               <a:ext uri="{28A0092B-C50C-407E-A947-70E740481C1C}">
                 <a14:useLocalDpi xmlns:a14="http://schemas.microsoft.com/office/drawing/2010/main" val="0"/>
               </a:ext>
               <a:ext uri="{96DAC541-7B7A-43D3-8B79-37D633B846F1}">
-                <asvg:svgBlip xmlns:asvg="http://schemas.microsoft.com/office/drawing/2016/SVG/main" r:embed="rId3"/>
+                <asvg:svgBlip xmlns:asvg="http://schemas.microsoft.com/office/drawing/2016/SVG/main" r:embed="rId4"/>
               </a:ext>
             </a:extLst>
           </a:blip>
@@ -4169,7 +7317,7 @@
               <a:effectLst/>
               <a:extLst>
                 <a:ext uri="{C572A759-6A51-4108-AA02-DFA0A04FC94B}">
-                  <ma14:wrappingTextBoxFlag xmlns="" xmlns:m="http://schemas.openxmlformats.org/officeDocument/2006/math" xmlns:a14="http://schemas.microsoft.com/office/drawing/2010/main" xmlns:ma14="http://schemas.microsoft.com/office/mac/drawingml/2011/main" val="1"/>
+                  <ma14:wrappingTextBoxFlag xmlns:ma14="http://schemas.microsoft.com/office/mac/drawingml/2011/main" xmlns:a14="http://schemas.microsoft.com/office/drawing/2010/main" xmlns:m="http://schemas.openxmlformats.org/officeDocument/2006/math" xmlns="" val="1"/>
                 </a:ext>
               </a:extLst>
             </p:spPr>
@@ -4300,7 +7448,7 @@
                 <a:effectLst/>
                 <a:extLst>
                   <a:ext uri="{C572A759-6A51-4108-AA02-DFA0A04FC94B}">
-                    <ma14:wrappingTextBoxFlag xmlns="" xmlns:m="http://schemas.openxmlformats.org/officeDocument/2006/math" xmlns:a14="http://schemas.microsoft.com/office/drawing/2010/main" xmlns:ma14="http://schemas.microsoft.com/office/mac/drawingml/2011/main" val="1"/>
+                    <ma14:wrappingTextBoxFlag xmlns:ma14="http://schemas.microsoft.com/office/mac/drawingml/2011/main" xmlns:a14="http://schemas.microsoft.com/office/drawing/2010/main" xmlns:m="http://schemas.openxmlformats.org/officeDocument/2006/math" xmlns="" val="1"/>
                   </a:ext>
                 </a:extLst>
               </p:spPr>
@@ -4344,7 +7492,7 @@
               <p:nvPr/>
             </p:nvPicPr>
             <p:blipFill>
-              <a:blip r:embed="rId4" cstate="print">
+              <a:blip r:embed="rId5" cstate="print">
                 <a:extLst>
                   <a:ext uri="{28A0092B-C50C-407E-A947-70E740481C1C}">
                     <a14:useLocalDpi xmlns:a14="http://schemas.microsoft.com/office/drawing/2010/main" val="0"/>
@@ -4490,7 +7638,7 @@
               <a:effectLst/>
               <a:extLst>
                 <a:ext uri="{C572A759-6A51-4108-AA02-DFA0A04FC94B}">
-                  <ma14:wrappingTextBoxFlag xmlns="" xmlns:m="http://schemas.openxmlformats.org/officeDocument/2006/math" xmlns:a14="http://schemas.microsoft.com/office/drawing/2010/main" xmlns:ma14="http://schemas.microsoft.com/office/mac/drawingml/2011/main" val="1"/>
+                  <ma14:wrappingTextBoxFlag xmlns:ma14="http://schemas.microsoft.com/office/mac/drawingml/2011/main" xmlns:a14="http://schemas.microsoft.com/office/drawing/2010/main" xmlns:m="http://schemas.openxmlformats.org/officeDocument/2006/math" xmlns="" val="1"/>
                 </a:ext>
               </a:extLst>
             </p:spPr>
@@ -4621,7 +7769,7 @@
                 <a:effectLst/>
                 <a:extLst>
                   <a:ext uri="{C572A759-6A51-4108-AA02-DFA0A04FC94B}">
-                    <ma14:wrappingTextBoxFlag xmlns="" xmlns:m="http://schemas.openxmlformats.org/officeDocument/2006/math" xmlns:a14="http://schemas.microsoft.com/office/drawing/2010/main" xmlns:ma14="http://schemas.microsoft.com/office/mac/drawingml/2011/main" val="1"/>
+                    <ma14:wrappingTextBoxFlag xmlns:ma14="http://schemas.microsoft.com/office/mac/drawingml/2011/main" xmlns:a14="http://schemas.microsoft.com/office/drawing/2010/main" xmlns:m="http://schemas.openxmlformats.org/officeDocument/2006/math" xmlns="" val="1"/>
                   </a:ext>
                 </a:extLst>
               </p:spPr>
@@ -4666,7 +7814,7 @@
               <p:nvPr/>
             </p:nvPicPr>
             <p:blipFill>
-              <a:blip r:embed="rId5" cstate="print">
+              <a:blip r:embed="rId6" cstate="print">
                 <a:extLst>
                   <a:ext uri="{28A0092B-C50C-407E-A947-70E740481C1C}">
                     <a14:useLocalDpi xmlns:a14="http://schemas.microsoft.com/office/drawing/2010/main" val="0"/>
@@ -4812,7 +7960,7 @@
               <a:effectLst/>
               <a:extLst>
                 <a:ext uri="{C572A759-6A51-4108-AA02-DFA0A04FC94B}">
-                  <ma14:wrappingTextBoxFlag xmlns="" xmlns:m="http://schemas.openxmlformats.org/officeDocument/2006/math" xmlns:a14="http://schemas.microsoft.com/office/drawing/2010/main" xmlns:ma14="http://schemas.microsoft.com/office/mac/drawingml/2011/main" val="1"/>
+                  <ma14:wrappingTextBoxFlag xmlns:ma14="http://schemas.microsoft.com/office/mac/drawingml/2011/main" xmlns:a14="http://schemas.microsoft.com/office/drawing/2010/main" xmlns:m="http://schemas.openxmlformats.org/officeDocument/2006/math" xmlns="" val="1"/>
                 </a:ext>
               </a:extLst>
             </p:spPr>
@@ -4945,7 +8093,7 @@
                 <a:effectLst/>
                 <a:extLst>
                   <a:ext uri="{C572A759-6A51-4108-AA02-DFA0A04FC94B}">
-                    <ma14:wrappingTextBoxFlag xmlns="" xmlns:m="http://schemas.openxmlformats.org/officeDocument/2006/math" xmlns:a14="http://schemas.microsoft.com/office/drawing/2010/main" xmlns:ma14="http://schemas.microsoft.com/office/mac/drawingml/2011/main" val="1"/>
+                    <ma14:wrappingTextBoxFlag xmlns:ma14="http://schemas.microsoft.com/office/mac/drawingml/2011/main" xmlns:a14="http://schemas.microsoft.com/office/drawing/2010/main" xmlns:m="http://schemas.openxmlformats.org/officeDocument/2006/math" xmlns="" val="1"/>
                   </a:ext>
                 </a:extLst>
               </p:spPr>
@@ -4990,7 +8138,7 @@
               <p:nvPr/>
             </p:nvPicPr>
             <p:blipFill>
-              <a:blip r:embed="rId6" cstate="print">
+              <a:blip r:embed="rId7" cstate="print">
                 <a:extLst>
                   <a:ext uri="{28A0092B-C50C-407E-A947-70E740481C1C}">
                     <a14:useLocalDpi xmlns:a14="http://schemas.microsoft.com/office/drawing/2010/main" val="0"/>
@@ -5262,7 +8410,7 @@
           </a:ln>
           <a:extLst>
             <a:ext uri="{C572A759-6A51-4108-AA02-DFA0A04FC94B}">
-              <ma14:wrappingTextBoxFlag xmlns="" xmlns:m="http://schemas.openxmlformats.org/officeDocument/2006/math" xmlns:a14="http://schemas.microsoft.com/office/drawing/2010/main" xmlns:ma14="http://schemas.microsoft.com/office/mac/drawingml/2011/main" val="1"/>
+              <ma14:wrappingTextBoxFlag xmlns:ma14="http://schemas.microsoft.com/office/mac/drawingml/2011/main" xmlns:a14="http://schemas.microsoft.com/office/drawing/2010/main" xmlns:m="http://schemas.openxmlformats.org/officeDocument/2006/math" xmlns="" val="1"/>
             </a:ext>
           </a:extLst>
         </p:spPr>
@@ -5411,7 +8559,7 @@
               <a:effectLst/>
               <a:extLst>
                 <a:ext uri="{C572A759-6A51-4108-AA02-DFA0A04FC94B}">
-                  <ma14:wrappingTextBoxFlag xmlns:ma14="http://schemas.microsoft.com/office/mac/drawingml/2011/main" xmlns:a14="http://schemas.microsoft.com/office/drawing/2010/main" xmlns:m="http://schemas.openxmlformats.org/officeDocument/2006/math" xmlns="" val="1"/>
+                  <ma14:wrappingTextBoxFlag xmlns="" xmlns:m="http://schemas.openxmlformats.org/officeDocument/2006/math" xmlns:a14="http://schemas.microsoft.com/office/drawing/2010/main" xmlns:ma14="http://schemas.microsoft.com/office/mac/drawingml/2011/main" val="1"/>
                 </a:ext>
               </a:extLst>
             </p:spPr>
@@ -5612,7 +8760,7 @@
                 <a:effectLst/>
                 <a:extLst>
                   <a:ext uri="{C572A759-6A51-4108-AA02-DFA0A04FC94B}">
-                    <ma14:wrappingTextBoxFlag xmlns:ma14="http://schemas.microsoft.com/office/mac/drawingml/2011/main" xmlns:a14="http://schemas.microsoft.com/office/drawing/2010/main" xmlns:m="http://schemas.openxmlformats.org/officeDocument/2006/math" xmlns="" val="1"/>
+                    <ma14:wrappingTextBoxFlag xmlns="" xmlns:m="http://schemas.openxmlformats.org/officeDocument/2006/math" xmlns:a14="http://schemas.microsoft.com/office/drawing/2010/main" xmlns:ma14="http://schemas.microsoft.com/office/mac/drawingml/2011/main" val="1"/>
                   </a:ext>
                 </a:extLst>
               </p:spPr>
@@ -5756,7 +8904,7 @@
                 <a:effectLst/>
                 <a:extLst>
                   <a:ext uri="{C572A759-6A51-4108-AA02-DFA0A04FC94B}">
-                    <ma14:wrappingTextBoxFlag xmlns:ma14="http://schemas.microsoft.com/office/mac/drawingml/2011/main" xmlns:a14="http://schemas.microsoft.com/office/drawing/2010/main" xmlns:m="http://schemas.openxmlformats.org/officeDocument/2006/math" xmlns="" val="1"/>
+                    <ma14:wrappingTextBoxFlag xmlns="" xmlns:m="http://schemas.openxmlformats.org/officeDocument/2006/math" xmlns:a14="http://schemas.microsoft.com/office/drawing/2010/main" xmlns:ma14="http://schemas.microsoft.com/office/mac/drawingml/2011/main" val="1"/>
                   </a:ext>
                 </a:extLst>
               </p:spPr>
@@ -5830,7 +8978,7 @@
             <p:nvPr/>
           </p:nvPicPr>
           <p:blipFill>
-            <a:blip r:embed="rId2" cstate="print">
+            <a:blip r:embed="rId3" cstate="print">
               <a:extLst>
                 <a:ext uri="{28A0092B-C50C-407E-A947-70E740481C1C}">
                   <a14:useLocalDpi xmlns:a14="http://schemas.microsoft.com/office/drawing/2010/main" val="0"/>
@@ -5980,7 +9128,7 @@
                 <a:effectLst/>
                 <a:extLst>
                   <a:ext uri="{C572A759-6A51-4108-AA02-DFA0A04FC94B}">
-                    <ma14:wrappingTextBoxFlag xmlns:ma14="http://schemas.microsoft.com/office/mac/drawingml/2011/main" xmlns:a14="http://schemas.microsoft.com/office/drawing/2010/main" xmlns:m="http://schemas.openxmlformats.org/officeDocument/2006/math" xmlns="" val="1"/>
+                    <ma14:wrappingTextBoxFlag xmlns="" xmlns:m="http://schemas.openxmlformats.org/officeDocument/2006/math" xmlns:a14="http://schemas.microsoft.com/office/drawing/2010/main" xmlns:ma14="http://schemas.microsoft.com/office/mac/drawingml/2011/main" val="1"/>
                   </a:ext>
                 </a:extLst>
               </p:spPr>
@@ -6132,7 +9280,7 @@
                   <a:effectLst/>
                   <a:extLst>
                     <a:ext uri="{C572A759-6A51-4108-AA02-DFA0A04FC94B}">
-                      <ma14:wrappingTextBoxFlag xmlns="" xmlns:m="http://schemas.openxmlformats.org/officeDocument/2006/math" xmlns:a14="http://schemas.microsoft.com/office/drawing/2010/main" xmlns:ma14="http://schemas.microsoft.com/office/mac/drawingml/2011/main" val="1"/>
+                      <ma14:wrappingTextBoxFlag xmlns:ma14="http://schemas.microsoft.com/office/mac/drawingml/2011/main" xmlns:a14="http://schemas.microsoft.com/office/drawing/2010/main" xmlns:m="http://schemas.openxmlformats.org/officeDocument/2006/math" xmlns="" val="1"/>
                     </a:ext>
                   </a:extLst>
                 </p:spPr>
@@ -6177,7 +9325,7 @@
                 <p:nvPr/>
               </p:nvPicPr>
               <p:blipFill>
-                <a:blip r:embed="rId3" cstate="print">
+                <a:blip r:embed="rId4" cstate="print">
                   <a:extLst>
                     <a:ext uri="{28A0092B-C50C-407E-A947-70E740481C1C}">
                       <a14:useLocalDpi xmlns:a14="http://schemas.microsoft.com/office/drawing/2010/main" val="0"/>
@@ -6330,7 +9478,7 @@
               <a:effectLst/>
               <a:extLst>
                 <a:ext uri="{C572A759-6A51-4108-AA02-DFA0A04FC94B}">
-                  <ma14:wrappingTextBoxFlag xmlns:ma14="http://schemas.microsoft.com/office/mac/drawingml/2011/main" xmlns:a14="http://schemas.microsoft.com/office/drawing/2010/main" xmlns:m="http://schemas.openxmlformats.org/officeDocument/2006/math" xmlns="" val="1"/>
+                  <ma14:wrappingTextBoxFlag xmlns="" xmlns:m="http://schemas.openxmlformats.org/officeDocument/2006/math" xmlns:a14="http://schemas.microsoft.com/office/drawing/2010/main" xmlns:ma14="http://schemas.microsoft.com/office/mac/drawingml/2011/main" val="1"/>
                 </a:ext>
               </a:extLst>
             </p:spPr>
@@ -6482,7 +9630,7 @@
                 <a:effectLst/>
                 <a:extLst>
                   <a:ext uri="{C572A759-6A51-4108-AA02-DFA0A04FC94B}">
-                    <ma14:wrappingTextBoxFlag xmlns="" xmlns:m="http://schemas.openxmlformats.org/officeDocument/2006/math" xmlns:a14="http://schemas.microsoft.com/office/drawing/2010/main" xmlns:ma14="http://schemas.microsoft.com/office/mac/drawingml/2011/main" val="1"/>
+                    <ma14:wrappingTextBoxFlag xmlns:ma14="http://schemas.microsoft.com/office/mac/drawingml/2011/main" xmlns:a14="http://schemas.microsoft.com/office/drawing/2010/main" xmlns:m="http://schemas.openxmlformats.org/officeDocument/2006/math" xmlns="" val="1"/>
                   </a:ext>
                 </a:extLst>
               </p:spPr>
@@ -6527,7 +9675,7 @@
               <p:nvPr/>
             </p:nvPicPr>
             <p:blipFill>
-              <a:blip r:embed="rId4" cstate="print">
+              <a:blip r:embed="rId5" cstate="print">
                 <a:extLst>
                   <a:ext uri="{28A0092B-C50C-407E-A947-70E740481C1C}">
                     <a14:useLocalDpi xmlns:a14="http://schemas.microsoft.com/office/drawing/2010/main" val="0"/>
@@ -6783,7 +9931,7 @@
           </a:ln>
           <a:extLst>
             <a:ext uri="{C572A759-6A51-4108-AA02-DFA0A04FC94B}">
-              <ma14:wrappingTextBoxFlag xmlns="" xmlns:m="http://schemas.openxmlformats.org/officeDocument/2006/math" xmlns:a14="http://schemas.microsoft.com/office/drawing/2010/main" xmlns:ma14="http://schemas.microsoft.com/office/mac/drawingml/2011/main" val="1"/>
+              <ma14:wrappingTextBoxFlag xmlns:ma14="http://schemas.microsoft.com/office/mac/drawingml/2011/main" xmlns:a14="http://schemas.microsoft.com/office/drawing/2010/main" xmlns:m="http://schemas.openxmlformats.org/officeDocument/2006/math" xmlns="" val="1"/>
             </a:ext>
           </a:extLst>
         </p:spPr>
@@ -6839,7 +9987,7 @@
           </a:ln>
           <a:extLst>
             <a:ext uri="{C572A759-6A51-4108-AA02-DFA0A04FC94B}">
-              <ma14:wrappingTextBoxFlag xmlns="" xmlns:m="http://schemas.openxmlformats.org/officeDocument/2006/math" xmlns:a14="http://schemas.microsoft.com/office/drawing/2010/main" xmlns:ma14="http://schemas.microsoft.com/office/mac/drawingml/2011/main" val="1"/>
+              <ma14:wrappingTextBoxFlag xmlns:ma14="http://schemas.microsoft.com/office/mac/drawingml/2011/main" xmlns:a14="http://schemas.microsoft.com/office/drawing/2010/main" xmlns:m="http://schemas.openxmlformats.org/officeDocument/2006/math" xmlns="" val="1"/>
             </a:ext>
           </a:extLst>
         </p:spPr>
@@ -6941,7 +10089,7 @@
           </a:ln>
           <a:extLst>
             <a:ext uri="{C572A759-6A51-4108-AA02-DFA0A04FC94B}">
-              <ma14:wrappingTextBoxFlag xmlns="" xmlns:m="http://schemas.openxmlformats.org/officeDocument/2006/math" xmlns:a14="http://schemas.microsoft.com/office/drawing/2010/main" xmlns:ma14="http://schemas.microsoft.com/office/mac/drawingml/2011/main" val="1"/>
+              <ma14:wrappingTextBoxFlag xmlns:ma14="http://schemas.microsoft.com/office/mac/drawingml/2011/main" xmlns:a14="http://schemas.microsoft.com/office/drawing/2010/main" xmlns:m="http://schemas.openxmlformats.org/officeDocument/2006/math" xmlns="" val="1"/>
             </a:ext>
           </a:extLst>
         </p:spPr>
@@ -6991,7 +10139,7 @@
           </a:ln>
           <a:extLst>
             <a:ext uri="{C572A759-6A51-4108-AA02-DFA0A04FC94B}">
-              <ma14:wrappingTextBoxFlag xmlns="" xmlns:m="http://schemas.openxmlformats.org/officeDocument/2006/math" xmlns:a14="http://schemas.microsoft.com/office/drawing/2010/main" xmlns:ma14="http://schemas.microsoft.com/office/mac/drawingml/2011/main" val="1"/>
+              <ma14:wrappingTextBoxFlag xmlns:ma14="http://schemas.microsoft.com/office/mac/drawingml/2011/main" xmlns:a14="http://schemas.microsoft.com/office/drawing/2010/main" xmlns:m="http://schemas.openxmlformats.org/officeDocument/2006/math" xmlns="" val="1"/>
             </a:ext>
           </a:extLst>
         </p:spPr>
@@ -7066,7 +10214,7 @@
           </a:ln>
           <a:extLst>
             <a:ext uri="{C572A759-6A51-4108-AA02-DFA0A04FC94B}">
-              <ma14:wrappingTextBoxFlag xmlns="" xmlns:m="http://schemas.openxmlformats.org/officeDocument/2006/math" xmlns:a14="http://schemas.microsoft.com/office/drawing/2010/main" xmlns:ma14="http://schemas.microsoft.com/office/mac/drawingml/2011/main" val="1"/>
+              <ma14:wrappingTextBoxFlag xmlns:ma14="http://schemas.microsoft.com/office/mac/drawingml/2011/main" xmlns:a14="http://schemas.microsoft.com/office/drawing/2010/main" xmlns:m="http://schemas.openxmlformats.org/officeDocument/2006/math" xmlns="" val="1"/>
             </a:ext>
           </a:extLst>
         </p:spPr>
@@ -7153,7 +10301,7 @@
           </a:ln>
           <a:extLst>
             <a:ext uri="{C572A759-6A51-4108-AA02-DFA0A04FC94B}">
-              <ma14:wrappingTextBoxFlag xmlns="" xmlns:m="http://schemas.openxmlformats.org/officeDocument/2006/math" xmlns:a14="http://schemas.microsoft.com/office/drawing/2010/main" xmlns:ma14="http://schemas.microsoft.com/office/mac/drawingml/2011/main" val="1"/>
+              <ma14:wrappingTextBoxFlag xmlns:ma14="http://schemas.microsoft.com/office/mac/drawingml/2011/main" xmlns:a14="http://schemas.microsoft.com/office/drawing/2010/main" xmlns:m="http://schemas.openxmlformats.org/officeDocument/2006/math" xmlns="" val="1"/>
             </a:ext>
           </a:extLst>
         </p:spPr>
@@ -7213,7 +10361,7 @@
           </a:ln>
           <a:extLst>
             <a:ext uri="{C572A759-6A51-4108-AA02-DFA0A04FC94B}">
-              <ma14:wrappingTextBoxFlag xmlns="" xmlns:m="http://schemas.openxmlformats.org/officeDocument/2006/math" xmlns:a14="http://schemas.microsoft.com/office/drawing/2010/main" xmlns:ma14="http://schemas.microsoft.com/office/mac/drawingml/2011/main" val="1"/>
+              <ma14:wrappingTextBoxFlag xmlns:ma14="http://schemas.microsoft.com/office/mac/drawingml/2011/main" xmlns:a14="http://schemas.microsoft.com/office/drawing/2010/main" xmlns:m="http://schemas.openxmlformats.org/officeDocument/2006/math" xmlns="" val="1"/>
             </a:ext>
           </a:extLst>
         </p:spPr>
@@ -7266,7 +10414,7 @@
           </a:ln>
           <a:extLst>
             <a:ext uri="{C572A759-6A51-4108-AA02-DFA0A04FC94B}">
-              <ma14:wrappingTextBoxFlag xmlns="" xmlns:m="http://schemas.openxmlformats.org/officeDocument/2006/math" xmlns:a14="http://schemas.microsoft.com/office/drawing/2010/main" xmlns:ma14="http://schemas.microsoft.com/office/mac/drawingml/2011/main" val="1"/>
+              <ma14:wrappingTextBoxFlag xmlns:ma14="http://schemas.microsoft.com/office/mac/drawingml/2011/main" xmlns:a14="http://schemas.microsoft.com/office/drawing/2010/main" xmlns:m="http://schemas.openxmlformats.org/officeDocument/2006/math" xmlns="" val="1"/>
             </a:ext>
           </a:extLst>
         </p:spPr>
@@ -7316,7 +10464,7 @@
           </a:ln>
           <a:extLst>
             <a:ext uri="{C572A759-6A51-4108-AA02-DFA0A04FC94B}">
-              <ma14:wrappingTextBoxFlag xmlns="" xmlns:m="http://schemas.openxmlformats.org/officeDocument/2006/math" xmlns:a14="http://schemas.microsoft.com/office/drawing/2010/main" xmlns:ma14="http://schemas.microsoft.com/office/mac/drawingml/2011/main" val="1"/>
+              <ma14:wrappingTextBoxFlag xmlns:ma14="http://schemas.microsoft.com/office/mac/drawingml/2011/main" xmlns:a14="http://schemas.microsoft.com/office/drawing/2010/main" xmlns:m="http://schemas.openxmlformats.org/officeDocument/2006/math" xmlns="" val="1"/>
             </a:ext>
           </a:extLst>
         </p:spPr>
@@ -7366,7 +10514,7 @@
           </a:ln>
           <a:extLst>
             <a:ext uri="{C572A759-6A51-4108-AA02-DFA0A04FC94B}">
-              <ma14:wrappingTextBoxFlag xmlns="" xmlns:m="http://schemas.openxmlformats.org/officeDocument/2006/math" xmlns:a14="http://schemas.microsoft.com/office/drawing/2010/main" xmlns:ma14="http://schemas.microsoft.com/office/mac/drawingml/2011/main" val="1"/>
+              <ma14:wrappingTextBoxFlag xmlns:ma14="http://schemas.microsoft.com/office/mac/drawingml/2011/main" xmlns:a14="http://schemas.microsoft.com/office/drawing/2010/main" xmlns:m="http://schemas.openxmlformats.org/officeDocument/2006/math" xmlns="" val="1"/>
             </a:ext>
           </a:extLst>
         </p:spPr>
@@ -7545,7 +10693,7 @@
             <a:effectLst/>
             <a:extLst>
               <a:ext uri="{C572A759-6A51-4108-AA02-DFA0A04FC94B}">
-                <ma14:wrappingTextBoxFlag xmlns="" xmlns:m="http://schemas.openxmlformats.org/officeDocument/2006/math" xmlns:a14="http://schemas.microsoft.com/office/drawing/2010/main" xmlns:ma14="http://schemas.microsoft.com/office/mac/drawingml/2011/main" val="1"/>
+                <ma14:wrappingTextBoxFlag xmlns:ma14="http://schemas.microsoft.com/office/mac/drawingml/2011/main" xmlns:a14="http://schemas.microsoft.com/office/drawing/2010/main" xmlns:m="http://schemas.openxmlformats.org/officeDocument/2006/math" xmlns="" val="1"/>
               </a:ext>
             </a:extLst>
           </p:spPr>
@@ -7597,7 +10745,7 @@
             <a:effectLst/>
             <a:extLst>
               <a:ext uri="{C572A759-6A51-4108-AA02-DFA0A04FC94B}">
-                <ma14:wrappingTextBoxFlag xmlns="" xmlns:m="http://schemas.openxmlformats.org/officeDocument/2006/math" xmlns:a14="http://schemas.microsoft.com/office/drawing/2010/main" xmlns:ma14="http://schemas.microsoft.com/office/mac/drawingml/2011/main" val="1"/>
+                <ma14:wrappingTextBoxFlag xmlns:ma14="http://schemas.microsoft.com/office/mac/drawingml/2011/main" xmlns:a14="http://schemas.microsoft.com/office/drawing/2010/main" xmlns:m="http://schemas.openxmlformats.org/officeDocument/2006/math" xmlns="" val="1"/>
               </a:ext>
             </a:extLst>
           </p:spPr>
@@ -7634,13 +10782,13 @@
             <p:nvPr/>
           </p:nvPicPr>
           <p:blipFill>
-            <a:blip r:embed="rId2">
+            <a:blip r:embed="rId3">
               <a:extLst>
                 <a:ext uri="{28A0092B-C50C-407E-A947-70E740481C1C}">
                   <a14:useLocalDpi xmlns:a14="http://schemas.microsoft.com/office/drawing/2010/main" val="0"/>
                 </a:ext>
                 <a:ext uri="{96DAC541-7B7A-43D3-8B79-37D633B846F1}">
-                  <asvg:svgBlip xmlns:asvg="http://schemas.microsoft.com/office/drawing/2016/SVG/main" r:embed="rId3"/>
+                  <asvg:svgBlip xmlns:asvg="http://schemas.microsoft.com/office/drawing/2016/SVG/main" r:embed="rId4"/>
                 </a:ext>
               </a:extLst>
             </a:blip>
@@ -7700,7 +10848,7 @@
             <a:effectLst/>
             <a:extLst>
               <a:ext uri="{C572A759-6A51-4108-AA02-DFA0A04FC94B}">
-                <ma14:wrappingTextBoxFlag xmlns="" xmlns:m="http://schemas.openxmlformats.org/officeDocument/2006/math" xmlns:a14="http://schemas.microsoft.com/office/drawing/2010/main" xmlns:ma14="http://schemas.microsoft.com/office/mac/drawingml/2011/main" val="1"/>
+                <ma14:wrappingTextBoxFlag xmlns:ma14="http://schemas.microsoft.com/office/mac/drawingml/2011/main" xmlns:a14="http://schemas.microsoft.com/office/drawing/2010/main" xmlns:m="http://schemas.openxmlformats.org/officeDocument/2006/math" xmlns="" val="1"/>
               </a:ext>
             </a:extLst>
           </p:spPr>
@@ -7750,7 +10898,7 @@
             <a:effectLst/>
             <a:extLst>
               <a:ext uri="{C572A759-6A51-4108-AA02-DFA0A04FC94B}">
-                <ma14:wrappingTextBoxFlag xmlns="" xmlns:m="http://schemas.openxmlformats.org/officeDocument/2006/math" xmlns:a14="http://schemas.microsoft.com/office/drawing/2010/main" xmlns:ma14="http://schemas.microsoft.com/office/mac/drawingml/2011/main" val="1"/>
+                <ma14:wrappingTextBoxFlag xmlns:ma14="http://schemas.microsoft.com/office/mac/drawingml/2011/main" xmlns:a14="http://schemas.microsoft.com/office/drawing/2010/main" xmlns:m="http://schemas.openxmlformats.org/officeDocument/2006/math" xmlns="" val="1"/>
               </a:ext>
             </a:extLst>
           </p:spPr>
@@ -7787,13 +10935,13 @@
             <p:nvPr/>
           </p:nvPicPr>
           <p:blipFill>
-            <a:blip r:embed="rId2">
+            <a:blip r:embed="rId3">
               <a:extLst>
                 <a:ext uri="{28A0092B-C50C-407E-A947-70E740481C1C}">
                   <a14:useLocalDpi xmlns:a14="http://schemas.microsoft.com/office/drawing/2010/main" val="0"/>
                 </a:ext>
                 <a:ext uri="{96DAC541-7B7A-43D3-8B79-37D633B846F1}">
-                  <asvg:svgBlip xmlns:asvg="http://schemas.microsoft.com/office/drawing/2016/SVG/main" r:embed="rId3"/>
+                  <asvg:svgBlip xmlns:asvg="http://schemas.microsoft.com/office/drawing/2016/SVG/main" r:embed="rId4"/>
                 </a:ext>
               </a:extLst>
             </a:blip>
@@ -7853,7 +11001,7 @@
             <a:effectLst/>
             <a:extLst>
               <a:ext uri="{C572A759-6A51-4108-AA02-DFA0A04FC94B}">
-                <ma14:wrappingTextBoxFlag xmlns="" xmlns:m="http://schemas.openxmlformats.org/officeDocument/2006/math" xmlns:a14="http://schemas.microsoft.com/office/drawing/2010/main" xmlns:ma14="http://schemas.microsoft.com/office/mac/drawingml/2011/main" val="1"/>
+                <ma14:wrappingTextBoxFlag xmlns:ma14="http://schemas.microsoft.com/office/mac/drawingml/2011/main" xmlns:a14="http://schemas.microsoft.com/office/drawing/2010/main" xmlns:m="http://schemas.openxmlformats.org/officeDocument/2006/math" xmlns="" val="1"/>
               </a:ext>
             </a:extLst>
           </p:spPr>
@@ -7902,7 +11050,7 @@
             <a:effectLst/>
             <a:extLst>
               <a:ext uri="{C572A759-6A51-4108-AA02-DFA0A04FC94B}">
-                <ma14:wrappingTextBoxFlag xmlns="" xmlns:m="http://schemas.openxmlformats.org/officeDocument/2006/math" xmlns:a14="http://schemas.microsoft.com/office/drawing/2010/main" xmlns:ma14="http://schemas.microsoft.com/office/mac/drawingml/2011/main" val="1"/>
+                <ma14:wrappingTextBoxFlag xmlns:ma14="http://schemas.microsoft.com/office/mac/drawingml/2011/main" xmlns:a14="http://schemas.microsoft.com/office/drawing/2010/main" xmlns:m="http://schemas.openxmlformats.org/officeDocument/2006/math" xmlns="" val="1"/>
               </a:ext>
             </a:extLst>
           </p:spPr>
@@ -7964,13 +11112,13 @@
             <p:nvPr/>
           </p:nvPicPr>
           <p:blipFill>
-            <a:blip r:embed="rId2">
+            <a:blip r:embed="rId3">
               <a:extLst>
                 <a:ext uri="{28A0092B-C50C-407E-A947-70E740481C1C}">
                   <a14:useLocalDpi xmlns:a14="http://schemas.microsoft.com/office/drawing/2010/main" val="0"/>
                 </a:ext>
                 <a:ext uri="{96DAC541-7B7A-43D3-8B79-37D633B846F1}">
-                  <asvg:svgBlip xmlns:asvg="http://schemas.microsoft.com/office/drawing/2016/SVG/main" r:embed="rId3"/>
+                  <asvg:svgBlip xmlns:asvg="http://schemas.microsoft.com/office/drawing/2016/SVG/main" r:embed="rId4"/>
                 </a:ext>
               </a:extLst>
             </a:blip>
@@ -8030,7 +11178,7 @@
             <a:effectLst/>
             <a:extLst>
               <a:ext uri="{C572A759-6A51-4108-AA02-DFA0A04FC94B}">
-                <ma14:wrappingTextBoxFlag xmlns="" xmlns:m="http://schemas.openxmlformats.org/officeDocument/2006/math" xmlns:a14="http://schemas.microsoft.com/office/drawing/2010/main" xmlns:ma14="http://schemas.microsoft.com/office/mac/drawingml/2011/main" val="1"/>
+                <ma14:wrappingTextBoxFlag xmlns:ma14="http://schemas.microsoft.com/office/mac/drawingml/2011/main" xmlns:a14="http://schemas.microsoft.com/office/drawing/2010/main" xmlns:m="http://schemas.openxmlformats.org/officeDocument/2006/math" xmlns="" val="1"/>
               </a:ext>
             </a:extLst>
           </p:spPr>
@@ -8080,7 +11228,7 @@
             <a:effectLst/>
             <a:extLst>
               <a:ext uri="{C572A759-6A51-4108-AA02-DFA0A04FC94B}">
-                <ma14:wrappingTextBoxFlag xmlns="" xmlns:m="http://schemas.openxmlformats.org/officeDocument/2006/math" xmlns:a14="http://schemas.microsoft.com/office/drawing/2010/main" xmlns:ma14="http://schemas.microsoft.com/office/mac/drawingml/2011/main" val="1"/>
+                <ma14:wrappingTextBoxFlag xmlns:ma14="http://schemas.microsoft.com/office/mac/drawingml/2011/main" xmlns:a14="http://schemas.microsoft.com/office/drawing/2010/main" xmlns:m="http://schemas.openxmlformats.org/officeDocument/2006/math" xmlns="" val="1"/>
               </a:ext>
             </a:extLst>
           </p:spPr>
@@ -8117,13 +11265,13 @@
             <p:nvPr/>
           </p:nvPicPr>
           <p:blipFill>
-            <a:blip r:embed="rId2">
+            <a:blip r:embed="rId3">
               <a:extLst>
                 <a:ext uri="{28A0092B-C50C-407E-A947-70E740481C1C}">
                   <a14:useLocalDpi xmlns:a14="http://schemas.microsoft.com/office/drawing/2010/main" val="0"/>
                 </a:ext>
                 <a:ext uri="{96DAC541-7B7A-43D3-8B79-37D633B846F1}">
-                  <asvg:svgBlip xmlns:asvg="http://schemas.microsoft.com/office/drawing/2016/SVG/main" r:embed="rId3"/>
+                  <asvg:svgBlip xmlns:asvg="http://schemas.microsoft.com/office/drawing/2016/SVG/main" r:embed="rId4"/>
                 </a:ext>
               </a:extLst>
             </a:blip>
@@ -8183,7 +11331,7 @@
             <a:effectLst/>
             <a:extLst>
               <a:ext uri="{C572A759-6A51-4108-AA02-DFA0A04FC94B}">
-                <ma14:wrappingTextBoxFlag xmlns="" xmlns:m="http://schemas.openxmlformats.org/officeDocument/2006/math" xmlns:a14="http://schemas.microsoft.com/office/drawing/2010/main" xmlns:ma14="http://schemas.microsoft.com/office/mac/drawingml/2011/main" val="1"/>
+                <ma14:wrappingTextBoxFlag xmlns:ma14="http://schemas.microsoft.com/office/mac/drawingml/2011/main" xmlns:a14="http://schemas.microsoft.com/office/drawing/2010/main" xmlns:m="http://schemas.openxmlformats.org/officeDocument/2006/math" xmlns="" val="1"/>
               </a:ext>
             </a:extLst>
           </p:spPr>
@@ -8233,7 +11381,7 @@
             <a:effectLst/>
             <a:extLst>
               <a:ext uri="{C572A759-6A51-4108-AA02-DFA0A04FC94B}">
-                <ma14:wrappingTextBoxFlag xmlns="" xmlns:m="http://schemas.openxmlformats.org/officeDocument/2006/math" xmlns:a14="http://schemas.microsoft.com/office/drawing/2010/main" xmlns:ma14="http://schemas.microsoft.com/office/mac/drawingml/2011/main" val="1"/>
+                <ma14:wrappingTextBoxFlag xmlns:ma14="http://schemas.microsoft.com/office/mac/drawingml/2011/main" xmlns:a14="http://schemas.microsoft.com/office/drawing/2010/main" xmlns:m="http://schemas.openxmlformats.org/officeDocument/2006/math" xmlns="" val="1"/>
               </a:ext>
             </a:extLst>
           </p:spPr>
@@ -8270,13 +11418,13 @@
             <p:nvPr/>
           </p:nvPicPr>
           <p:blipFill>
-            <a:blip r:embed="rId2">
+            <a:blip r:embed="rId3">
               <a:extLst>
                 <a:ext uri="{28A0092B-C50C-407E-A947-70E740481C1C}">
                   <a14:useLocalDpi xmlns:a14="http://schemas.microsoft.com/office/drawing/2010/main" val="0"/>
                 </a:ext>
                 <a:ext uri="{96DAC541-7B7A-43D3-8B79-37D633B846F1}">
-                  <asvg:svgBlip xmlns:asvg="http://schemas.microsoft.com/office/drawing/2016/SVG/main" r:embed="rId3"/>
+                  <asvg:svgBlip xmlns:asvg="http://schemas.microsoft.com/office/drawing/2016/SVG/main" r:embed="rId4"/>
                 </a:ext>
               </a:extLst>
             </a:blip>
@@ -8337,7 +11485,7 @@
             <a:effectLst/>
             <a:extLst>
               <a:ext uri="{C572A759-6A51-4108-AA02-DFA0A04FC94B}">
-                <ma14:wrappingTextBoxFlag xmlns="" xmlns:m="http://schemas.openxmlformats.org/officeDocument/2006/math" xmlns:a14="http://schemas.microsoft.com/office/drawing/2010/main" xmlns:ma14="http://schemas.microsoft.com/office/mac/drawingml/2011/main" val="1"/>
+                <ma14:wrappingTextBoxFlag xmlns:ma14="http://schemas.microsoft.com/office/mac/drawingml/2011/main" xmlns:a14="http://schemas.microsoft.com/office/drawing/2010/main" xmlns:m="http://schemas.openxmlformats.org/officeDocument/2006/math" xmlns="" val="1"/>
               </a:ext>
             </a:extLst>
           </p:spPr>
@@ -8387,7 +11535,7 @@
             <a:effectLst/>
             <a:extLst>
               <a:ext uri="{C572A759-6A51-4108-AA02-DFA0A04FC94B}">
-                <ma14:wrappingTextBoxFlag xmlns="" xmlns:m="http://schemas.openxmlformats.org/officeDocument/2006/math" xmlns:a14="http://schemas.microsoft.com/office/drawing/2010/main" xmlns:ma14="http://schemas.microsoft.com/office/mac/drawingml/2011/main" val="1"/>
+                <ma14:wrappingTextBoxFlag xmlns:ma14="http://schemas.microsoft.com/office/mac/drawingml/2011/main" xmlns:a14="http://schemas.microsoft.com/office/drawing/2010/main" xmlns:m="http://schemas.openxmlformats.org/officeDocument/2006/math" xmlns="" val="1"/>
               </a:ext>
             </a:extLst>
           </p:spPr>
@@ -8424,13 +11572,13 @@
             <p:nvPr/>
           </p:nvPicPr>
           <p:blipFill>
-            <a:blip r:embed="rId2">
+            <a:blip r:embed="rId3">
               <a:extLst>
                 <a:ext uri="{28A0092B-C50C-407E-A947-70E740481C1C}">
                   <a14:useLocalDpi xmlns:a14="http://schemas.microsoft.com/office/drawing/2010/main" val="0"/>
                 </a:ext>
                 <a:ext uri="{96DAC541-7B7A-43D3-8B79-37D633B846F1}">
-                  <asvg:svgBlip xmlns:asvg="http://schemas.microsoft.com/office/drawing/2016/SVG/main" r:embed="rId3"/>
+                  <asvg:svgBlip xmlns:asvg="http://schemas.microsoft.com/office/drawing/2016/SVG/main" r:embed="rId4"/>
                 </a:ext>
               </a:extLst>
             </a:blip>
@@ -8490,7 +11638,7 @@
             <a:effectLst/>
             <a:extLst>
               <a:ext uri="{C572A759-6A51-4108-AA02-DFA0A04FC94B}">
-                <ma14:wrappingTextBoxFlag xmlns="" xmlns:m="http://schemas.openxmlformats.org/officeDocument/2006/math" xmlns:a14="http://schemas.microsoft.com/office/drawing/2010/main" xmlns:ma14="http://schemas.microsoft.com/office/mac/drawingml/2011/main" val="1"/>
+                <ma14:wrappingTextBoxFlag xmlns:ma14="http://schemas.microsoft.com/office/mac/drawingml/2011/main" xmlns:a14="http://schemas.microsoft.com/office/drawing/2010/main" xmlns:m="http://schemas.openxmlformats.org/officeDocument/2006/math" xmlns="" val="1"/>
               </a:ext>
             </a:extLst>
           </p:spPr>
@@ -8540,7 +11688,7 @@
             <a:effectLst/>
             <a:extLst>
               <a:ext uri="{C572A759-6A51-4108-AA02-DFA0A04FC94B}">
-                <ma14:wrappingTextBoxFlag xmlns="" xmlns:m="http://schemas.openxmlformats.org/officeDocument/2006/math" xmlns:a14="http://schemas.microsoft.com/office/drawing/2010/main" xmlns:ma14="http://schemas.microsoft.com/office/mac/drawingml/2011/main" val="1"/>
+                <ma14:wrappingTextBoxFlag xmlns:ma14="http://schemas.microsoft.com/office/mac/drawingml/2011/main" xmlns:a14="http://schemas.microsoft.com/office/drawing/2010/main" xmlns:m="http://schemas.openxmlformats.org/officeDocument/2006/math" xmlns="" val="1"/>
               </a:ext>
             </a:extLst>
           </p:spPr>
@@ -8577,13 +11725,13 @@
             <p:nvPr/>
           </p:nvPicPr>
           <p:blipFill>
-            <a:blip r:embed="rId2">
+            <a:blip r:embed="rId3">
               <a:extLst>
                 <a:ext uri="{28A0092B-C50C-407E-A947-70E740481C1C}">
                   <a14:useLocalDpi xmlns:a14="http://schemas.microsoft.com/office/drawing/2010/main" val="0"/>
                 </a:ext>
                 <a:ext uri="{96DAC541-7B7A-43D3-8B79-37D633B846F1}">
-                  <asvg:svgBlip xmlns:asvg="http://schemas.microsoft.com/office/drawing/2016/SVG/main" r:embed="rId3"/>
+                  <asvg:svgBlip xmlns:asvg="http://schemas.microsoft.com/office/drawing/2016/SVG/main" r:embed="rId4"/>
                 </a:ext>
               </a:extLst>
             </a:blip>
@@ -8643,7 +11791,7 @@
             <a:effectLst/>
             <a:extLst>
               <a:ext uri="{C572A759-6A51-4108-AA02-DFA0A04FC94B}">
-                <ma14:wrappingTextBoxFlag xmlns="" xmlns:m="http://schemas.openxmlformats.org/officeDocument/2006/math" xmlns:a14="http://schemas.microsoft.com/office/drawing/2010/main" xmlns:ma14="http://schemas.microsoft.com/office/mac/drawingml/2011/main" val="1"/>
+                <ma14:wrappingTextBoxFlag xmlns:ma14="http://schemas.microsoft.com/office/mac/drawingml/2011/main" xmlns:a14="http://schemas.microsoft.com/office/drawing/2010/main" xmlns:m="http://schemas.openxmlformats.org/officeDocument/2006/math" xmlns="" val="1"/>
               </a:ext>
             </a:extLst>
           </p:spPr>
@@ -8693,7 +11841,7 @@
             <a:effectLst/>
             <a:extLst>
               <a:ext uri="{C572A759-6A51-4108-AA02-DFA0A04FC94B}">
-                <ma14:wrappingTextBoxFlag xmlns="" xmlns:m="http://schemas.openxmlformats.org/officeDocument/2006/math" xmlns:a14="http://schemas.microsoft.com/office/drawing/2010/main" xmlns:ma14="http://schemas.microsoft.com/office/mac/drawingml/2011/main" val="1"/>
+                <ma14:wrappingTextBoxFlag xmlns:ma14="http://schemas.microsoft.com/office/mac/drawingml/2011/main" xmlns:a14="http://schemas.microsoft.com/office/drawing/2010/main" xmlns:m="http://schemas.openxmlformats.org/officeDocument/2006/math" xmlns="" val="1"/>
               </a:ext>
             </a:extLst>
           </p:spPr>
@@ -8730,13 +11878,13 @@
             <p:nvPr/>
           </p:nvPicPr>
           <p:blipFill>
-            <a:blip r:embed="rId2">
+            <a:blip r:embed="rId3">
               <a:extLst>
                 <a:ext uri="{28A0092B-C50C-407E-A947-70E740481C1C}">
                   <a14:useLocalDpi xmlns:a14="http://schemas.microsoft.com/office/drawing/2010/main" val="0"/>
                 </a:ext>
                 <a:ext uri="{96DAC541-7B7A-43D3-8B79-37D633B846F1}">
-                  <asvg:svgBlip xmlns:asvg="http://schemas.microsoft.com/office/drawing/2016/SVG/main" r:embed="rId3"/>
+                  <asvg:svgBlip xmlns:asvg="http://schemas.microsoft.com/office/drawing/2016/SVG/main" r:embed="rId4"/>
                 </a:ext>
               </a:extLst>
             </a:blip>
@@ -8796,7 +11944,7 @@
             <a:effectLst/>
             <a:extLst>
               <a:ext uri="{C572A759-6A51-4108-AA02-DFA0A04FC94B}">
-                <ma14:wrappingTextBoxFlag xmlns="" xmlns:m="http://schemas.openxmlformats.org/officeDocument/2006/math" xmlns:a14="http://schemas.microsoft.com/office/drawing/2010/main" xmlns:ma14="http://schemas.microsoft.com/office/mac/drawingml/2011/main" val="1"/>
+                <ma14:wrappingTextBoxFlag xmlns:ma14="http://schemas.microsoft.com/office/mac/drawingml/2011/main" xmlns:a14="http://schemas.microsoft.com/office/drawing/2010/main" xmlns:m="http://schemas.openxmlformats.org/officeDocument/2006/math" xmlns="" val="1"/>
               </a:ext>
             </a:extLst>
           </p:spPr>
@@ -8845,7 +11993,7 @@
             <a:effectLst/>
             <a:extLst>
               <a:ext uri="{C572A759-6A51-4108-AA02-DFA0A04FC94B}">
-                <ma14:wrappingTextBoxFlag xmlns="" xmlns:m="http://schemas.openxmlformats.org/officeDocument/2006/math" xmlns:a14="http://schemas.microsoft.com/office/drawing/2010/main" xmlns:ma14="http://schemas.microsoft.com/office/mac/drawingml/2011/main" val="1"/>
+                <ma14:wrappingTextBoxFlag xmlns:ma14="http://schemas.microsoft.com/office/mac/drawingml/2011/main" xmlns:a14="http://schemas.microsoft.com/office/drawing/2010/main" xmlns:m="http://schemas.openxmlformats.org/officeDocument/2006/math" xmlns="" val="1"/>
               </a:ext>
             </a:extLst>
           </p:spPr>
@@ -8904,13 +12052,13 @@
             <p:nvPr/>
           </p:nvPicPr>
           <p:blipFill>
-            <a:blip r:embed="rId2">
+            <a:blip r:embed="rId3">
               <a:extLst>
                 <a:ext uri="{28A0092B-C50C-407E-A947-70E740481C1C}">
                   <a14:useLocalDpi xmlns:a14="http://schemas.microsoft.com/office/drawing/2010/main" val="0"/>
                 </a:ext>
                 <a:ext uri="{96DAC541-7B7A-43D3-8B79-37D633B846F1}">
-                  <asvg:svgBlip xmlns:asvg="http://schemas.microsoft.com/office/drawing/2016/SVG/main" r:embed="rId3"/>
+                  <asvg:svgBlip xmlns:asvg="http://schemas.microsoft.com/office/drawing/2016/SVG/main" r:embed="rId4"/>
                 </a:ext>
               </a:extLst>
             </a:blip>
@@ -8985,7 +12133,7 @@
           </a:ln>
           <a:extLst>
             <a:ext uri="{C572A759-6A51-4108-AA02-DFA0A04FC94B}">
-              <ma14:wrappingTextBoxFlag xmlns="" xmlns:m="http://schemas.openxmlformats.org/officeDocument/2006/math" xmlns:a14="http://schemas.microsoft.com/office/drawing/2010/main" xmlns:ma14="http://schemas.microsoft.com/office/mac/drawingml/2011/main" val="1"/>
+              <ma14:wrappingTextBoxFlag xmlns:ma14="http://schemas.microsoft.com/office/mac/drawingml/2011/main" xmlns:a14="http://schemas.microsoft.com/office/drawing/2010/main" xmlns:m="http://schemas.openxmlformats.org/officeDocument/2006/math" xmlns="" val="1"/>
             </a:ext>
           </a:extLst>
         </p:spPr>
@@ -9190,7 +12338,7 @@
             <a:effectLst/>
             <a:extLst>
               <a:ext uri="{C572A759-6A51-4108-AA02-DFA0A04FC94B}">
-                <ma14:wrappingTextBoxFlag xmlns="" xmlns:m="http://schemas.openxmlformats.org/officeDocument/2006/math" xmlns:a14="http://schemas.microsoft.com/office/drawing/2010/main" xmlns:ma14="http://schemas.microsoft.com/office/mac/drawingml/2011/main" val="1"/>
+                <ma14:wrappingTextBoxFlag xmlns:ma14="http://schemas.microsoft.com/office/mac/drawingml/2011/main" xmlns:a14="http://schemas.microsoft.com/office/drawing/2010/main" xmlns:m="http://schemas.openxmlformats.org/officeDocument/2006/math" xmlns="" val="1"/>
               </a:ext>
             </a:extLst>
           </p:spPr>
@@ -9250,7 +12398,7 @@
             <a:effectLst/>
             <a:extLst>
               <a:ext uri="{C572A759-6A51-4108-AA02-DFA0A04FC94B}">
-                <ma14:wrappingTextBoxFlag xmlns="" xmlns:m="http://schemas.openxmlformats.org/officeDocument/2006/math" xmlns:a14="http://schemas.microsoft.com/office/drawing/2010/main" xmlns:ma14="http://schemas.microsoft.com/office/mac/drawingml/2011/main" val="1"/>
+                <ma14:wrappingTextBoxFlag xmlns:ma14="http://schemas.microsoft.com/office/mac/drawingml/2011/main" xmlns:a14="http://schemas.microsoft.com/office/drawing/2010/main" xmlns:m="http://schemas.openxmlformats.org/officeDocument/2006/math" xmlns="" val="1"/>
               </a:ext>
             </a:extLst>
           </p:spPr>
@@ -9494,7 +12642,7 @@
             </a:ln>
             <a:extLst>
               <a:ext uri="{C572A759-6A51-4108-AA02-DFA0A04FC94B}">
-                <ma14:wrappingTextBoxFlag xmlns="" xmlns:m="http://schemas.openxmlformats.org/officeDocument/2006/math" xmlns:a14="http://schemas.microsoft.com/office/drawing/2010/main" xmlns:ma14="http://schemas.microsoft.com/office/mac/drawingml/2011/main" val="1"/>
+                <ma14:wrappingTextBoxFlag xmlns:ma14="http://schemas.microsoft.com/office/mac/drawingml/2011/main" xmlns:a14="http://schemas.microsoft.com/office/drawing/2010/main" xmlns:m="http://schemas.openxmlformats.org/officeDocument/2006/math" xmlns="" val="1"/>
               </a:ext>
             </a:extLst>
           </p:spPr>
@@ -9747,7 +12895,7 @@
               </a:ln>
               <a:extLst>
                 <a:ext uri="{C572A759-6A51-4108-AA02-DFA0A04FC94B}">
-                  <ma14:wrappingTextBoxFlag xmlns="" xmlns:m="http://schemas.openxmlformats.org/officeDocument/2006/math" xmlns:a14="http://schemas.microsoft.com/office/drawing/2010/main" xmlns:ma14="http://schemas.microsoft.com/office/mac/drawingml/2011/main" val="1"/>
+                  <ma14:wrappingTextBoxFlag xmlns:ma14="http://schemas.microsoft.com/office/mac/drawingml/2011/main" xmlns:a14="http://schemas.microsoft.com/office/drawing/2010/main" xmlns:m="http://schemas.openxmlformats.org/officeDocument/2006/math" xmlns="" val="1"/>
                 </a:ext>
               </a:extLst>
             </p:spPr>
@@ -9872,7 +13020,7 @@
               </a:ln>
               <a:extLst>
                 <a:ext uri="{C572A759-6A51-4108-AA02-DFA0A04FC94B}">
-                  <ma14:wrappingTextBoxFlag xmlns="" xmlns:m="http://schemas.openxmlformats.org/officeDocument/2006/math" xmlns:a14="http://schemas.microsoft.com/office/drawing/2010/main" xmlns:ma14="http://schemas.microsoft.com/office/mac/drawingml/2011/main" val="1"/>
+                  <ma14:wrappingTextBoxFlag xmlns:ma14="http://schemas.microsoft.com/office/mac/drawingml/2011/main" xmlns:a14="http://schemas.microsoft.com/office/drawing/2010/main" xmlns:m="http://schemas.openxmlformats.org/officeDocument/2006/math" xmlns="" val="1"/>
                 </a:ext>
               </a:extLst>
             </p:spPr>
@@ -10049,7 +13197,7 @@
             </a:ln>
             <a:extLst>
               <a:ext uri="{C572A759-6A51-4108-AA02-DFA0A04FC94B}">
-                <ma14:wrappingTextBoxFlag xmlns="" xmlns:m="http://schemas.openxmlformats.org/officeDocument/2006/math" xmlns:a14="http://schemas.microsoft.com/office/drawing/2010/main" xmlns:ma14="http://schemas.microsoft.com/office/mac/drawingml/2011/main" val="1"/>
+                <ma14:wrappingTextBoxFlag xmlns:ma14="http://schemas.microsoft.com/office/mac/drawingml/2011/main" xmlns:a14="http://schemas.microsoft.com/office/drawing/2010/main" xmlns:m="http://schemas.openxmlformats.org/officeDocument/2006/math" xmlns="" val="1"/>
               </a:ext>
             </a:extLst>
           </p:spPr>
@@ -10301,7 +13449,7 @@
               </a:ln>
               <a:extLst>
                 <a:ext uri="{C572A759-6A51-4108-AA02-DFA0A04FC94B}">
-                  <ma14:wrappingTextBoxFlag xmlns="" xmlns:m="http://schemas.openxmlformats.org/officeDocument/2006/math" xmlns:a14="http://schemas.microsoft.com/office/drawing/2010/main" xmlns:ma14="http://schemas.microsoft.com/office/mac/drawingml/2011/main" val="1"/>
+                  <ma14:wrappingTextBoxFlag xmlns:ma14="http://schemas.microsoft.com/office/mac/drawingml/2011/main" xmlns:a14="http://schemas.microsoft.com/office/drawing/2010/main" xmlns:m="http://schemas.openxmlformats.org/officeDocument/2006/math" xmlns="" val="1"/>
                 </a:ext>
               </a:extLst>
             </p:spPr>
@@ -10427,7 +13575,7 @@
               </a:ln>
               <a:extLst>
                 <a:ext uri="{C572A759-6A51-4108-AA02-DFA0A04FC94B}">
-                  <ma14:wrappingTextBoxFlag xmlns="" xmlns:m="http://schemas.openxmlformats.org/officeDocument/2006/math" xmlns:a14="http://schemas.microsoft.com/office/drawing/2010/main" xmlns:ma14="http://schemas.microsoft.com/office/mac/drawingml/2011/main" val="1"/>
+                  <ma14:wrappingTextBoxFlag xmlns:ma14="http://schemas.microsoft.com/office/mac/drawingml/2011/main" xmlns:a14="http://schemas.microsoft.com/office/drawing/2010/main" xmlns:m="http://schemas.openxmlformats.org/officeDocument/2006/math" xmlns="" val="1"/>
                 </a:ext>
               </a:extLst>
             </p:spPr>
@@ -10513,7 +13661,7 @@
             <a:effectLst/>
             <a:extLst>
               <a:ext uri="{C572A759-6A51-4108-AA02-DFA0A04FC94B}">
-                <ma14:wrappingTextBoxFlag xmlns="" xmlns:m="http://schemas.openxmlformats.org/officeDocument/2006/math" xmlns:a14="http://schemas.microsoft.com/office/drawing/2010/main" xmlns:ma14="http://schemas.microsoft.com/office/mac/drawingml/2011/main" val="1"/>
+                <ma14:wrappingTextBoxFlag xmlns:ma14="http://schemas.microsoft.com/office/mac/drawingml/2011/main" xmlns:a14="http://schemas.microsoft.com/office/drawing/2010/main" xmlns:m="http://schemas.openxmlformats.org/officeDocument/2006/math" xmlns="" val="1"/>
               </a:ext>
             </a:extLst>
           </p:spPr>
@@ -10573,7 +13721,7 @@
             <a:effectLst/>
             <a:extLst>
               <a:ext uri="{C572A759-6A51-4108-AA02-DFA0A04FC94B}">
-                <ma14:wrappingTextBoxFlag xmlns="" xmlns:m="http://schemas.openxmlformats.org/officeDocument/2006/math" xmlns:a14="http://schemas.microsoft.com/office/drawing/2010/main" xmlns:ma14="http://schemas.microsoft.com/office/mac/drawingml/2011/main" val="1"/>
+                <ma14:wrappingTextBoxFlag xmlns:ma14="http://schemas.microsoft.com/office/mac/drawingml/2011/main" xmlns:a14="http://schemas.microsoft.com/office/drawing/2010/main" xmlns:m="http://schemas.openxmlformats.org/officeDocument/2006/math" xmlns="" val="1"/>
               </a:ext>
             </a:extLst>
           </p:spPr>
@@ -10697,7 +13845,7 @@
           </a:ln>
           <a:extLst>
             <a:ext uri="{C572A759-6A51-4108-AA02-DFA0A04FC94B}">
-              <ma14:wrappingTextBoxFlag xmlns="" xmlns:m="http://schemas.openxmlformats.org/officeDocument/2006/math" xmlns:a14="http://schemas.microsoft.com/office/drawing/2010/main" xmlns:ma14="http://schemas.microsoft.com/office/mac/drawingml/2011/main" val="1"/>
+              <ma14:wrappingTextBoxFlag xmlns:ma14="http://schemas.microsoft.com/office/mac/drawingml/2011/main" xmlns:a14="http://schemas.microsoft.com/office/drawing/2010/main" xmlns:m="http://schemas.openxmlformats.org/officeDocument/2006/math" xmlns="" val="1"/>
             </a:ext>
           </a:extLst>
         </p:spPr>
@@ -10816,7 +13964,7 @@
           </a:ln>
           <a:extLst>
             <a:ext uri="{C572A759-6A51-4108-AA02-DFA0A04FC94B}">
-              <ma14:wrappingTextBoxFlag xmlns="" xmlns:m="http://schemas.openxmlformats.org/officeDocument/2006/math" xmlns:a14="http://schemas.microsoft.com/office/drawing/2010/main" xmlns:ma14="http://schemas.microsoft.com/office/mac/drawingml/2011/main" val="1"/>
+              <ma14:wrappingTextBoxFlag xmlns:ma14="http://schemas.microsoft.com/office/mac/drawingml/2011/main" xmlns:a14="http://schemas.microsoft.com/office/drawing/2010/main" xmlns:m="http://schemas.openxmlformats.org/officeDocument/2006/math" xmlns="" val="1"/>
             </a:ext>
           </a:extLst>
         </p:spPr>
@@ -11492,7 +14640,7 @@
           </a:ln>
           <a:extLst>
             <a:ext uri="{C572A759-6A51-4108-AA02-DFA0A04FC94B}">
-              <ma14:wrappingTextBoxFlag xmlns="" xmlns:m="http://schemas.openxmlformats.org/officeDocument/2006/math" xmlns:a14="http://schemas.microsoft.com/office/drawing/2010/main" xmlns:ma14="http://schemas.microsoft.com/office/mac/drawingml/2011/main" val="1"/>
+              <ma14:wrappingTextBoxFlag xmlns:ma14="http://schemas.microsoft.com/office/mac/drawingml/2011/main" xmlns:a14="http://schemas.microsoft.com/office/drawing/2010/main" xmlns:m="http://schemas.openxmlformats.org/officeDocument/2006/math" xmlns="" val="1"/>
             </a:ext>
           </a:extLst>
         </p:spPr>
@@ -11591,7 +14739,7 @@
           </a:ln>
           <a:extLst>
             <a:ext uri="{C572A759-6A51-4108-AA02-DFA0A04FC94B}">
-              <ma14:wrappingTextBoxFlag xmlns="" xmlns:m="http://schemas.openxmlformats.org/officeDocument/2006/math" xmlns:a14="http://schemas.microsoft.com/office/drawing/2010/main" xmlns:ma14="http://schemas.microsoft.com/office/mac/drawingml/2011/main" val="1"/>
+              <ma14:wrappingTextBoxFlag xmlns:ma14="http://schemas.microsoft.com/office/mac/drawingml/2011/main" xmlns:a14="http://schemas.microsoft.com/office/drawing/2010/main" xmlns:m="http://schemas.openxmlformats.org/officeDocument/2006/math" xmlns="" val="1"/>
             </a:ext>
           </a:extLst>
         </p:spPr>
@@ -11710,7 +14858,7 @@
           </a:ln>
           <a:extLst>
             <a:ext uri="{C572A759-6A51-4108-AA02-DFA0A04FC94B}">
-              <ma14:wrappingTextBoxFlag xmlns="" xmlns:m="http://schemas.openxmlformats.org/officeDocument/2006/math" xmlns:a14="http://schemas.microsoft.com/office/drawing/2010/main" xmlns:ma14="http://schemas.microsoft.com/office/mac/drawingml/2011/main" val="1"/>
+              <ma14:wrappingTextBoxFlag xmlns:ma14="http://schemas.microsoft.com/office/mac/drawingml/2011/main" xmlns:a14="http://schemas.microsoft.com/office/drawing/2010/main" xmlns:m="http://schemas.openxmlformats.org/officeDocument/2006/math" xmlns="" val="1"/>
             </a:ext>
           </a:extLst>
         </p:spPr>
@@ -12007,7 +15155,7 @@
             <a:effectLst/>
             <a:extLst>
               <a:ext uri="{C572A759-6A51-4108-AA02-DFA0A04FC94B}">
-                <ma14:wrappingTextBoxFlag xmlns:ma14="http://schemas.microsoft.com/office/mac/drawingml/2011/main" xmlns:a14="http://schemas.microsoft.com/office/drawing/2010/main" xmlns:m="http://schemas.openxmlformats.org/officeDocument/2006/math" xmlns="" val="1"/>
+                <ma14:wrappingTextBoxFlag xmlns="" xmlns:m="http://schemas.openxmlformats.org/officeDocument/2006/math" xmlns:a14="http://schemas.microsoft.com/office/drawing/2010/main" xmlns:ma14="http://schemas.microsoft.com/office/mac/drawingml/2011/main" val="1"/>
               </a:ext>
             </a:extLst>
           </p:spPr>
@@ -12150,7 +15298,7 @@
             <a:effectLst/>
             <a:extLst>
               <a:ext uri="{C572A759-6A51-4108-AA02-DFA0A04FC94B}">
-                <ma14:wrappingTextBoxFlag xmlns:ma14="http://schemas.microsoft.com/office/mac/drawingml/2011/main" xmlns:a14="http://schemas.microsoft.com/office/drawing/2010/main" xmlns:m="http://schemas.openxmlformats.org/officeDocument/2006/math" xmlns="" val="1"/>
+                <ma14:wrappingTextBoxFlag xmlns="" xmlns:m="http://schemas.openxmlformats.org/officeDocument/2006/math" xmlns:a14="http://schemas.microsoft.com/office/drawing/2010/main" xmlns:ma14="http://schemas.microsoft.com/office/mac/drawingml/2011/main" val="1"/>
               </a:ext>
             </a:extLst>
           </p:spPr>
@@ -12278,7 +15426,7 @@
               <a:effectLst/>
               <a:extLst>
                 <a:ext uri="{C572A759-6A51-4108-AA02-DFA0A04FC94B}">
-                  <ma14:wrappingTextBoxFlag xmlns:ma14="http://schemas.microsoft.com/office/mac/drawingml/2011/main" xmlns:a14="http://schemas.microsoft.com/office/drawing/2010/main" xmlns:m="http://schemas.openxmlformats.org/officeDocument/2006/math" xmlns="" val="1"/>
+                  <ma14:wrappingTextBoxFlag xmlns="" xmlns:m="http://schemas.openxmlformats.org/officeDocument/2006/math" xmlns:a14="http://schemas.microsoft.com/office/drawing/2010/main" xmlns:ma14="http://schemas.microsoft.com/office/mac/drawingml/2011/main" val="1"/>
                 </a:ext>
               </a:extLst>
             </p:spPr>
@@ -12390,7 +15538,7 @@
               <a:effectLst/>
               <a:extLst>
                 <a:ext uri="{C572A759-6A51-4108-AA02-DFA0A04FC94B}">
-                  <ma14:wrappingTextBoxFlag xmlns:ma14="http://schemas.microsoft.com/office/mac/drawingml/2011/main" xmlns:a14="http://schemas.microsoft.com/office/drawing/2010/main" xmlns:m="http://schemas.openxmlformats.org/officeDocument/2006/math" xmlns="" val="1"/>
+                  <ma14:wrappingTextBoxFlag xmlns="" xmlns:m="http://schemas.openxmlformats.org/officeDocument/2006/math" xmlns:a14="http://schemas.microsoft.com/office/drawing/2010/main" xmlns:ma14="http://schemas.microsoft.com/office/mac/drawingml/2011/main" val="1"/>
                 </a:ext>
               </a:extLst>
             </p:spPr>
@@ -12442,7 +15590,7 @@
             <a:effectLst/>
             <a:extLst>
               <a:ext uri="{C572A759-6A51-4108-AA02-DFA0A04FC94B}">
-                <ma14:wrappingTextBoxFlag xmlns:ma14="http://schemas.microsoft.com/office/mac/drawingml/2011/main" xmlns:a14="http://schemas.microsoft.com/office/drawing/2010/main" xmlns:m="http://schemas.openxmlformats.org/officeDocument/2006/math" xmlns="" val="1"/>
+                <ma14:wrappingTextBoxFlag xmlns="" xmlns:m="http://schemas.openxmlformats.org/officeDocument/2006/math" xmlns:a14="http://schemas.microsoft.com/office/drawing/2010/main" xmlns:ma14="http://schemas.microsoft.com/office/mac/drawingml/2011/main" val="1"/>
               </a:ext>
             </a:extLst>
           </p:spPr>
@@ -12564,7 +15712,7 @@
             <a:effectLst/>
             <a:extLst>
               <a:ext uri="{C572A759-6A51-4108-AA02-DFA0A04FC94B}">
-                <ma14:wrappingTextBoxFlag xmlns:ma14="http://schemas.microsoft.com/office/mac/drawingml/2011/main" xmlns:a14="http://schemas.microsoft.com/office/drawing/2010/main" xmlns:m="http://schemas.openxmlformats.org/officeDocument/2006/math" xmlns="" val="1"/>
+                <ma14:wrappingTextBoxFlag xmlns="" xmlns:m="http://schemas.openxmlformats.org/officeDocument/2006/math" xmlns:a14="http://schemas.microsoft.com/office/drawing/2010/main" xmlns:ma14="http://schemas.microsoft.com/office/mac/drawingml/2011/main" val="1"/>
               </a:ext>
             </a:extLst>
           </p:spPr>
@@ -12640,7 +15788,7 @@
             <a:effectLst/>
             <a:extLst>
               <a:ext uri="{C572A759-6A51-4108-AA02-DFA0A04FC94B}">
-                <ma14:wrappingTextBoxFlag xmlns:ma14="http://schemas.microsoft.com/office/mac/drawingml/2011/main" xmlns:a14="http://schemas.microsoft.com/office/drawing/2010/main" xmlns:m="http://schemas.openxmlformats.org/officeDocument/2006/math" xmlns="" val="1"/>
+                <ma14:wrappingTextBoxFlag xmlns="" xmlns:m="http://schemas.openxmlformats.org/officeDocument/2006/math" xmlns:a14="http://schemas.microsoft.com/office/drawing/2010/main" xmlns:ma14="http://schemas.microsoft.com/office/mac/drawingml/2011/main" val="1"/>
               </a:ext>
             </a:extLst>
           </p:spPr>
@@ -12762,7 +15910,7 @@
             <a:effectLst/>
             <a:extLst>
               <a:ext uri="{C572A759-6A51-4108-AA02-DFA0A04FC94B}">
-                <ma14:wrappingTextBoxFlag xmlns:ma14="http://schemas.microsoft.com/office/mac/drawingml/2011/main" xmlns:a14="http://schemas.microsoft.com/office/drawing/2010/main" xmlns:m="http://schemas.openxmlformats.org/officeDocument/2006/math" xmlns="" val="1"/>
+                <ma14:wrappingTextBoxFlag xmlns="" xmlns:m="http://schemas.openxmlformats.org/officeDocument/2006/math" xmlns:a14="http://schemas.microsoft.com/office/drawing/2010/main" xmlns:ma14="http://schemas.microsoft.com/office/mac/drawingml/2011/main" val="1"/>
               </a:ext>
             </a:extLst>
           </p:spPr>
@@ -12818,7 +15966,7 @@
             <a:effectLst/>
             <a:extLst>
               <a:ext uri="{C572A759-6A51-4108-AA02-DFA0A04FC94B}">
-                <ma14:wrappingTextBoxFlag xmlns:ma14="http://schemas.microsoft.com/office/mac/drawingml/2011/main" xmlns:a14="http://schemas.microsoft.com/office/drawing/2010/main" xmlns:m="http://schemas.openxmlformats.org/officeDocument/2006/math" xmlns="" val="1"/>
+                <ma14:wrappingTextBoxFlag xmlns="" xmlns:m="http://schemas.openxmlformats.org/officeDocument/2006/math" xmlns:a14="http://schemas.microsoft.com/office/drawing/2010/main" xmlns:ma14="http://schemas.microsoft.com/office/mac/drawingml/2011/main" val="1"/>
               </a:ext>
             </a:extLst>
           </p:spPr>
@@ -12940,7 +16088,7 @@
             <a:effectLst/>
             <a:extLst>
               <a:ext uri="{C572A759-6A51-4108-AA02-DFA0A04FC94B}">
-                <ma14:wrappingTextBoxFlag xmlns:ma14="http://schemas.microsoft.com/office/mac/drawingml/2011/main" xmlns:a14="http://schemas.microsoft.com/office/drawing/2010/main" xmlns:m="http://schemas.openxmlformats.org/officeDocument/2006/math" xmlns="" val="1"/>
+                <ma14:wrappingTextBoxFlag xmlns="" xmlns:m="http://schemas.openxmlformats.org/officeDocument/2006/math" xmlns:a14="http://schemas.microsoft.com/office/drawing/2010/main" xmlns:ma14="http://schemas.microsoft.com/office/mac/drawingml/2011/main" val="1"/>
               </a:ext>
             </a:extLst>
           </p:spPr>
@@ -12991,7 +16139,7 @@
             <a:effectLst/>
             <a:extLst>
               <a:ext uri="{C572A759-6A51-4108-AA02-DFA0A04FC94B}">
-                <ma14:wrappingTextBoxFlag xmlns:ma14="http://schemas.microsoft.com/office/mac/drawingml/2011/main" xmlns:a14="http://schemas.microsoft.com/office/drawing/2010/main" xmlns:m="http://schemas.openxmlformats.org/officeDocument/2006/math" xmlns="" val="1"/>
+                <ma14:wrappingTextBoxFlag xmlns="" xmlns:m="http://schemas.openxmlformats.org/officeDocument/2006/math" xmlns:a14="http://schemas.microsoft.com/office/drawing/2010/main" xmlns:ma14="http://schemas.microsoft.com/office/mac/drawingml/2011/main" val="1"/>
               </a:ext>
             </a:extLst>
           </p:spPr>
@@ -13117,7 +16265,7 @@
             <a:effectLst/>
             <a:extLst>
               <a:ext uri="{C572A759-6A51-4108-AA02-DFA0A04FC94B}">
-                <ma14:wrappingTextBoxFlag xmlns:ma14="http://schemas.microsoft.com/office/mac/drawingml/2011/main" xmlns:a14="http://schemas.microsoft.com/office/drawing/2010/main" xmlns:m="http://schemas.openxmlformats.org/officeDocument/2006/math" xmlns="" val="1"/>
+                <ma14:wrappingTextBoxFlag xmlns="" xmlns:m="http://schemas.openxmlformats.org/officeDocument/2006/math" xmlns:a14="http://schemas.microsoft.com/office/drawing/2010/main" xmlns:ma14="http://schemas.microsoft.com/office/mac/drawingml/2011/main" val="1"/>
               </a:ext>
             </a:extLst>
           </p:spPr>
@@ -13173,7 +16321,7 @@
             <a:effectLst/>
             <a:extLst>
               <a:ext uri="{C572A759-6A51-4108-AA02-DFA0A04FC94B}">
-                <ma14:wrappingTextBoxFlag xmlns:ma14="http://schemas.microsoft.com/office/mac/drawingml/2011/main" xmlns:a14="http://schemas.microsoft.com/office/drawing/2010/main" xmlns:m="http://schemas.openxmlformats.org/officeDocument/2006/math" xmlns="" val="1"/>
+                <ma14:wrappingTextBoxFlag xmlns="" xmlns:m="http://schemas.openxmlformats.org/officeDocument/2006/math" xmlns:a14="http://schemas.microsoft.com/office/drawing/2010/main" xmlns:ma14="http://schemas.microsoft.com/office/mac/drawingml/2011/main" val="1"/>
               </a:ext>
             </a:extLst>
           </p:spPr>
@@ -13295,7 +16443,7 @@
             <a:effectLst/>
             <a:extLst>
               <a:ext uri="{C572A759-6A51-4108-AA02-DFA0A04FC94B}">
-                <ma14:wrappingTextBoxFlag xmlns:ma14="http://schemas.microsoft.com/office/mac/drawingml/2011/main" xmlns:a14="http://schemas.microsoft.com/office/drawing/2010/main" xmlns:m="http://schemas.openxmlformats.org/officeDocument/2006/math" xmlns="" val="1"/>
+                <ma14:wrappingTextBoxFlag xmlns="" xmlns:m="http://schemas.openxmlformats.org/officeDocument/2006/math" xmlns:a14="http://schemas.microsoft.com/office/drawing/2010/main" xmlns:ma14="http://schemas.microsoft.com/office/mac/drawingml/2011/main" val="1"/>
               </a:ext>
             </a:extLst>
           </p:spPr>
@@ -13418,7 +16566,7 @@
               <a:effectLst/>
               <a:extLst>
                 <a:ext uri="{C572A759-6A51-4108-AA02-DFA0A04FC94B}">
-                  <ma14:wrappingTextBoxFlag xmlns:ma14="http://schemas.microsoft.com/office/mac/drawingml/2011/main" xmlns:a14="http://schemas.microsoft.com/office/drawing/2010/main" xmlns:m="http://schemas.openxmlformats.org/officeDocument/2006/math" xmlns="" val="1"/>
+                  <ma14:wrappingTextBoxFlag xmlns="" xmlns:m="http://schemas.openxmlformats.org/officeDocument/2006/math" xmlns:a14="http://schemas.microsoft.com/office/drawing/2010/main" xmlns:ma14="http://schemas.microsoft.com/office/mac/drawingml/2011/main" val="1"/>
                 </a:ext>
               </a:extLst>
             </p:spPr>
@@ -13530,7 +16678,7 @@
               <a:effectLst/>
               <a:extLst>
                 <a:ext uri="{C572A759-6A51-4108-AA02-DFA0A04FC94B}">
-                  <ma14:wrappingTextBoxFlag xmlns:ma14="http://schemas.microsoft.com/office/mac/drawingml/2011/main" xmlns:a14="http://schemas.microsoft.com/office/drawing/2010/main" xmlns:m="http://schemas.openxmlformats.org/officeDocument/2006/math" xmlns="" val="1"/>
+                  <ma14:wrappingTextBoxFlag xmlns="" xmlns:m="http://schemas.openxmlformats.org/officeDocument/2006/math" xmlns:a14="http://schemas.microsoft.com/office/drawing/2010/main" xmlns:ma14="http://schemas.microsoft.com/office/mac/drawingml/2011/main" val="1"/>
                 </a:ext>
               </a:extLst>
             </p:spPr>
@@ -13581,7 +16729,7 @@
             <a:effectLst/>
             <a:extLst>
               <a:ext uri="{C572A759-6A51-4108-AA02-DFA0A04FC94B}">
-                <ma14:wrappingTextBoxFlag xmlns:ma14="http://schemas.microsoft.com/office/mac/drawingml/2011/main" xmlns:a14="http://schemas.microsoft.com/office/drawing/2010/main" xmlns:m="http://schemas.openxmlformats.org/officeDocument/2006/math" xmlns="" val="1"/>
+                <ma14:wrappingTextBoxFlag xmlns="" xmlns:m="http://schemas.openxmlformats.org/officeDocument/2006/math" xmlns:a14="http://schemas.microsoft.com/office/drawing/2010/main" xmlns:ma14="http://schemas.microsoft.com/office/mac/drawingml/2011/main" val="1"/>
               </a:ext>
             </a:extLst>
           </p:spPr>
@@ -13703,7 +16851,7 @@
             <a:effectLst/>
             <a:extLst>
               <a:ext uri="{C572A759-6A51-4108-AA02-DFA0A04FC94B}">
-                <ma14:wrappingTextBoxFlag xmlns:ma14="http://schemas.microsoft.com/office/mac/drawingml/2011/main" xmlns:a14="http://schemas.microsoft.com/office/drawing/2010/main" xmlns:m="http://schemas.openxmlformats.org/officeDocument/2006/math" xmlns="" val="1"/>
+                <ma14:wrappingTextBoxFlag xmlns="" xmlns:m="http://schemas.openxmlformats.org/officeDocument/2006/math" xmlns:a14="http://schemas.microsoft.com/office/drawing/2010/main" xmlns:ma14="http://schemas.microsoft.com/office/mac/drawingml/2011/main" val="1"/>
               </a:ext>
             </a:extLst>
           </p:spPr>
@@ -13814,7 +16962,7 @@
               <a:effectLst/>
               <a:extLst>
                 <a:ext uri="{C572A759-6A51-4108-AA02-DFA0A04FC94B}">
-                  <ma14:wrappingTextBoxFlag xmlns:ma14="http://schemas.microsoft.com/office/mac/drawingml/2011/main" xmlns:a14="http://schemas.microsoft.com/office/drawing/2010/main" xmlns:m="http://schemas.openxmlformats.org/officeDocument/2006/math" xmlns="" val="1"/>
+                  <ma14:wrappingTextBoxFlag xmlns="" xmlns:m="http://schemas.openxmlformats.org/officeDocument/2006/math" xmlns:a14="http://schemas.microsoft.com/office/drawing/2010/main" xmlns:ma14="http://schemas.microsoft.com/office/mac/drawingml/2011/main" val="1"/>
                 </a:ext>
               </a:extLst>
             </p:spPr>
@@ -13925,7 +17073,7 @@
               <a:effectLst/>
               <a:extLst>
                 <a:ext uri="{C572A759-6A51-4108-AA02-DFA0A04FC94B}">
-                  <ma14:wrappingTextBoxFlag xmlns:ma14="http://schemas.microsoft.com/office/mac/drawingml/2011/main" xmlns:a14="http://schemas.microsoft.com/office/drawing/2010/main" xmlns:m="http://schemas.openxmlformats.org/officeDocument/2006/math" xmlns="" val="1"/>
+                  <ma14:wrappingTextBoxFlag xmlns="" xmlns:m="http://schemas.openxmlformats.org/officeDocument/2006/math" xmlns:a14="http://schemas.microsoft.com/office/drawing/2010/main" xmlns:ma14="http://schemas.microsoft.com/office/mac/drawingml/2011/main" val="1"/>
                 </a:ext>
               </a:extLst>
             </p:spPr>
@@ -13976,7 +17124,7 @@
             <a:effectLst/>
             <a:extLst>
               <a:ext uri="{C572A759-6A51-4108-AA02-DFA0A04FC94B}">
-                <ma14:wrappingTextBoxFlag xmlns:ma14="http://schemas.microsoft.com/office/mac/drawingml/2011/main" xmlns:a14="http://schemas.microsoft.com/office/drawing/2010/main" xmlns:m="http://schemas.openxmlformats.org/officeDocument/2006/math" xmlns="" val="1"/>
+                <ma14:wrappingTextBoxFlag xmlns="" xmlns:m="http://schemas.openxmlformats.org/officeDocument/2006/math" xmlns:a14="http://schemas.microsoft.com/office/drawing/2010/main" xmlns:ma14="http://schemas.microsoft.com/office/mac/drawingml/2011/main" val="1"/>
               </a:ext>
             </a:extLst>
           </p:spPr>
@@ -14098,7 +17246,7 @@
             <a:effectLst/>
             <a:extLst>
               <a:ext uri="{C572A759-6A51-4108-AA02-DFA0A04FC94B}">
-                <ma14:wrappingTextBoxFlag xmlns:ma14="http://schemas.microsoft.com/office/mac/drawingml/2011/main" xmlns:a14="http://schemas.microsoft.com/office/drawing/2010/main" xmlns:m="http://schemas.openxmlformats.org/officeDocument/2006/math" xmlns="" val="1"/>
+                <ma14:wrappingTextBoxFlag xmlns="" xmlns:m="http://schemas.openxmlformats.org/officeDocument/2006/math" xmlns:a14="http://schemas.microsoft.com/office/drawing/2010/main" xmlns:ma14="http://schemas.microsoft.com/office/mac/drawingml/2011/main" val="1"/>
               </a:ext>
             </a:extLst>
           </p:spPr>
@@ -14222,7 +17370,7 @@
               <a:effectLst/>
               <a:extLst>
                 <a:ext uri="{C572A759-6A51-4108-AA02-DFA0A04FC94B}">
-                  <ma14:wrappingTextBoxFlag xmlns:ma14="http://schemas.microsoft.com/office/mac/drawingml/2011/main" xmlns:a14="http://schemas.microsoft.com/office/drawing/2010/main" xmlns:m="http://schemas.openxmlformats.org/officeDocument/2006/math" xmlns="" val="1"/>
+                  <ma14:wrappingTextBoxFlag xmlns="" xmlns:m="http://schemas.openxmlformats.org/officeDocument/2006/math" xmlns:a14="http://schemas.microsoft.com/office/drawing/2010/main" xmlns:ma14="http://schemas.microsoft.com/office/mac/drawingml/2011/main" val="1"/>
                 </a:ext>
               </a:extLst>
             </p:spPr>
@@ -14333,7 +17481,7 @@
               <a:effectLst/>
               <a:extLst>
                 <a:ext uri="{C572A759-6A51-4108-AA02-DFA0A04FC94B}">
-                  <ma14:wrappingTextBoxFlag xmlns:ma14="http://schemas.microsoft.com/office/mac/drawingml/2011/main" xmlns:a14="http://schemas.microsoft.com/office/drawing/2010/main" xmlns:m="http://schemas.openxmlformats.org/officeDocument/2006/math" xmlns="" val="1"/>
+                  <ma14:wrappingTextBoxFlag xmlns="" xmlns:m="http://schemas.openxmlformats.org/officeDocument/2006/math" xmlns:a14="http://schemas.microsoft.com/office/drawing/2010/main" xmlns:ma14="http://schemas.microsoft.com/office/mac/drawingml/2011/main" val="1"/>
                 </a:ext>
               </a:extLst>
             </p:spPr>
@@ -14385,7 +17533,7 @@
             <a:effectLst/>
             <a:extLst>
               <a:ext uri="{C572A759-6A51-4108-AA02-DFA0A04FC94B}">
-                <ma14:wrappingTextBoxFlag xmlns:ma14="http://schemas.microsoft.com/office/mac/drawingml/2011/main" xmlns:a14="http://schemas.microsoft.com/office/drawing/2010/main" xmlns:m="http://schemas.openxmlformats.org/officeDocument/2006/math" xmlns="" val="1"/>
+                <ma14:wrappingTextBoxFlag xmlns="" xmlns:m="http://schemas.openxmlformats.org/officeDocument/2006/math" xmlns:a14="http://schemas.microsoft.com/office/drawing/2010/main" xmlns:ma14="http://schemas.microsoft.com/office/mac/drawingml/2011/main" val="1"/>
               </a:ext>
             </a:extLst>
           </p:spPr>
@@ -14438,7 +17586,7 @@
           </a:ln>
           <a:extLst>
             <a:ext uri="{C572A759-6A51-4108-AA02-DFA0A04FC94B}">
-              <ma14:wrappingTextBoxFlag xmlns:ma14="http://schemas.microsoft.com/office/mac/drawingml/2011/main" xmlns:a14="http://schemas.microsoft.com/office/drawing/2010/main" xmlns:m="http://schemas.openxmlformats.org/officeDocument/2006/math" xmlns="" val="1"/>
+              <ma14:wrappingTextBoxFlag xmlns="" xmlns:m="http://schemas.openxmlformats.org/officeDocument/2006/math" xmlns:a14="http://schemas.microsoft.com/office/drawing/2010/main" xmlns:ma14="http://schemas.microsoft.com/office/mac/drawingml/2011/main" val="1"/>
             </a:ext>
           </a:extLst>
         </p:spPr>
@@ -14595,7 +17743,7 @@
           </a:ln>
           <a:extLst>
             <a:ext uri="{C572A759-6A51-4108-AA02-DFA0A04FC94B}">
-              <ma14:wrappingTextBoxFlag xmlns:ma14="http://schemas.microsoft.com/office/mac/drawingml/2011/main" xmlns:a14="http://schemas.microsoft.com/office/drawing/2010/main" xmlns:m="http://schemas.openxmlformats.org/officeDocument/2006/math" xmlns="" val="1"/>
+              <ma14:wrappingTextBoxFlag xmlns="" xmlns:m="http://schemas.openxmlformats.org/officeDocument/2006/math" xmlns:a14="http://schemas.microsoft.com/office/drawing/2010/main" xmlns:ma14="http://schemas.microsoft.com/office/mac/drawingml/2011/main" val="1"/>
             </a:ext>
           </a:extLst>
         </p:spPr>
@@ -14618,7 +17766,7 @@
                 <a:ea typeface="Open Sans"/>
                 <a:cs typeface="Open Sans"/>
                 <a:sym typeface="Open Sans"/>
-                <a:hlinkClick r:id="rId2"/>
+                <a:hlinkClick r:id="rId3"/>
               </a:defRPr>
             </a:lvl1pPr>
           </a:lstStyle>
@@ -14641,7 +17789,7 @@
                     <a:srgbClr val="0000FF"/>
                   </a:solidFill>
                 </a:uFill>
-                <a:hlinkClick r:id="rId2"/>
+                <a:hlinkClick r:id="rId3"/>
               </a:rPr>
               <a:t>Enlace</a:t>
             </a:r>
@@ -14667,7 +17815,7 @@
           </a:ln>
           <a:extLst>
             <a:ext uri="{C572A759-6A51-4108-AA02-DFA0A04FC94B}">
-              <ma14:wrappingTextBoxFlag xmlns:ma14="http://schemas.microsoft.com/office/mac/drawingml/2011/main" xmlns:a14="http://schemas.microsoft.com/office/drawing/2010/main" xmlns:m="http://schemas.openxmlformats.org/officeDocument/2006/math" xmlns="" val="1"/>
+              <ma14:wrappingTextBoxFlag xmlns="" xmlns:m="http://schemas.openxmlformats.org/officeDocument/2006/math" xmlns:a14="http://schemas.microsoft.com/office/drawing/2010/main" xmlns:ma14="http://schemas.microsoft.com/office/mac/drawingml/2011/main" val="1"/>
             </a:ext>
           </a:extLst>
         </p:spPr>
@@ -14690,7 +17838,7 @@
                 <a:ea typeface="Open Sans"/>
                 <a:cs typeface="Open Sans"/>
                 <a:sym typeface="Open Sans"/>
-                <a:hlinkClick r:id="rId3"/>
+                <a:hlinkClick r:id="rId4"/>
               </a:defRPr>
             </a:lvl1pPr>
           </a:lstStyle>
@@ -14713,7 +17861,7 @@
                     <a:srgbClr val="0000FF"/>
                   </a:solidFill>
                 </a:uFill>
-                <a:hlinkClick r:id="rId3"/>
+                <a:hlinkClick r:id="rId4"/>
               </a:rPr>
               <a:t>Enlace</a:t>
             </a:r>
@@ -14739,7 +17887,7 @@
           </a:ln>
           <a:extLst>
             <a:ext uri="{C572A759-6A51-4108-AA02-DFA0A04FC94B}">
-              <ma14:wrappingTextBoxFlag xmlns:ma14="http://schemas.microsoft.com/office/mac/drawingml/2011/main" xmlns:a14="http://schemas.microsoft.com/office/drawing/2010/main" xmlns:m="http://schemas.openxmlformats.org/officeDocument/2006/math" xmlns="" val="1"/>
+              <ma14:wrappingTextBoxFlag xmlns="" xmlns:m="http://schemas.openxmlformats.org/officeDocument/2006/math" xmlns:a14="http://schemas.microsoft.com/office/drawing/2010/main" xmlns:ma14="http://schemas.microsoft.com/office/mac/drawingml/2011/main" val="1"/>
             </a:ext>
           </a:extLst>
         </p:spPr>
@@ -14822,7 +17970,7 @@
                     <a:srgbClr val="0000FF"/>
                   </a:solidFill>
                 </a:uFill>
-                <a:hlinkClick r:id="rId4"/>
+                <a:hlinkClick r:id="rId5"/>
               </a:rPr>
               <a:t>compatibilidad</a:t>
             </a:r>
@@ -14836,7 +17984,7 @@
                     <a:srgbClr val="0000FF"/>
                   </a:solidFill>
                 </a:uFill>
-                <a:hlinkClick r:id="rId4"/>
+                <a:hlinkClick r:id="rId5"/>
               </a:rPr>
               <a:t> de </a:t>
             </a:r>
@@ -14850,7 +17998,7 @@
                     <a:srgbClr val="0000FF"/>
                   </a:solidFill>
                 </a:uFill>
-                <a:hlinkClick r:id="rId4"/>
+                <a:hlinkClick r:id="rId5"/>
               </a:rPr>
               <a:t>características</a:t>
             </a:r>
@@ -14863,7 +18011,7 @@
                   <a:srgbClr val="0000FF"/>
                 </a:solidFill>
               </a:uFill>
-              <a:hlinkClick r:id="rId4"/>
+              <a:hlinkClick r:id="rId5"/>
             </a:endParaRPr>
           </a:p>
         </p:txBody>
@@ -14924,7 +18072,7 @@
           </a:ln>
           <a:extLst>
             <a:ext uri="{C572A759-6A51-4108-AA02-DFA0A04FC94B}">
-              <ma14:wrappingTextBoxFlag xmlns:ma14="http://schemas.microsoft.com/office/mac/drawingml/2011/main" xmlns:a14="http://schemas.microsoft.com/office/drawing/2010/main" xmlns:m="http://schemas.openxmlformats.org/officeDocument/2006/math" xmlns="" val="1"/>
+              <ma14:wrappingTextBoxFlag xmlns="" xmlns:m="http://schemas.openxmlformats.org/officeDocument/2006/math" xmlns:a14="http://schemas.microsoft.com/office/drawing/2010/main" xmlns:ma14="http://schemas.microsoft.com/office/mac/drawingml/2011/main" val="1"/>
             </a:ext>
           </a:extLst>
         </p:spPr>
@@ -14971,13 +18119,13 @@
           <p:nvPr/>
         </p:nvPicPr>
         <p:blipFill>
-          <a:blip r:embed="rId5">
+          <a:blip r:embed="rId6">
             <a:extLst>
               <a:ext uri="{28A0092B-C50C-407E-A947-70E740481C1C}">
                 <a14:useLocalDpi xmlns:a14="http://schemas.microsoft.com/office/drawing/2010/main" val="0"/>
               </a:ext>
               <a:ext uri="{96DAC541-7B7A-43D3-8B79-37D633B846F1}">
-                <asvg:svgBlip xmlns:asvg="http://schemas.microsoft.com/office/drawing/2016/SVG/main" r:embed="rId6"/>
+                <asvg:svgBlip xmlns:asvg="http://schemas.microsoft.com/office/drawing/2016/SVG/main" r:embed="rId7"/>
               </a:ext>
             </a:extLst>
           </a:blip>
@@ -15014,7 +18162,7 @@
           </a:ln>
           <a:extLst>
             <a:ext uri="{C572A759-6A51-4108-AA02-DFA0A04FC94B}">
-              <ma14:wrappingTextBoxFlag xmlns:ma14="http://schemas.microsoft.com/office/mac/drawingml/2011/main" xmlns:a14="http://schemas.microsoft.com/office/drawing/2010/main" xmlns:m="http://schemas.openxmlformats.org/officeDocument/2006/math" xmlns="" val="1"/>
+              <ma14:wrappingTextBoxFlag xmlns="" xmlns:m="http://schemas.openxmlformats.org/officeDocument/2006/math" xmlns:a14="http://schemas.microsoft.com/office/drawing/2010/main" xmlns:ma14="http://schemas.microsoft.com/office/mac/drawingml/2011/main" val="1"/>
             </a:ext>
           </a:extLst>
         </p:spPr>
@@ -15063,7 +18211,7 @@
           </a:ln>
           <a:extLst>
             <a:ext uri="{C572A759-6A51-4108-AA02-DFA0A04FC94B}">
-              <ma14:wrappingTextBoxFlag xmlns:ma14="http://schemas.microsoft.com/office/mac/drawingml/2011/main" xmlns:a14="http://schemas.microsoft.com/office/drawing/2010/main" xmlns:m="http://schemas.openxmlformats.org/officeDocument/2006/math" xmlns="" val="1"/>
+              <ma14:wrappingTextBoxFlag xmlns="" xmlns:m="http://schemas.openxmlformats.org/officeDocument/2006/math" xmlns:a14="http://schemas.microsoft.com/office/drawing/2010/main" xmlns:ma14="http://schemas.microsoft.com/office/mac/drawingml/2011/main" val="1"/>
             </a:ext>
           </a:extLst>
         </p:spPr>
@@ -15114,7 +18262,7 @@
           </a:ln>
           <a:extLst>
             <a:ext uri="{C572A759-6A51-4108-AA02-DFA0A04FC94B}">
-              <ma14:wrappingTextBoxFlag xmlns:ma14="http://schemas.microsoft.com/office/mac/drawingml/2011/main" xmlns:a14="http://schemas.microsoft.com/office/drawing/2010/main" xmlns:m="http://schemas.openxmlformats.org/officeDocument/2006/math" xmlns="" val="1"/>
+              <ma14:wrappingTextBoxFlag xmlns="" xmlns:m="http://schemas.openxmlformats.org/officeDocument/2006/math" xmlns:a14="http://schemas.microsoft.com/office/drawing/2010/main" xmlns:ma14="http://schemas.microsoft.com/office/mac/drawingml/2011/main" val="1"/>
             </a:ext>
           </a:extLst>
         </p:spPr>
@@ -15171,7 +18319,7 @@
           </a:ln>
           <a:extLst>
             <a:ext uri="{C572A759-6A51-4108-AA02-DFA0A04FC94B}">
-              <ma14:wrappingTextBoxFlag xmlns:ma14="http://schemas.microsoft.com/office/mac/drawingml/2011/main" xmlns:a14="http://schemas.microsoft.com/office/drawing/2010/main" xmlns:m="http://schemas.openxmlformats.org/officeDocument/2006/math" xmlns="" val="1"/>
+              <ma14:wrappingTextBoxFlag xmlns="" xmlns:m="http://schemas.openxmlformats.org/officeDocument/2006/math" xmlns:a14="http://schemas.microsoft.com/office/drawing/2010/main" xmlns:ma14="http://schemas.microsoft.com/office/mac/drawingml/2011/main" val="1"/>
             </a:ext>
           </a:extLst>
         </p:spPr>
@@ -15245,13 +18393,13 @@
           <p:nvPr/>
         </p:nvPicPr>
         <p:blipFill>
-          <a:blip r:embed="rId7" cstate="print">
+          <a:blip r:embed="rId8" cstate="print">
             <a:extLst>
               <a:ext uri="{28A0092B-C50C-407E-A947-70E740481C1C}">
                 <a14:useLocalDpi xmlns:a14="http://schemas.microsoft.com/office/drawing/2010/main" val="0"/>
               </a:ext>
               <a:ext uri="{96DAC541-7B7A-43D3-8B79-37D633B846F1}">
-                <asvg:svgBlip xmlns:asvg="http://schemas.microsoft.com/office/drawing/2016/SVG/main" r:embed="rId8"/>
+                <asvg:svgBlip xmlns:asvg="http://schemas.microsoft.com/office/drawing/2016/SVG/main" r:embed="rId9"/>
               </a:ext>
             </a:extLst>
           </a:blip>
@@ -15284,13 +18432,13 @@
           <p:nvPr/>
         </p:nvPicPr>
         <p:blipFill>
-          <a:blip r:embed="rId9" cstate="print">
+          <a:blip r:embed="rId10" cstate="print">
             <a:extLst>
               <a:ext uri="{28A0092B-C50C-407E-A947-70E740481C1C}">
                 <a14:useLocalDpi xmlns:a14="http://schemas.microsoft.com/office/drawing/2010/main" val="0"/>
               </a:ext>
               <a:ext uri="{96DAC541-7B7A-43D3-8B79-37D633B846F1}">
-                <asvg:svgBlip xmlns:asvg="http://schemas.microsoft.com/office/drawing/2016/SVG/main" r:embed="rId10"/>
+                <asvg:svgBlip xmlns:asvg="http://schemas.microsoft.com/office/drawing/2016/SVG/main" r:embed="rId11"/>
               </a:ext>
             </a:extLst>
           </a:blip>
@@ -15414,7 +18562,7 @@
             <a:effectLst/>
             <a:extLst>
               <a:ext uri="{C572A759-6A51-4108-AA02-DFA0A04FC94B}">
-                <ma14:wrappingTextBoxFlag xmlns:ma14="http://schemas.microsoft.com/office/mac/drawingml/2011/main" xmlns:a14="http://schemas.microsoft.com/office/drawing/2010/main" xmlns:m="http://schemas.openxmlformats.org/officeDocument/2006/math" xmlns="" val="1"/>
+                <ma14:wrappingTextBoxFlag xmlns="" xmlns:m="http://schemas.openxmlformats.org/officeDocument/2006/math" xmlns:a14="http://schemas.microsoft.com/office/drawing/2010/main" xmlns:ma14="http://schemas.microsoft.com/office/mac/drawingml/2011/main" val="1"/>
               </a:ext>
             </a:extLst>
           </p:spPr>
@@ -15476,7 +18624,7 @@
             <a:effectLst/>
             <a:extLst>
               <a:ext uri="{C572A759-6A51-4108-AA02-DFA0A04FC94B}">
-                <ma14:wrappingTextBoxFlag xmlns:ma14="http://schemas.microsoft.com/office/mac/drawingml/2011/main" xmlns:a14="http://schemas.microsoft.com/office/drawing/2010/main" xmlns:m="http://schemas.openxmlformats.org/officeDocument/2006/math" xmlns="" val="1"/>
+                <ma14:wrappingTextBoxFlag xmlns="" xmlns:m="http://schemas.openxmlformats.org/officeDocument/2006/math" xmlns:a14="http://schemas.microsoft.com/office/drawing/2010/main" xmlns:ma14="http://schemas.microsoft.com/office/mac/drawingml/2011/main" val="1"/>
               </a:ext>
             </a:extLst>
           </p:spPr>
@@ -15538,7 +18686,7 @@
           <p:nvPr/>
         </p:nvPicPr>
         <p:blipFill>
-          <a:blip r:embed="rId11" cstate="print">
+          <a:blip r:embed="rId12" cstate="print">
             <a:extLst>
               <a:ext uri="{28A0092B-C50C-407E-A947-70E740481C1C}">
                 <a14:useLocalDpi xmlns:a14="http://schemas.microsoft.com/office/drawing/2010/main" val="0"/>
@@ -16013,7 +19161,7 @@
           <a:effectLst/>
           <a:extLst>
             <a:ext uri="{C572A759-6A51-4108-AA02-DFA0A04FC94B}">
-              <ma14:wrappingTextBoxFlag xmlns="" xmlns:m="http://schemas.openxmlformats.org/officeDocument/2006/math" xmlns:a14="http://schemas.microsoft.com/office/drawing/2010/main" xmlns:ma14="http://schemas.microsoft.com/office/mac/drawingml/2011/main" val="1"/>
+              <ma14:wrappingTextBoxFlag xmlns:ma14="http://schemas.microsoft.com/office/mac/drawingml/2011/main" xmlns:a14="http://schemas.microsoft.com/office/drawing/2010/main" xmlns:m="http://schemas.openxmlformats.org/officeDocument/2006/math" xmlns="" val="1"/>
             </a:ext>
           </a:extLst>
         </p:spPr>
@@ -16062,7 +19210,7 @@
           </a:ln>
           <a:extLst>
             <a:ext uri="{C572A759-6A51-4108-AA02-DFA0A04FC94B}">
-              <ma14:wrappingTextBoxFlag xmlns="" xmlns:m="http://schemas.openxmlformats.org/officeDocument/2006/math" xmlns:a14="http://schemas.microsoft.com/office/drawing/2010/main" xmlns:ma14="http://schemas.microsoft.com/office/mac/drawingml/2011/main" val="1"/>
+              <ma14:wrappingTextBoxFlag xmlns:ma14="http://schemas.microsoft.com/office/mac/drawingml/2011/main" xmlns:a14="http://schemas.microsoft.com/office/drawing/2010/main" xmlns:m="http://schemas.openxmlformats.org/officeDocument/2006/math" xmlns="" val="1"/>
             </a:ext>
           </a:extLst>
         </p:spPr>
@@ -16100,7 +19248,7 @@
                   <a:srgbClr val="0000FF"/>
                 </a:solidFill>
               </a:uFill>
-              <a:hlinkClick r:id="rId2"/>
+              <a:hlinkClick r:id="rId3"/>
             </a:endParaRPr>
           </a:p>
         </p:txBody>
@@ -16135,7 +19283,7 @@
           <a:effectLst/>
           <a:extLst>
             <a:ext uri="{C572A759-6A51-4108-AA02-DFA0A04FC94B}">
-              <ma14:wrappingTextBoxFlag xmlns="" xmlns:m="http://schemas.openxmlformats.org/officeDocument/2006/math" xmlns:a14="http://schemas.microsoft.com/office/drawing/2010/main" xmlns:ma14="http://schemas.microsoft.com/office/mac/drawingml/2011/main" val="1"/>
+              <ma14:wrappingTextBoxFlag xmlns:ma14="http://schemas.microsoft.com/office/mac/drawingml/2011/main" xmlns:a14="http://schemas.microsoft.com/office/drawing/2010/main" xmlns:m="http://schemas.openxmlformats.org/officeDocument/2006/math" xmlns="" val="1"/>
             </a:ext>
           </a:extLst>
         </p:spPr>
@@ -16188,13 +19336,13 @@
           <p:nvPr/>
         </p:nvPicPr>
         <p:blipFill>
-          <a:blip r:embed="rId3">
+          <a:blip r:embed="rId4">
             <a:extLst>
               <a:ext uri="{28A0092B-C50C-407E-A947-70E740481C1C}">
                 <a14:useLocalDpi xmlns:a14="http://schemas.microsoft.com/office/drawing/2010/main" val="0"/>
               </a:ext>
               <a:ext uri="{96DAC541-7B7A-43D3-8B79-37D633B846F1}">
-                <asvg:svgBlip xmlns:asvg="http://schemas.microsoft.com/office/drawing/2016/SVG/main" r:embed="rId4"/>
+                <asvg:svgBlip xmlns:asvg="http://schemas.microsoft.com/office/drawing/2016/SVG/main" r:embed="rId5"/>
               </a:ext>
             </a:extLst>
           </a:blip>
@@ -16226,13 +19374,13 @@
           <p:nvPr/>
         </p:nvPicPr>
         <p:blipFill>
-          <a:blip r:embed="rId5">
+          <a:blip r:embed="rId6">
             <a:extLst>
               <a:ext uri="{28A0092B-C50C-407E-A947-70E740481C1C}">
                 <a14:useLocalDpi xmlns:a14="http://schemas.microsoft.com/office/drawing/2010/main" val="0"/>
               </a:ext>
               <a:ext uri="{96DAC541-7B7A-43D3-8B79-37D633B846F1}">
-                <asvg:svgBlip xmlns:asvg="http://schemas.microsoft.com/office/drawing/2016/SVG/main" r:embed="rId6"/>
+                <asvg:svgBlip xmlns:asvg="http://schemas.microsoft.com/office/drawing/2016/SVG/main" r:embed="rId7"/>
               </a:ext>
             </a:extLst>
           </a:blip>
@@ -16264,13 +19412,13 @@
           <p:nvPr/>
         </p:nvPicPr>
         <p:blipFill>
-          <a:blip r:embed="rId7" cstate="print">
+          <a:blip r:embed="rId8" cstate="print">
             <a:extLst>
               <a:ext uri="{28A0092B-C50C-407E-A947-70E740481C1C}">
                 <a14:useLocalDpi xmlns:a14="http://schemas.microsoft.com/office/drawing/2010/main" val="0"/>
               </a:ext>
               <a:ext uri="{96DAC541-7B7A-43D3-8B79-37D633B846F1}">
-                <asvg:svgBlip xmlns:asvg="http://schemas.microsoft.com/office/drawing/2016/SVG/main" r:embed="rId8"/>
+                <asvg:svgBlip xmlns:asvg="http://schemas.microsoft.com/office/drawing/2016/SVG/main" r:embed="rId9"/>
               </a:ext>
             </a:extLst>
           </a:blip>
@@ -16303,13 +19451,13 @@
           <p:nvPr/>
         </p:nvPicPr>
         <p:blipFill>
-          <a:blip r:embed="rId9">
+          <a:blip r:embed="rId10">
             <a:extLst>
               <a:ext uri="{28A0092B-C50C-407E-A947-70E740481C1C}">
                 <a14:useLocalDpi xmlns:a14="http://schemas.microsoft.com/office/drawing/2010/main" val="0"/>
               </a:ext>
               <a:ext uri="{96DAC541-7B7A-43D3-8B79-37D633B846F1}">
-                <asvg:svgBlip xmlns:asvg="http://schemas.microsoft.com/office/drawing/2016/SVG/main" r:embed="rId10"/>
+                <asvg:svgBlip xmlns:asvg="http://schemas.microsoft.com/office/drawing/2016/SVG/main" r:embed="rId11"/>
               </a:ext>
             </a:extLst>
           </a:blip>
@@ -16342,13 +19490,13 @@
           <p:nvPr/>
         </p:nvPicPr>
         <p:blipFill>
-          <a:blip r:embed="rId11" cstate="print">
+          <a:blip r:embed="rId12" cstate="print">
             <a:extLst>
               <a:ext uri="{28A0092B-C50C-407E-A947-70E740481C1C}">
                 <a14:useLocalDpi xmlns:a14="http://schemas.microsoft.com/office/drawing/2010/main" val="0"/>
               </a:ext>
               <a:ext uri="{96DAC541-7B7A-43D3-8B79-37D633B846F1}">
-                <asvg:svgBlip xmlns:asvg="http://schemas.microsoft.com/office/drawing/2016/SVG/main" r:embed="rId12"/>
+                <asvg:svgBlip xmlns:asvg="http://schemas.microsoft.com/office/drawing/2016/SVG/main" r:embed="rId13"/>
               </a:ext>
             </a:extLst>
           </a:blip>
@@ -16381,13 +19529,13 @@
           <p:nvPr/>
         </p:nvPicPr>
         <p:blipFill>
-          <a:blip r:embed="rId13" cstate="print">
+          <a:blip r:embed="rId14" cstate="print">
             <a:extLst>
               <a:ext uri="{28A0092B-C50C-407E-A947-70E740481C1C}">
                 <a14:useLocalDpi xmlns:a14="http://schemas.microsoft.com/office/drawing/2010/main" val="0"/>
               </a:ext>
               <a:ext uri="{96DAC541-7B7A-43D3-8B79-37D633B846F1}">
-                <asvg:svgBlip xmlns:asvg="http://schemas.microsoft.com/office/drawing/2016/SVG/main" r:embed="rId14"/>
+                <asvg:svgBlip xmlns:asvg="http://schemas.microsoft.com/office/drawing/2016/SVG/main" r:embed="rId15"/>
               </a:ext>
             </a:extLst>
           </a:blip>
@@ -16420,13 +19568,13 @@
           <p:nvPr/>
         </p:nvPicPr>
         <p:blipFill>
-          <a:blip r:embed="rId15" cstate="print">
+          <a:blip r:embed="rId16" cstate="print">
             <a:extLst>
               <a:ext uri="{28A0092B-C50C-407E-A947-70E740481C1C}">
                 <a14:useLocalDpi xmlns:a14="http://schemas.microsoft.com/office/drawing/2010/main" val="0"/>
               </a:ext>
               <a:ext uri="{96DAC541-7B7A-43D3-8B79-37D633B846F1}">
-                <asvg:svgBlip xmlns:asvg="http://schemas.microsoft.com/office/drawing/2016/SVG/main" r:embed="rId16"/>
+                <asvg:svgBlip xmlns:asvg="http://schemas.microsoft.com/office/drawing/2016/SVG/main" r:embed="rId17"/>
               </a:ext>
             </a:extLst>
           </a:blip>
@@ -16469,7 +19617,7 @@
           </a:ln>
           <a:extLst>
             <a:ext uri="{C572A759-6A51-4108-AA02-DFA0A04FC94B}">
-              <ma14:wrappingTextBoxFlag xmlns="" xmlns:m="http://schemas.openxmlformats.org/officeDocument/2006/math" xmlns:a14="http://schemas.microsoft.com/office/drawing/2010/main" xmlns:ma14="http://schemas.microsoft.com/office/mac/drawingml/2011/main" val="1"/>
+              <ma14:wrappingTextBoxFlag xmlns:ma14="http://schemas.microsoft.com/office/mac/drawingml/2011/main" xmlns:a14="http://schemas.microsoft.com/office/drawing/2010/main" xmlns:m="http://schemas.openxmlformats.org/officeDocument/2006/math" xmlns="" val="1"/>
             </a:ext>
           </a:extLst>
         </p:spPr>
@@ -16507,7 +19655,7 @@
                   <a:srgbClr val="0000FF"/>
                 </a:solidFill>
               </a:uFill>
-              <a:hlinkClick r:id="rId2"/>
+              <a:hlinkClick r:id="rId3"/>
             </a:endParaRPr>
           </a:p>
         </p:txBody>
@@ -16527,13 +19675,13 @@
           <p:nvPr/>
         </p:nvPicPr>
         <p:blipFill>
-          <a:blip r:embed="rId17" cstate="print">
+          <a:blip r:embed="rId18" cstate="print">
             <a:extLst>
               <a:ext uri="{28A0092B-C50C-407E-A947-70E740481C1C}">
                 <a14:useLocalDpi xmlns:a14="http://schemas.microsoft.com/office/drawing/2010/main" val="0"/>
               </a:ext>
               <a:ext uri="{96DAC541-7B7A-43D3-8B79-37D633B846F1}">
-                <asvg:svgBlip xmlns:asvg="http://schemas.microsoft.com/office/drawing/2016/SVG/main" r:embed="rId18"/>
+                <asvg:svgBlip xmlns:asvg="http://schemas.microsoft.com/office/drawing/2016/SVG/main" r:embed="rId19"/>
               </a:ext>
             </a:extLst>
           </a:blip>
@@ -16566,13 +19714,13 @@
           <p:nvPr/>
         </p:nvPicPr>
         <p:blipFill>
-          <a:blip r:embed="rId19" cstate="print">
+          <a:blip r:embed="rId20" cstate="print">
             <a:extLst>
               <a:ext uri="{28A0092B-C50C-407E-A947-70E740481C1C}">
                 <a14:useLocalDpi xmlns:a14="http://schemas.microsoft.com/office/drawing/2010/main" val="0"/>
               </a:ext>
               <a:ext uri="{96DAC541-7B7A-43D3-8B79-37D633B846F1}">
-                <asvg:svgBlip xmlns:asvg="http://schemas.microsoft.com/office/drawing/2016/SVG/main" r:embed="rId20"/>
+                <asvg:svgBlip xmlns:asvg="http://schemas.microsoft.com/office/drawing/2016/SVG/main" r:embed="rId21"/>
               </a:ext>
             </a:extLst>
           </a:blip>
@@ -16605,13 +19753,13 @@
           <p:nvPr/>
         </p:nvPicPr>
         <p:blipFill>
-          <a:blip r:embed="rId21">
+          <a:blip r:embed="rId22">
             <a:extLst>
               <a:ext uri="{28A0092B-C50C-407E-A947-70E740481C1C}">
                 <a14:useLocalDpi xmlns:a14="http://schemas.microsoft.com/office/drawing/2010/main" val="0"/>
               </a:ext>
               <a:ext uri="{96DAC541-7B7A-43D3-8B79-37D633B846F1}">
-                <asvg:svgBlip xmlns:asvg="http://schemas.microsoft.com/office/drawing/2016/SVG/main" r:embed="rId22"/>
+                <asvg:svgBlip xmlns:asvg="http://schemas.microsoft.com/office/drawing/2016/SVG/main" r:embed="rId23"/>
               </a:ext>
             </a:extLst>
           </a:blip>
@@ -16766,7 +19914,7 @@
           </a:ln>
           <a:extLst>
             <a:ext uri="{C572A759-6A51-4108-AA02-DFA0A04FC94B}">
-              <ma14:wrappingTextBoxFlag xmlns="" xmlns:m="http://schemas.openxmlformats.org/officeDocument/2006/math" xmlns:a14="http://schemas.microsoft.com/office/drawing/2010/main" xmlns:ma14="http://schemas.microsoft.com/office/mac/drawingml/2011/main" val="1"/>
+              <ma14:wrappingTextBoxFlag xmlns:ma14="http://schemas.microsoft.com/office/mac/drawingml/2011/main" xmlns:a14="http://schemas.microsoft.com/office/drawing/2010/main" xmlns:m="http://schemas.openxmlformats.org/officeDocument/2006/math" xmlns="" val="1"/>
             </a:ext>
           </a:extLst>
         </p:spPr>
@@ -16800,7 +19948,7 @@
                   <a:srgbClr val="0000FF"/>
                 </a:solidFill>
               </a:uFill>
-              <a:hlinkClick r:id="rId2"/>
+              <a:hlinkClick r:id="rId3"/>
             </a:endParaRPr>
           </a:p>
         </p:txBody>
@@ -16820,7 +19968,7 @@
           <p:nvPr/>
         </p:nvPicPr>
         <p:blipFill>
-          <a:blip r:embed="rId23" cstate="print">
+          <a:blip r:embed="rId24" cstate="print">
             <a:extLst>
               <a:ext uri="{28A0092B-C50C-407E-A947-70E740481C1C}">
                 <a14:useLocalDpi xmlns:a14="http://schemas.microsoft.com/office/drawing/2010/main" val="0"/>
@@ -17124,13 +20272,13 @@
           <p:nvPr/>
         </p:nvPicPr>
         <p:blipFill>
-          <a:blip r:embed="rId24" cstate="print">
+          <a:blip r:embed="rId25" cstate="print">
             <a:extLst>
               <a:ext uri="{28A0092B-C50C-407E-A947-70E740481C1C}">
                 <a14:useLocalDpi xmlns:a14="http://schemas.microsoft.com/office/drawing/2010/main" val="0"/>
               </a:ext>
               <a:ext uri="{96DAC541-7B7A-43D3-8B79-37D633B846F1}">
-                <asvg:svgBlip xmlns:asvg="http://schemas.microsoft.com/office/drawing/2016/SVG/main" r:embed="rId25"/>
+                <asvg:svgBlip xmlns:asvg="http://schemas.microsoft.com/office/drawing/2016/SVG/main" r:embed="rId26"/>
               </a:ext>
             </a:extLst>
           </a:blip>
@@ -17163,13 +20311,13 @@
           <p:nvPr/>
         </p:nvPicPr>
         <p:blipFill>
-          <a:blip r:embed="rId24" cstate="print">
+          <a:blip r:embed="rId25" cstate="print">
             <a:extLst>
               <a:ext uri="{28A0092B-C50C-407E-A947-70E740481C1C}">
                 <a14:useLocalDpi xmlns:a14="http://schemas.microsoft.com/office/drawing/2010/main" val="0"/>
               </a:ext>
               <a:ext uri="{96DAC541-7B7A-43D3-8B79-37D633B846F1}">
-                <asvg:svgBlip xmlns:asvg="http://schemas.microsoft.com/office/drawing/2016/SVG/main" r:embed="rId25"/>
+                <asvg:svgBlip xmlns:asvg="http://schemas.microsoft.com/office/drawing/2016/SVG/main" r:embed="rId26"/>
               </a:ext>
             </a:extLst>
           </a:blip>
@@ -17300,7 +20448,7 @@
           </a:ln>
           <a:extLst>
             <a:ext uri="{C572A759-6A51-4108-AA02-DFA0A04FC94B}">
-              <ma14:wrappingTextBoxFlag xmlns="" xmlns:m="http://schemas.openxmlformats.org/officeDocument/2006/math" xmlns:a14="http://schemas.microsoft.com/office/drawing/2010/main" xmlns:ma14="http://schemas.microsoft.com/office/mac/drawingml/2011/main" val="1"/>
+              <ma14:wrappingTextBoxFlag xmlns:ma14="http://schemas.microsoft.com/office/mac/drawingml/2011/main" xmlns:a14="http://schemas.microsoft.com/office/drawing/2010/main" xmlns:m="http://schemas.openxmlformats.org/officeDocument/2006/math" xmlns="" val="1"/>
             </a:ext>
           </a:extLst>
         </p:spPr>

</xml_diff>

<commit_message>
update, reviewing module 2 languages
</commit_message>
<xml_diff>
--- a/02-languages/01-teoria/01 Introducción a Javascript.pptx
+++ b/02-languages/01-teoria/01 Introducción a Javascript.pptx
@@ -1033,7 +1033,7 @@
                 </a:highlight>
                 <a:latin typeface="Dank Mono Regular" panose="00000509000000000000" pitchFamily="50" charset="0"/>
               </a:rPr>
-              <a:t> hemos representado la “receta” de la web con sus 3 ingredientes fundamentales. Sin embargo, los hemos pintado de forma proporcional o equitativa: con el mismo tamaño. Esto pudo ser así durante el nacimiento de JS puesto que su misión era apoyar a los otros 2 lenguajes añadiendo capacidades ligeras de scriptings, es decir, permitiendo ejecutar pequeños trozos de código puntualmente para hacer laguna que otra tarea. La realidad es que a medida que maduraban las aplicaciones, lo hacían gracias al enorme crecimiento de JavaScript con respecto a los otros 2. JS ha tomando un gran peso e impacto a la hora de confeccionar aplicaciones web en la actualidad.</a:t>
+              <a:t> hemos representado la “receta” de la web con sus 3 ingredientes fundamentales. Sin embargo, los hemos pintado de forma proporcional o equitativa: con el mismo tamaño. Esto pudo ser así durante el nacimiento de JS puesto que su misión era apoyar a los otros 2 lenguajes añadiendo capacidades ligeras de scriptings, es decir, permitiendo ejecutar pequeños trozos de código puntualmente para hacer alguna que otra tarea. La realidad es que a medida que maduraban las aplicaciones, lo hacían gracias al enorme crecimiento de JavaScript con respecto a los otros 2. JS ha tomando un gran peso e impacto a la hora de confeccionar aplicaciones web en la actualidad.</a:t>
             </a:r>
             <a:endParaRPr lang="es-ES" dirty="0"/>
           </a:p>
@@ -5528,7 +5528,7 @@
           </a:ln>
           <a:extLst>
             <a:ext uri="{C572A759-6A51-4108-AA02-DFA0A04FC94B}">
-              <ma14:wrappingTextBoxFlag xmlns:ma14="http://schemas.microsoft.com/office/mac/drawingml/2011/main" xmlns:a14="http://schemas.microsoft.com/office/drawing/2010/main" xmlns:m="http://schemas.openxmlformats.org/officeDocument/2006/math" xmlns="" val="1"/>
+              <ma14:wrappingTextBoxFlag xmlns="" xmlns:m="http://schemas.openxmlformats.org/officeDocument/2006/math" xmlns:a14="http://schemas.microsoft.com/office/drawing/2010/main" xmlns:ma14="http://schemas.microsoft.com/office/mac/drawingml/2011/main" val="1"/>
             </a:ext>
           </a:extLst>
         </p:spPr>
@@ -5567,7 +5567,7 @@
           </a:ln>
           <a:extLst>
             <a:ext uri="{C572A759-6A51-4108-AA02-DFA0A04FC94B}">
-              <ma14:wrappingTextBoxFlag xmlns:ma14="http://schemas.microsoft.com/office/mac/drawingml/2011/main" xmlns:a14="http://schemas.microsoft.com/office/drawing/2010/main" xmlns:m="http://schemas.openxmlformats.org/officeDocument/2006/math" xmlns="" val="1"/>
+              <ma14:wrappingTextBoxFlag xmlns="" xmlns:m="http://schemas.openxmlformats.org/officeDocument/2006/math" xmlns:a14="http://schemas.microsoft.com/office/drawing/2010/main" xmlns:ma14="http://schemas.microsoft.com/office/mac/drawingml/2011/main" val="1"/>
             </a:ext>
           </a:extLst>
         </p:spPr>
@@ -6525,7 +6525,7 @@
           </a:ln>
           <a:extLst>
             <a:ext uri="{C572A759-6A51-4108-AA02-DFA0A04FC94B}">
-              <ma14:wrappingTextBoxFlag xmlns:ma14="http://schemas.microsoft.com/office/mac/drawingml/2011/main" xmlns:a14="http://schemas.microsoft.com/office/drawing/2010/main" xmlns:m="http://schemas.openxmlformats.org/officeDocument/2006/math" xmlns="" val="1"/>
+              <ma14:wrappingTextBoxFlag xmlns="" xmlns:m="http://schemas.openxmlformats.org/officeDocument/2006/math" xmlns:a14="http://schemas.microsoft.com/office/drawing/2010/main" xmlns:ma14="http://schemas.microsoft.com/office/mac/drawingml/2011/main" val="1"/>
             </a:ext>
           </a:extLst>
         </p:spPr>
@@ -6575,7 +6575,7 @@
           </a:ln>
           <a:extLst>
             <a:ext uri="{C572A759-6A51-4108-AA02-DFA0A04FC94B}">
-              <ma14:wrappingTextBoxFlag xmlns:ma14="http://schemas.microsoft.com/office/mac/drawingml/2011/main" xmlns:a14="http://schemas.microsoft.com/office/drawing/2010/main" xmlns:m="http://schemas.openxmlformats.org/officeDocument/2006/math" xmlns="" val="1"/>
+              <ma14:wrappingTextBoxFlag xmlns="" xmlns:m="http://schemas.openxmlformats.org/officeDocument/2006/math" xmlns:a14="http://schemas.microsoft.com/office/drawing/2010/main" xmlns:ma14="http://schemas.microsoft.com/office/mac/drawingml/2011/main" val="1"/>
             </a:ext>
           </a:extLst>
         </p:spPr>
@@ -6864,7 +6864,7 @@
             <a:effectLst/>
             <a:extLst>
               <a:ext uri="{C572A759-6A51-4108-AA02-DFA0A04FC94B}">
-                <ma14:wrappingTextBoxFlag xmlns:ma14="http://schemas.microsoft.com/office/mac/drawingml/2011/main" xmlns:a14="http://schemas.microsoft.com/office/drawing/2010/main" xmlns:m="http://schemas.openxmlformats.org/officeDocument/2006/math" xmlns="" val="1"/>
+                <ma14:wrappingTextBoxFlag xmlns="" xmlns:m="http://schemas.openxmlformats.org/officeDocument/2006/math" xmlns:a14="http://schemas.microsoft.com/office/drawing/2010/main" xmlns:ma14="http://schemas.microsoft.com/office/mac/drawingml/2011/main" val="1"/>
               </a:ext>
             </a:extLst>
           </p:spPr>
@@ -6914,7 +6914,7 @@
             <a:effectLst/>
             <a:extLst>
               <a:ext uri="{C572A759-6A51-4108-AA02-DFA0A04FC94B}">
-                <ma14:wrappingTextBoxFlag xmlns:ma14="http://schemas.microsoft.com/office/mac/drawingml/2011/main" xmlns:a14="http://schemas.microsoft.com/office/drawing/2010/main" xmlns:m="http://schemas.openxmlformats.org/officeDocument/2006/math" xmlns="" val="1"/>
+                <ma14:wrappingTextBoxFlag xmlns="" xmlns:m="http://schemas.openxmlformats.org/officeDocument/2006/math" xmlns:a14="http://schemas.microsoft.com/office/drawing/2010/main" xmlns:ma14="http://schemas.microsoft.com/office/mac/drawingml/2011/main" val="1"/>
               </a:ext>
             </a:extLst>
           </p:spPr>
@@ -6964,7 +6964,7 @@
             <a:effectLst/>
             <a:extLst>
               <a:ext uri="{C572A759-6A51-4108-AA02-DFA0A04FC94B}">
-                <ma14:wrappingTextBoxFlag xmlns:ma14="http://schemas.microsoft.com/office/mac/drawingml/2011/main" xmlns:a14="http://schemas.microsoft.com/office/drawing/2010/main" xmlns:m="http://schemas.openxmlformats.org/officeDocument/2006/math" xmlns="" val="1"/>
+                <ma14:wrappingTextBoxFlag xmlns="" xmlns:m="http://schemas.openxmlformats.org/officeDocument/2006/math" xmlns:a14="http://schemas.microsoft.com/office/drawing/2010/main" xmlns:ma14="http://schemas.microsoft.com/office/mac/drawingml/2011/main" val="1"/>
               </a:ext>
             </a:extLst>
           </p:spPr>
@@ -7014,7 +7014,7 @@
             <a:effectLst/>
             <a:extLst>
               <a:ext uri="{C572A759-6A51-4108-AA02-DFA0A04FC94B}">
-                <ma14:wrappingTextBoxFlag xmlns:ma14="http://schemas.microsoft.com/office/mac/drawingml/2011/main" xmlns:a14="http://schemas.microsoft.com/office/drawing/2010/main" xmlns:m="http://schemas.openxmlformats.org/officeDocument/2006/math" xmlns="" val="1"/>
+                <ma14:wrappingTextBoxFlag xmlns="" xmlns:m="http://schemas.openxmlformats.org/officeDocument/2006/math" xmlns:a14="http://schemas.microsoft.com/office/drawing/2010/main" xmlns:ma14="http://schemas.microsoft.com/office/mac/drawingml/2011/main" val="1"/>
               </a:ext>
             </a:extLst>
           </p:spPr>
@@ -7317,7 +7317,7 @@
               <a:effectLst/>
               <a:extLst>
                 <a:ext uri="{C572A759-6A51-4108-AA02-DFA0A04FC94B}">
-                  <ma14:wrappingTextBoxFlag xmlns:ma14="http://schemas.microsoft.com/office/mac/drawingml/2011/main" xmlns:a14="http://schemas.microsoft.com/office/drawing/2010/main" xmlns:m="http://schemas.openxmlformats.org/officeDocument/2006/math" xmlns="" val="1"/>
+                  <ma14:wrappingTextBoxFlag xmlns="" xmlns:m="http://schemas.openxmlformats.org/officeDocument/2006/math" xmlns:a14="http://schemas.microsoft.com/office/drawing/2010/main" xmlns:ma14="http://schemas.microsoft.com/office/mac/drawingml/2011/main" val="1"/>
                 </a:ext>
               </a:extLst>
             </p:spPr>
@@ -7448,7 +7448,7 @@
                 <a:effectLst/>
                 <a:extLst>
                   <a:ext uri="{C572A759-6A51-4108-AA02-DFA0A04FC94B}">
-                    <ma14:wrappingTextBoxFlag xmlns:ma14="http://schemas.microsoft.com/office/mac/drawingml/2011/main" xmlns:a14="http://schemas.microsoft.com/office/drawing/2010/main" xmlns:m="http://schemas.openxmlformats.org/officeDocument/2006/math" xmlns="" val="1"/>
+                    <ma14:wrappingTextBoxFlag xmlns="" xmlns:m="http://schemas.openxmlformats.org/officeDocument/2006/math" xmlns:a14="http://schemas.microsoft.com/office/drawing/2010/main" xmlns:ma14="http://schemas.microsoft.com/office/mac/drawingml/2011/main" val="1"/>
                   </a:ext>
                 </a:extLst>
               </p:spPr>
@@ -7638,7 +7638,7 @@
               <a:effectLst/>
               <a:extLst>
                 <a:ext uri="{C572A759-6A51-4108-AA02-DFA0A04FC94B}">
-                  <ma14:wrappingTextBoxFlag xmlns:ma14="http://schemas.microsoft.com/office/mac/drawingml/2011/main" xmlns:a14="http://schemas.microsoft.com/office/drawing/2010/main" xmlns:m="http://schemas.openxmlformats.org/officeDocument/2006/math" xmlns="" val="1"/>
+                  <ma14:wrappingTextBoxFlag xmlns="" xmlns:m="http://schemas.openxmlformats.org/officeDocument/2006/math" xmlns:a14="http://schemas.microsoft.com/office/drawing/2010/main" xmlns:ma14="http://schemas.microsoft.com/office/mac/drawingml/2011/main" val="1"/>
                 </a:ext>
               </a:extLst>
             </p:spPr>
@@ -7769,7 +7769,7 @@
                 <a:effectLst/>
                 <a:extLst>
                   <a:ext uri="{C572A759-6A51-4108-AA02-DFA0A04FC94B}">
-                    <ma14:wrappingTextBoxFlag xmlns:ma14="http://schemas.microsoft.com/office/mac/drawingml/2011/main" xmlns:a14="http://schemas.microsoft.com/office/drawing/2010/main" xmlns:m="http://schemas.openxmlformats.org/officeDocument/2006/math" xmlns="" val="1"/>
+                    <ma14:wrappingTextBoxFlag xmlns="" xmlns:m="http://schemas.openxmlformats.org/officeDocument/2006/math" xmlns:a14="http://schemas.microsoft.com/office/drawing/2010/main" xmlns:ma14="http://schemas.microsoft.com/office/mac/drawingml/2011/main" val="1"/>
                   </a:ext>
                 </a:extLst>
               </p:spPr>
@@ -7960,7 +7960,7 @@
               <a:effectLst/>
               <a:extLst>
                 <a:ext uri="{C572A759-6A51-4108-AA02-DFA0A04FC94B}">
-                  <ma14:wrappingTextBoxFlag xmlns:ma14="http://schemas.microsoft.com/office/mac/drawingml/2011/main" xmlns:a14="http://schemas.microsoft.com/office/drawing/2010/main" xmlns:m="http://schemas.openxmlformats.org/officeDocument/2006/math" xmlns="" val="1"/>
+                  <ma14:wrappingTextBoxFlag xmlns="" xmlns:m="http://schemas.openxmlformats.org/officeDocument/2006/math" xmlns:a14="http://schemas.microsoft.com/office/drawing/2010/main" xmlns:ma14="http://schemas.microsoft.com/office/mac/drawingml/2011/main" val="1"/>
                 </a:ext>
               </a:extLst>
             </p:spPr>
@@ -8093,7 +8093,7 @@
                 <a:effectLst/>
                 <a:extLst>
                   <a:ext uri="{C572A759-6A51-4108-AA02-DFA0A04FC94B}">
-                    <ma14:wrappingTextBoxFlag xmlns:ma14="http://schemas.microsoft.com/office/mac/drawingml/2011/main" xmlns:a14="http://schemas.microsoft.com/office/drawing/2010/main" xmlns:m="http://schemas.openxmlformats.org/officeDocument/2006/math" xmlns="" val="1"/>
+                    <ma14:wrappingTextBoxFlag xmlns="" xmlns:m="http://schemas.openxmlformats.org/officeDocument/2006/math" xmlns:a14="http://schemas.microsoft.com/office/drawing/2010/main" xmlns:ma14="http://schemas.microsoft.com/office/mac/drawingml/2011/main" val="1"/>
                   </a:ext>
                 </a:extLst>
               </p:spPr>
@@ -8410,7 +8410,7 @@
           </a:ln>
           <a:extLst>
             <a:ext uri="{C572A759-6A51-4108-AA02-DFA0A04FC94B}">
-              <ma14:wrappingTextBoxFlag xmlns:ma14="http://schemas.microsoft.com/office/mac/drawingml/2011/main" xmlns:a14="http://schemas.microsoft.com/office/drawing/2010/main" xmlns:m="http://schemas.openxmlformats.org/officeDocument/2006/math" xmlns="" val="1"/>
+              <ma14:wrappingTextBoxFlag xmlns="" xmlns:m="http://schemas.openxmlformats.org/officeDocument/2006/math" xmlns:a14="http://schemas.microsoft.com/office/drawing/2010/main" xmlns:ma14="http://schemas.microsoft.com/office/mac/drawingml/2011/main" val="1"/>
             </a:ext>
           </a:extLst>
         </p:spPr>
@@ -8559,7 +8559,7 @@
               <a:effectLst/>
               <a:extLst>
                 <a:ext uri="{C572A759-6A51-4108-AA02-DFA0A04FC94B}">
-                  <ma14:wrappingTextBoxFlag xmlns="" xmlns:m="http://schemas.openxmlformats.org/officeDocument/2006/math" xmlns:a14="http://schemas.microsoft.com/office/drawing/2010/main" xmlns:ma14="http://schemas.microsoft.com/office/mac/drawingml/2011/main" val="1"/>
+                  <ma14:wrappingTextBoxFlag xmlns:ma14="http://schemas.microsoft.com/office/mac/drawingml/2011/main" xmlns:a14="http://schemas.microsoft.com/office/drawing/2010/main" xmlns:m="http://schemas.openxmlformats.org/officeDocument/2006/math" xmlns="" val="1"/>
                 </a:ext>
               </a:extLst>
             </p:spPr>
@@ -8760,7 +8760,7 @@
                 <a:effectLst/>
                 <a:extLst>
                   <a:ext uri="{C572A759-6A51-4108-AA02-DFA0A04FC94B}">
-                    <ma14:wrappingTextBoxFlag xmlns="" xmlns:m="http://schemas.openxmlformats.org/officeDocument/2006/math" xmlns:a14="http://schemas.microsoft.com/office/drawing/2010/main" xmlns:ma14="http://schemas.microsoft.com/office/mac/drawingml/2011/main" val="1"/>
+                    <ma14:wrappingTextBoxFlag xmlns:ma14="http://schemas.microsoft.com/office/mac/drawingml/2011/main" xmlns:a14="http://schemas.microsoft.com/office/drawing/2010/main" xmlns:m="http://schemas.openxmlformats.org/officeDocument/2006/math" xmlns="" val="1"/>
                   </a:ext>
                 </a:extLst>
               </p:spPr>
@@ -8904,7 +8904,7 @@
                 <a:effectLst/>
                 <a:extLst>
                   <a:ext uri="{C572A759-6A51-4108-AA02-DFA0A04FC94B}">
-                    <ma14:wrappingTextBoxFlag xmlns="" xmlns:m="http://schemas.openxmlformats.org/officeDocument/2006/math" xmlns:a14="http://schemas.microsoft.com/office/drawing/2010/main" xmlns:ma14="http://schemas.microsoft.com/office/mac/drawingml/2011/main" val="1"/>
+                    <ma14:wrappingTextBoxFlag xmlns:ma14="http://schemas.microsoft.com/office/mac/drawingml/2011/main" xmlns:a14="http://schemas.microsoft.com/office/drawing/2010/main" xmlns:m="http://schemas.openxmlformats.org/officeDocument/2006/math" xmlns="" val="1"/>
                   </a:ext>
                 </a:extLst>
               </p:spPr>
@@ -9128,7 +9128,7 @@
                 <a:effectLst/>
                 <a:extLst>
                   <a:ext uri="{C572A759-6A51-4108-AA02-DFA0A04FC94B}">
-                    <ma14:wrappingTextBoxFlag xmlns="" xmlns:m="http://schemas.openxmlformats.org/officeDocument/2006/math" xmlns:a14="http://schemas.microsoft.com/office/drawing/2010/main" xmlns:ma14="http://schemas.microsoft.com/office/mac/drawingml/2011/main" val="1"/>
+                    <ma14:wrappingTextBoxFlag xmlns:ma14="http://schemas.microsoft.com/office/mac/drawingml/2011/main" xmlns:a14="http://schemas.microsoft.com/office/drawing/2010/main" xmlns:m="http://schemas.openxmlformats.org/officeDocument/2006/math" xmlns="" val="1"/>
                   </a:ext>
                 </a:extLst>
               </p:spPr>
@@ -9280,7 +9280,7 @@
                   <a:effectLst/>
                   <a:extLst>
                     <a:ext uri="{C572A759-6A51-4108-AA02-DFA0A04FC94B}">
-                      <ma14:wrappingTextBoxFlag xmlns:ma14="http://schemas.microsoft.com/office/mac/drawingml/2011/main" xmlns:a14="http://schemas.microsoft.com/office/drawing/2010/main" xmlns:m="http://schemas.openxmlformats.org/officeDocument/2006/math" xmlns="" val="1"/>
+                      <ma14:wrappingTextBoxFlag xmlns="" xmlns:m="http://schemas.openxmlformats.org/officeDocument/2006/math" xmlns:a14="http://schemas.microsoft.com/office/drawing/2010/main" xmlns:ma14="http://schemas.microsoft.com/office/mac/drawingml/2011/main" val="1"/>
                     </a:ext>
                   </a:extLst>
                 </p:spPr>
@@ -9478,7 +9478,7 @@
               <a:effectLst/>
               <a:extLst>
                 <a:ext uri="{C572A759-6A51-4108-AA02-DFA0A04FC94B}">
-                  <ma14:wrappingTextBoxFlag xmlns="" xmlns:m="http://schemas.openxmlformats.org/officeDocument/2006/math" xmlns:a14="http://schemas.microsoft.com/office/drawing/2010/main" xmlns:ma14="http://schemas.microsoft.com/office/mac/drawingml/2011/main" val="1"/>
+                  <ma14:wrappingTextBoxFlag xmlns:ma14="http://schemas.microsoft.com/office/mac/drawingml/2011/main" xmlns:a14="http://schemas.microsoft.com/office/drawing/2010/main" xmlns:m="http://schemas.openxmlformats.org/officeDocument/2006/math" xmlns="" val="1"/>
                 </a:ext>
               </a:extLst>
             </p:spPr>
@@ -9630,7 +9630,7 @@
                 <a:effectLst/>
                 <a:extLst>
                   <a:ext uri="{C572A759-6A51-4108-AA02-DFA0A04FC94B}">
-                    <ma14:wrappingTextBoxFlag xmlns:ma14="http://schemas.microsoft.com/office/mac/drawingml/2011/main" xmlns:a14="http://schemas.microsoft.com/office/drawing/2010/main" xmlns:m="http://schemas.openxmlformats.org/officeDocument/2006/math" xmlns="" val="1"/>
+                    <ma14:wrappingTextBoxFlag xmlns="" xmlns:m="http://schemas.openxmlformats.org/officeDocument/2006/math" xmlns:a14="http://schemas.microsoft.com/office/drawing/2010/main" xmlns:ma14="http://schemas.microsoft.com/office/mac/drawingml/2011/main" val="1"/>
                   </a:ext>
                 </a:extLst>
               </p:spPr>
@@ -9931,7 +9931,7 @@
           </a:ln>
           <a:extLst>
             <a:ext uri="{C572A759-6A51-4108-AA02-DFA0A04FC94B}">
-              <ma14:wrappingTextBoxFlag xmlns:ma14="http://schemas.microsoft.com/office/mac/drawingml/2011/main" xmlns:a14="http://schemas.microsoft.com/office/drawing/2010/main" xmlns:m="http://schemas.openxmlformats.org/officeDocument/2006/math" xmlns="" val="1"/>
+              <ma14:wrappingTextBoxFlag xmlns="" xmlns:m="http://schemas.openxmlformats.org/officeDocument/2006/math" xmlns:a14="http://schemas.microsoft.com/office/drawing/2010/main" xmlns:ma14="http://schemas.microsoft.com/office/mac/drawingml/2011/main" val="1"/>
             </a:ext>
           </a:extLst>
         </p:spPr>
@@ -9987,7 +9987,7 @@
           </a:ln>
           <a:extLst>
             <a:ext uri="{C572A759-6A51-4108-AA02-DFA0A04FC94B}">
-              <ma14:wrappingTextBoxFlag xmlns:ma14="http://schemas.microsoft.com/office/mac/drawingml/2011/main" xmlns:a14="http://schemas.microsoft.com/office/drawing/2010/main" xmlns:m="http://schemas.openxmlformats.org/officeDocument/2006/math" xmlns="" val="1"/>
+              <ma14:wrappingTextBoxFlag xmlns="" xmlns:m="http://schemas.openxmlformats.org/officeDocument/2006/math" xmlns:a14="http://schemas.microsoft.com/office/drawing/2010/main" xmlns:ma14="http://schemas.microsoft.com/office/mac/drawingml/2011/main" val="1"/>
             </a:ext>
           </a:extLst>
         </p:spPr>
@@ -10089,7 +10089,7 @@
           </a:ln>
           <a:extLst>
             <a:ext uri="{C572A759-6A51-4108-AA02-DFA0A04FC94B}">
-              <ma14:wrappingTextBoxFlag xmlns:ma14="http://schemas.microsoft.com/office/mac/drawingml/2011/main" xmlns:a14="http://schemas.microsoft.com/office/drawing/2010/main" xmlns:m="http://schemas.openxmlformats.org/officeDocument/2006/math" xmlns="" val="1"/>
+              <ma14:wrappingTextBoxFlag xmlns="" xmlns:m="http://schemas.openxmlformats.org/officeDocument/2006/math" xmlns:a14="http://schemas.microsoft.com/office/drawing/2010/main" xmlns:ma14="http://schemas.microsoft.com/office/mac/drawingml/2011/main" val="1"/>
             </a:ext>
           </a:extLst>
         </p:spPr>
@@ -10139,7 +10139,7 @@
           </a:ln>
           <a:extLst>
             <a:ext uri="{C572A759-6A51-4108-AA02-DFA0A04FC94B}">
-              <ma14:wrappingTextBoxFlag xmlns:ma14="http://schemas.microsoft.com/office/mac/drawingml/2011/main" xmlns:a14="http://schemas.microsoft.com/office/drawing/2010/main" xmlns:m="http://schemas.openxmlformats.org/officeDocument/2006/math" xmlns="" val="1"/>
+              <ma14:wrappingTextBoxFlag xmlns="" xmlns:m="http://schemas.openxmlformats.org/officeDocument/2006/math" xmlns:a14="http://schemas.microsoft.com/office/drawing/2010/main" xmlns:ma14="http://schemas.microsoft.com/office/mac/drawingml/2011/main" val="1"/>
             </a:ext>
           </a:extLst>
         </p:spPr>
@@ -10214,7 +10214,7 @@
           </a:ln>
           <a:extLst>
             <a:ext uri="{C572A759-6A51-4108-AA02-DFA0A04FC94B}">
-              <ma14:wrappingTextBoxFlag xmlns:ma14="http://schemas.microsoft.com/office/mac/drawingml/2011/main" xmlns:a14="http://schemas.microsoft.com/office/drawing/2010/main" xmlns:m="http://schemas.openxmlformats.org/officeDocument/2006/math" xmlns="" val="1"/>
+              <ma14:wrappingTextBoxFlag xmlns="" xmlns:m="http://schemas.openxmlformats.org/officeDocument/2006/math" xmlns:a14="http://schemas.microsoft.com/office/drawing/2010/main" xmlns:ma14="http://schemas.microsoft.com/office/mac/drawingml/2011/main" val="1"/>
             </a:ext>
           </a:extLst>
         </p:spPr>
@@ -10301,7 +10301,7 @@
           </a:ln>
           <a:extLst>
             <a:ext uri="{C572A759-6A51-4108-AA02-DFA0A04FC94B}">
-              <ma14:wrappingTextBoxFlag xmlns:ma14="http://schemas.microsoft.com/office/mac/drawingml/2011/main" xmlns:a14="http://schemas.microsoft.com/office/drawing/2010/main" xmlns:m="http://schemas.openxmlformats.org/officeDocument/2006/math" xmlns="" val="1"/>
+              <ma14:wrappingTextBoxFlag xmlns="" xmlns:m="http://schemas.openxmlformats.org/officeDocument/2006/math" xmlns:a14="http://schemas.microsoft.com/office/drawing/2010/main" xmlns:ma14="http://schemas.microsoft.com/office/mac/drawingml/2011/main" val="1"/>
             </a:ext>
           </a:extLst>
         </p:spPr>
@@ -10361,7 +10361,7 @@
           </a:ln>
           <a:extLst>
             <a:ext uri="{C572A759-6A51-4108-AA02-DFA0A04FC94B}">
-              <ma14:wrappingTextBoxFlag xmlns:ma14="http://schemas.microsoft.com/office/mac/drawingml/2011/main" xmlns:a14="http://schemas.microsoft.com/office/drawing/2010/main" xmlns:m="http://schemas.openxmlformats.org/officeDocument/2006/math" xmlns="" val="1"/>
+              <ma14:wrappingTextBoxFlag xmlns="" xmlns:m="http://schemas.openxmlformats.org/officeDocument/2006/math" xmlns:a14="http://schemas.microsoft.com/office/drawing/2010/main" xmlns:ma14="http://schemas.microsoft.com/office/mac/drawingml/2011/main" val="1"/>
             </a:ext>
           </a:extLst>
         </p:spPr>
@@ -10414,7 +10414,7 @@
           </a:ln>
           <a:extLst>
             <a:ext uri="{C572A759-6A51-4108-AA02-DFA0A04FC94B}">
-              <ma14:wrappingTextBoxFlag xmlns:ma14="http://schemas.microsoft.com/office/mac/drawingml/2011/main" xmlns:a14="http://schemas.microsoft.com/office/drawing/2010/main" xmlns:m="http://schemas.openxmlformats.org/officeDocument/2006/math" xmlns="" val="1"/>
+              <ma14:wrappingTextBoxFlag xmlns="" xmlns:m="http://schemas.openxmlformats.org/officeDocument/2006/math" xmlns:a14="http://schemas.microsoft.com/office/drawing/2010/main" xmlns:ma14="http://schemas.microsoft.com/office/mac/drawingml/2011/main" val="1"/>
             </a:ext>
           </a:extLst>
         </p:spPr>
@@ -10464,7 +10464,7 @@
           </a:ln>
           <a:extLst>
             <a:ext uri="{C572A759-6A51-4108-AA02-DFA0A04FC94B}">
-              <ma14:wrappingTextBoxFlag xmlns:ma14="http://schemas.microsoft.com/office/mac/drawingml/2011/main" xmlns:a14="http://schemas.microsoft.com/office/drawing/2010/main" xmlns:m="http://schemas.openxmlformats.org/officeDocument/2006/math" xmlns="" val="1"/>
+              <ma14:wrappingTextBoxFlag xmlns="" xmlns:m="http://schemas.openxmlformats.org/officeDocument/2006/math" xmlns:a14="http://schemas.microsoft.com/office/drawing/2010/main" xmlns:ma14="http://schemas.microsoft.com/office/mac/drawingml/2011/main" val="1"/>
             </a:ext>
           </a:extLst>
         </p:spPr>
@@ -10514,7 +10514,7 @@
           </a:ln>
           <a:extLst>
             <a:ext uri="{C572A759-6A51-4108-AA02-DFA0A04FC94B}">
-              <ma14:wrappingTextBoxFlag xmlns:ma14="http://schemas.microsoft.com/office/mac/drawingml/2011/main" xmlns:a14="http://schemas.microsoft.com/office/drawing/2010/main" xmlns:m="http://schemas.openxmlformats.org/officeDocument/2006/math" xmlns="" val="1"/>
+              <ma14:wrappingTextBoxFlag xmlns="" xmlns:m="http://schemas.openxmlformats.org/officeDocument/2006/math" xmlns:a14="http://schemas.microsoft.com/office/drawing/2010/main" xmlns:ma14="http://schemas.microsoft.com/office/mac/drawingml/2011/main" val="1"/>
             </a:ext>
           </a:extLst>
         </p:spPr>
@@ -10693,7 +10693,7 @@
             <a:effectLst/>
             <a:extLst>
               <a:ext uri="{C572A759-6A51-4108-AA02-DFA0A04FC94B}">
-                <ma14:wrappingTextBoxFlag xmlns:ma14="http://schemas.microsoft.com/office/mac/drawingml/2011/main" xmlns:a14="http://schemas.microsoft.com/office/drawing/2010/main" xmlns:m="http://schemas.openxmlformats.org/officeDocument/2006/math" xmlns="" val="1"/>
+                <ma14:wrappingTextBoxFlag xmlns="" xmlns:m="http://schemas.openxmlformats.org/officeDocument/2006/math" xmlns:a14="http://schemas.microsoft.com/office/drawing/2010/main" xmlns:ma14="http://schemas.microsoft.com/office/mac/drawingml/2011/main" val="1"/>
               </a:ext>
             </a:extLst>
           </p:spPr>
@@ -10745,7 +10745,7 @@
             <a:effectLst/>
             <a:extLst>
               <a:ext uri="{C572A759-6A51-4108-AA02-DFA0A04FC94B}">
-                <ma14:wrappingTextBoxFlag xmlns:ma14="http://schemas.microsoft.com/office/mac/drawingml/2011/main" xmlns:a14="http://schemas.microsoft.com/office/drawing/2010/main" xmlns:m="http://schemas.openxmlformats.org/officeDocument/2006/math" xmlns="" val="1"/>
+                <ma14:wrappingTextBoxFlag xmlns="" xmlns:m="http://schemas.openxmlformats.org/officeDocument/2006/math" xmlns:a14="http://schemas.microsoft.com/office/drawing/2010/main" xmlns:ma14="http://schemas.microsoft.com/office/mac/drawingml/2011/main" val="1"/>
               </a:ext>
             </a:extLst>
           </p:spPr>
@@ -10848,7 +10848,7 @@
             <a:effectLst/>
             <a:extLst>
               <a:ext uri="{C572A759-6A51-4108-AA02-DFA0A04FC94B}">
-                <ma14:wrappingTextBoxFlag xmlns:ma14="http://schemas.microsoft.com/office/mac/drawingml/2011/main" xmlns:a14="http://schemas.microsoft.com/office/drawing/2010/main" xmlns:m="http://schemas.openxmlformats.org/officeDocument/2006/math" xmlns="" val="1"/>
+                <ma14:wrappingTextBoxFlag xmlns="" xmlns:m="http://schemas.openxmlformats.org/officeDocument/2006/math" xmlns:a14="http://schemas.microsoft.com/office/drawing/2010/main" xmlns:ma14="http://schemas.microsoft.com/office/mac/drawingml/2011/main" val="1"/>
               </a:ext>
             </a:extLst>
           </p:spPr>
@@ -10898,7 +10898,7 @@
             <a:effectLst/>
             <a:extLst>
               <a:ext uri="{C572A759-6A51-4108-AA02-DFA0A04FC94B}">
-                <ma14:wrappingTextBoxFlag xmlns:ma14="http://schemas.microsoft.com/office/mac/drawingml/2011/main" xmlns:a14="http://schemas.microsoft.com/office/drawing/2010/main" xmlns:m="http://schemas.openxmlformats.org/officeDocument/2006/math" xmlns="" val="1"/>
+                <ma14:wrappingTextBoxFlag xmlns="" xmlns:m="http://schemas.openxmlformats.org/officeDocument/2006/math" xmlns:a14="http://schemas.microsoft.com/office/drawing/2010/main" xmlns:ma14="http://schemas.microsoft.com/office/mac/drawingml/2011/main" val="1"/>
               </a:ext>
             </a:extLst>
           </p:spPr>
@@ -11001,7 +11001,7 @@
             <a:effectLst/>
             <a:extLst>
               <a:ext uri="{C572A759-6A51-4108-AA02-DFA0A04FC94B}">
-                <ma14:wrappingTextBoxFlag xmlns:ma14="http://schemas.microsoft.com/office/mac/drawingml/2011/main" xmlns:a14="http://schemas.microsoft.com/office/drawing/2010/main" xmlns:m="http://schemas.openxmlformats.org/officeDocument/2006/math" xmlns="" val="1"/>
+                <ma14:wrappingTextBoxFlag xmlns="" xmlns:m="http://schemas.openxmlformats.org/officeDocument/2006/math" xmlns:a14="http://schemas.microsoft.com/office/drawing/2010/main" xmlns:ma14="http://schemas.microsoft.com/office/mac/drawingml/2011/main" val="1"/>
               </a:ext>
             </a:extLst>
           </p:spPr>
@@ -11050,7 +11050,7 @@
             <a:effectLst/>
             <a:extLst>
               <a:ext uri="{C572A759-6A51-4108-AA02-DFA0A04FC94B}">
-                <ma14:wrappingTextBoxFlag xmlns:ma14="http://schemas.microsoft.com/office/mac/drawingml/2011/main" xmlns:a14="http://schemas.microsoft.com/office/drawing/2010/main" xmlns:m="http://schemas.openxmlformats.org/officeDocument/2006/math" xmlns="" val="1"/>
+                <ma14:wrappingTextBoxFlag xmlns="" xmlns:m="http://schemas.openxmlformats.org/officeDocument/2006/math" xmlns:a14="http://schemas.microsoft.com/office/drawing/2010/main" xmlns:ma14="http://schemas.microsoft.com/office/mac/drawingml/2011/main" val="1"/>
               </a:ext>
             </a:extLst>
           </p:spPr>
@@ -11178,7 +11178,7 @@
             <a:effectLst/>
             <a:extLst>
               <a:ext uri="{C572A759-6A51-4108-AA02-DFA0A04FC94B}">
-                <ma14:wrappingTextBoxFlag xmlns:ma14="http://schemas.microsoft.com/office/mac/drawingml/2011/main" xmlns:a14="http://schemas.microsoft.com/office/drawing/2010/main" xmlns:m="http://schemas.openxmlformats.org/officeDocument/2006/math" xmlns="" val="1"/>
+                <ma14:wrappingTextBoxFlag xmlns="" xmlns:m="http://schemas.openxmlformats.org/officeDocument/2006/math" xmlns:a14="http://schemas.microsoft.com/office/drawing/2010/main" xmlns:ma14="http://schemas.microsoft.com/office/mac/drawingml/2011/main" val="1"/>
               </a:ext>
             </a:extLst>
           </p:spPr>
@@ -11228,7 +11228,7 @@
             <a:effectLst/>
             <a:extLst>
               <a:ext uri="{C572A759-6A51-4108-AA02-DFA0A04FC94B}">
-                <ma14:wrappingTextBoxFlag xmlns:ma14="http://schemas.microsoft.com/office/mac/drawingml/2011/main" xmlns:a14="http://schemas.microsoft.com/office/drawing/2010/main" xmlns:m="http://schemas.openxmlformats.org/officeDocument/2006/math" xmlns="" val="1"/>
+                <ma14:wrappingTextBoxFlag xmlns="" xmlns:m="http://schemas.openxmlformats.org/officeDocument/2006/math" xmlns:a14="http://schemas.microsoft.com/office/drawing/2010/main" xmlns:ma14="http://schemas.microsoft.com/office/mac/drawingml/2011/main" val="1"/>
               </a:ext>
             </a:extLst>
           </p:spPr>
@@ -11331,7 +11331,7 @@
             <a:effectLst/>
             <a:extLst>
               <a:ext uri="{C572A759-6A51-4108-AA02-DFA0A04FC94B}">
-                <ma14:wrappingTextBoxFlag xmlns:ma14="http://schemas.microsoft.com/office/mac/drawingml/2011/main" xmlns:a14="http://schemas.microsoft.com/office/drawing/2010/main" xmlns:m="http://schemas.openxmlformats.org/officeDocument/2006/math" xmlns="" val="1"/>
+                <ma14:wrappingTextBoxFlag xmlns="" xmlns:m="http://schemas.openxmlformats.org/officeDocument/2006/math" xmlns:a14="http://schemas.microsoft.com/office/drawing/2010/main" xmlns:ma14="http://schemas.microsoft.com/office/mac/drawingml/2011/main" val="1"/>
               </a:ext>
             </a:extLst>
           </p:spPr>
@@ -11381,7 +11381,7 @@
             <a:effectLst/>
             <a:extLst>
               <a:ext uri="{C572A759-6A51-4108-AA02-DFA0A04FC94B}">
-                <ma14:wrappingTextBoxFlag xmlns:ma14="http://schemas.microsoft.com/office/mac/drawingml/2011/main" xmlns:a14="http://schemas.microsoft.com/office/drawing/2010/main" xmlns:m="http://schemas.openxmlformats.org/officeDocument/2006/math" xmlns="" val="1"/>
+                <ma14:wrappingTextBoxFlag xmlns="" xmlns:m="http://schemas.openxmlformats.org/officeDocument/2006/math" xmlns:a14="http://schemas.microsoft.com/office/drawing/2010/main" xmlns:ma14="http://schemas.microsoft.com/office/mac/drawingml/2011/main" val="1"/>
               </a:ext>
             </a:extLst>
           </p:spPr>
@@ -11485,7 +11485,7 @@
             <a:effectLst/>
             <a:extLst>
               <a:ext uri="{C572A759-6A51-4108-AA02-DFA0A04FC94B}">
-                <ma14:wrappingTextBoxFlag xmlns:ma14="http://schemas.microsoft.com/office/mac/drawingml/2011/main" xmlns:a14="http://schemas.microsoft.com/office/drawing/2010/main" xmlns:m="http://schemas.openxmlformats.org/officeDocument/2006/math" xmlns="" val="1"/>
+                <ma14:wrappingTextBoxFlag xmlns="" xmlns:m="http://schemas.openxmlformats.org/officeDocument/2006/math" xmlns:a14="http://schemas.microsoft.com/office/drawing/2010/main" xmlns:ma14="http://schemas.microsoft.com/office/mac/drawingml/2011/main" val="1"/>
               </a:ext>
             </a:extLst>
           </p:spPr>
@@ -11535,7 +11535,7 @@
             <a:effectLst/>
             <a:extLst>
               <a:ext uri="{C572A759-6A51-4108-AA02-DFA0A04FC94B}">
-                <ma14:wrappingTextBoxFlag xmlns:ma14="http://schemas.microsoft.com/office/mac/drawingml/2011/main" xmlns:a14="http://schemas.microsoft.com/office/drawing/2010/main" xmlns:m="http://schemas.openxmlformats.org/officeDocument/2006/math" xmlns="" val="1"/>
+                <ma14:wrappingTextBoxFlag xmlns="" xmlns:m="http://schemas.openxmlformats.org/officeDocument/2006/math" xmlns:a14="http://schemas.microsoft.com/office/drawing/2010/main" xmlns:ma14="http://schemas.microsoft.com/office/mac/drawingml/2011/main" val="1"/>
               </a:ext>
             </a:extLst>
           </p:spPr>
@@ -11638,7 +11638,7 @@
             <a:effectLst/>
             <a:extLst>
               <a:ext uri="{C572A759-6A51-4108-AA02-DFA0A04FC94B}">
-                <ma14:wrappingTextBoxFlag xmlns:ma14="http://schemas.microsoft.com/office/mac/drawingml/2011/main" xmlns:a14="http://schemas.microsoft.com/office/drawing/2010/main" xmlns:m="http://schemas.openxmlformats.org/officeDocument/2006/math" xmlns="" val="1"/>
+                <ma14:wrappingTextBoxFlag xmlns="" xmlns:m="http://schemas.openxmlformats.org/officeDocument/2006/math" xmlns:a14="http://schemas.microsoft.com/office/drawing/2010/main" xmlns:ma14="http://schemas.microsoft.com/office/mac/drawingml/2011/main" val="1"/>
               </a:ext>
             </a:extLst>
           </p:spPr>
@@ -11688,7 +11688,7 @@
             <a:effectLst/>
             <a:extLst>
               <a:ext uri="{C572A759-6A51-4108-AA02-DFA0A04FC94B}">
-                <ma14:wrappingTextBoxFlag xmlns:ma14="http://schemas.microsoft.com/office/mac/drawingml/2011/main" xmlns:a14="http://schemas.microsoft.com/office/drawing/2010/main" xmlns:m="http://schemas.openxmlformats.org/officeDocument/2006/math" xmlns="" val="1"/>
+                <ma14:wrappingTextBoxFlag xmlns="" xmlns:m="http://schemas.openxmlformats.org/officeDocument/2006/math" xmlns:a14="http://schemas.microsoft.com/office/drawing/2010/main" xmlns:ma14="http://schemas.microsoft.com/office/mac/drawingml/2011/main" val="1"/>
               </a:ext>
             </a:extLst>
           </p:spPr>
@@ -11791,7 +11791,7 @@
             <a:effectLst/>
             <a:extLst>
               <a:ext uri="{C572A759-6A51-4108-AA02-DFA0A04FC94B}">
-                <ma14:wrappingTextBoxFlag xmlns:ma14="http://schemas.microsoft.com/office/mac/drawingml/2011/main" xmlns:a14="http://schemas.microsoft.com/office/drawing/2010/main" xmlns:m="http://schemas.openxmlformats.org/officeDocument/2006/math" xmlns="" val="1"/>
+                <ma14:wrappingTextBoxFlag xmlns="" xmlns:m="http://schemas.openxmlformats.org/officeDocument/2006/math" xmlns:a14="http://schemas.microsoft.com/office/drawing/2010/main" xmlns:ma14="http://schemas.microsoft.com/office/mac/drawingml/2011/main" val="1"/>
               </a:ext>
             </a:extLst>
           </p:spPr>
@@ -11841,7 +11841,7 @@
             <a:effectLst/>
             <a:extLst>
               <a:ext uri="{C572A759-6A51-4108-AA02-DFA0A04FC94B}">
-                <ma14:wrappingTextBoxFlag xmlns:ma14="http://schemas.microsoft.com/office/mac/drawingml/2011/main" xmlns:a14="http://schemas.microsoft.com/office/drawing/2010/main" xmlns:m="http://schemas.openxmlformats.org/officeDocument/2006/math" xmlns="" val="1"/>
+                <ma14:wrappingTextBoxFlag xmlns="" xmlns:m="http://schemas.openxmlformats.org/officeDocument/2006/math" xmlns:a14="http://schemas.microsoft.com/office/drawing/2010/main" xmlns:ma14="http://schemas.microsoft.com/office/mac/drawingml/2011/main" val="1"/>
               </a:ext>
             </a:extLst>
           </p:spPr>
@@ -11944,7 +11944,7 @@
             <a:effectLst/>
             <a:extLst>
               <a:ext uri="{C572A759-6A51-4108-AA02-DFA0A04FC94B}">
-                <ma14:wrappingTextBoxFlag xmlns:ma14="http://schemas.microsoft.com/office/mac/drawingml/2011/main" xmlns:a14="http://schemas.microsoft.com/office/drawing/2010/main" xmlns:m="http://schemas.openxmlformats.org/officeDocument/2006/math" xmlns="" val="1"/>
+                <ma14:wrappingTextBoxFlag xmlns="" xmlns:m="http://schemas.openxmlformats.org/officeDocument/2006/math" xmlns:a14="http://schemas.microsoft.com/office/drawing/2010/main" xmlns:ma14="http://schemas.microsoft.com/office/mac/drawingml/2011/main" val="1"/>
               </a:ext>
             </a:extLst>
           </p:spPr>
@@ -11993,7 +11993,7 @@
             <a:effectLst/>
             <a:extLst>
               <a:ext uri="{C572A759-6A51-4108-AA02-DFA0A04FC94B}">
-                <ma14:wrappingTextBoxFlag xmlns:ma14="http://schemas.microsoft.com/office/mac/drawingml/2011/main" xmlns:a14="http://schemas.microsoft.com/office/drawing/2010/main" xmlns:m="http://schemas.openxmlformats.org/officeDocument/2006/math" xmlns="" val="1"/>
+                <ma14:wrappingTextBoxFlag xmlns="" xmlns:m="http://schemas.openxmlformats.org/officeDocument/2006/math" xmlns:a14="http://schemas.microsoft.com/office/drawing/2010/main" xmlns:ma14="http://schemas.microsoft.com/office/mac/drawingml/2011/main" val="1"/>
               </a:ext>
             </a:extLst>
           </p:spPr>
@@ -12133,7 +12133,7 @@
           </a:ln>
           <a:extLst>
             <a:ext uri="{C572A759-6A51-4108-AA02-DFA0A04FC94B}">
-              <ma14:wrappingTextBoxFlag xmlns:ma14="http://schemas.microsoft.com/office/mac/drawingml/2011/main" xmlns:a14="http://schemas.microsoft.com/office/drawing/2010/main" xmlns:m="http://schemas.openxmlformats.org/officeDocument/2006/math" xmlns="" val="1"/>
+              <ma14:wrappingTextBoxFlag xmlns="" xmlns:m="http://schemas.openxmlformats.org/officeDocument/2006/math" xmlns:a14="http://schemas.microsoft.com/office/drawing/2010/main" xmlns:ma14="http://schemas.microsoft.com/office/mac/drawingml/2011/main" val="1"/>
             </a:ext>
           </a:extLst>
         </p:spPr>
@@ -12338,7 +12338,7 @@
             <a:effectLst/>
             <a:extLst>
               <a:ext uri="{C572A759-6A51-4108-AA02-DFA0A04FC94B}">
-                <ma14:wrappingTextBoxFlag xmlns:ma14="http://schemas.microsoft.com/office/mac/drawingml/2011/main" xmlns:a14="http://schemas.microsoft.com/office/drawing/2010/main" xmlns:m="http://schemas.openxmlformats.org/officeDocument/2006/math" xmlns="" val="1"/>
+                <ma14:wrappingTextBoxFlag xmlns="" xmlns:m="http://schemas.openxmlformats.org/officeDocument/2006/math" xmlns:a14="http://schemas.microsoft.com/office/drawing/2010/main" xmlns:ma14="http://schemas.microsoft.com/office/mac/drawingml/2011/main" val="1"/>
               </a:ext>
             </a:extLst>
           </p:spPr>
@@ -12398,7 +12398,7 @@
             <a:effectLst/>
             <a:extLst>
               <a:ext uri="{C572A759-6A51-4108-AA02-DFA0A04FC94B}">
-                <ma14:wrappingTextBoxFlag xmlns:ma14="http://schemas.microsoft.com/office/mac/drawingml/2011/main" xmlns:a14="http://schemas.microsoft.com/office/drawing/2010/main" xmlns:m="http://schemas.openxmlformats.org/officeDocument/2006/math" xmlns="" val="1"/>
+                <ma14:wrappingTextBoxFlag xmlns="" xmlns:m="http://schemas.openxmlformats.org/officeDocument/2006/math" xmlns:a14="http://schemas.microsoft.com/office/drawing/2010/main" xmlns:ma14="http://schemas.microsoft.com/office/mac/drawingml/2011/main" val="1"/>
               </a:ext>
             </a:extLst>
           </p:spPr>
@@ -12642,7 +12642,7 @@
             </a:ln>
             <a:extLst>
               <a:ext uri="{C572A759-6A51-4108-AA02-DFA0A04FC94B}">
-                <ma14:wrappingTextBoxFlag xmlns:ma14="http://schemas.microsoft.com/office/mac/drawingml/2011/main" xmlns:a14="http://schemas.microsoft.com/office/drawing/2010/main" xmlns:m="http://schemas.openxmlformats.org/officeDocument/2006/math" xmlns="" val="1"/>
+                <ma14:wrappingTextBoxFlag xmlns="" xmlns:m="http://schemas.openxmlformats.org/officeDocument/2006/math" xmlns:a14="http://schemas.microsoft.com/office/drawing/2010/main" xmlns:ma14="http://schemas.microsoft.com/office/mac/drawingml/2011/main" val="1"/>
               </a:ext>
             </a:extLst>
           </p:spPr>
@@ -12895,7 +12895,7 @@
               </a:ln>
               <a:extLst>
                 <a:ext uri="{C572A759-6A51-4108-AA02-DFA0A04FC94B}">
-                  <ma14:wrappingTextBoxFlag xmlns:ma14="http://schemas.microsoft.com/office/mac/drawingml/2011/main" xmlns:a14="http://schemas.microsoft.com/office/drawing/2010/main" xmlns:m="http://schemas.openxmlformats.org/officeDocument/2006/math" xmlns="" val="1"/>
+                  <ma14:wrappingTextBoxFlag xmlns="" xmlns:m="http://schemas.openxmlformats.org/officeDocument/2006/math" xmlns:a14="http://schemas.microsoft.com/office/drawing/2010/main" xmlns:ma14="http://schemas.microsoft.com/office/mac/drawingml/2011/main" val="1"/>
                 </a:ext>
               </a:extLst>
             </p:spPr>
@@ -13020,7 +13020,7 @@
               </a:ln>
               <a:extLst>
                 <a:ext uri="{C572A759-6A51-4108-AA02-DFA0A04FC94B}">
-                  <ma14:wrappingTextBoxFlag xmlns:ma14="http://schemas.microsoft.com/office/mac/drawingml/2011/main" xmlns:a14="http://schemas.microsoft.com/office/drawing/2010/main" xmlns:m="http://schemas.openxmlformats.org/officeDocument/2006/math" xmlns="" val="1"/>
+                  <ma14:wrappingTextBoxFlag xmlns="" xmlns:m="http://schemas.openxmlformats.org/officeDocument/2006/math" xmlns:a14="http://schemas.microsoft.com/office/drawing/2010/main" xmlns:ma14="http://schemas.microsoft.com/office/mac/drawingml/2011/main" val="1"/>
                 </a:ext>
               </a:extLst>
             </p:spPr>
@@ -13197,7 +13197,7 @@
             </a:ln>
             <a:extLst>
               <a:ext uri="{C572A759-6A51-4108-AA02-DFA0A04FC94B}">
-                <ma14:wrappingTextBoxFlag xmlns:ma14="http://schemas.microsoft.com/office/mac/drawingml/2011/main" xmlns:a14="http://schemas.microsoft.com/office/drawing/2010/main" xmlns:m="http://schemas.openxmlformats.org/officeDocument/2006/math" xmlns="" val="1"/>
+                <ma14:wrappingTextBoxFlag xmlns="" xmlns:m="http://schemas.openxmlformats.org/officeDocument/2006/math" xmlns:a14="http://schemas.microsoft.com/office/drawing/2010/main" xmlns:ma14="http://schemas.microsoft.com/office/mac/drawingml/2011/main" val="1"/>
               </a:ext>
             </a:extLst>
           </p:spPr>
@@ -13449,7 +13449,7 @@
               </a:ln>
               <a:extLst>
                 <a:ext uri="{C572A759-6A51-4108-AA02-DFA0A04FC94B}">
-                  <ma14:wrappingTextBoxFlag xmlns:ma14="http://schemas.microsoft.com/office/mac/drawingml/2011/main" xmlns:a14="http://schemas.microsoft.com/office/drawing/2010/main" xmlns:m="http://schemas.openxmlformats.org/officeDocument/2006/math" xmlns="" val="1"/>
+                  <ma14:wrappingTextBoxFlag xmlns="" xmlns:m="http://schemas.openxmlformats.org/officeDocument/2006/math" xmlns:a14="http://schemas.microsoft.com/office/drawing/2010/main" xmlns:ma14="http://schemas.microsoft.com/office/mac/drawingml/2011/main" val="1"/>
                 </a:ext>
               </a:extLst>
             </p:spPr>
@@ -13575,7 +13575,7 @@
               </a:ln>
               <a:extLst>
                 <a:ext uri="{C572A759-6A51-4108-AA02-DFA0A04FC94B}">
-                  <ma14:wrappingTextBoxFlag xmlns:ma14="http://schemas.microsoft.com/office/mac/drawingml/2011/main" xmlns:a14="http://schemas.microsoft.com/office/drawing/2010/main" xmlns:m="http://schemas.openxmlformats.org/officeDocument/2006/math" xmlns="" val="1"/>
+                  <ma14:wrappingTextBoxFlag xmlns="" xmlns:m="http://schemas.openxmlformats.org/officeDocument/2006/math" xmlns:a14="http://schemas.microsoft.com/office/drawing/2010/main" xmlns:ma14="http://schemas.microsoft.com/office/mac/drawingml/2011/main" val="1"/>
                 </a:ext>
               </a:extLst>
             </p:spPr>
@@ -13661,7 +13661,7 @@
             <a:effectLst/>
             <a:extLst>
               <a:ext uri="{C572A759-6A51-4108-AA02-DFA0A04FC94B}">
-                <ma14:wrappingTextBoxFlag xmlns:ma14="http://schemas.microsoft.com/office/mac/drawingml/2011/main" xmlns:a14="http://schemas.microsoft.com/office/drawing/2010/main" xmlns:m="http://schemas.openxmlformats.org/officeDocument/2006/math" xmlns="" val="1"/>
+                <ma14:wrappingTextBoxFlag xmlns="" xmlns:m="http://schemas.openxmlformats.org/officeDocument/2006/math" xmlns:a14="http://schemas.microsoft.com/office/drawing/2010/main" xmlns:ma14="http://schemas.microsoft.com/office/mac/drawingml/2011/main" val="1"/>
               </a:ext>
             </a:extLst>
           </p:spPr>
@@ -13721,7 +13721,7 @@
             <a:effectLst/>
             <a:extLst>
               <a:ext uri="{C572A759-6A51-4108-AA02-DFA0A04FC94B}">
-                <ma14:wrappingTextBoxFlag xmlns:ma14="http://schemas.microsoft.com/office/mac/drawingml/2011/main" xmlns:a14="http://schemas.microsoft.com/office/drawing/2010/main" xmlns:m="http://schemas.openxmlformats.org/officeDocument/2006/math" xmlns="" val="1"/>
+                <ma14:wrappingTextBoxFlag xmlns="" xmlns:m="http://schemas.openxmlformats.org/officeDocument/2006/math" xmlns:a14="http://schemas.microsoft.com/office/drawing/2010/main" xmlns:ma14="http://schemas.microsoft.com/office/mac/drawingml/2011/main" val="1"/>
               </a:ext>
             </a:extLst>
           </p:spPr>
@@ -13845,7 +13845,7 @@
           </a:ln>
           <a:extLst>
             <a:ext uri="{C572A759-6A51-4108-AA02-DFA0A04FC94B}">
-              <ma14:wrappingTextBoxFlag xmlns:ma14="http://schemas.microsoft.com/office/mac/drawingml/2011/main" xmlns:a14="http://schemas.microsoft.com/office/drawing/2010/main" xmlns:m="http://schemas.openxmlformats.org/officeDocument/2006/math" xmlns="" val="1"/>
+              <ma14:wrappingTextBoxFlag xmlns="" xmlns:m="http://schemas.openxmlformats.org/officeDocument/2006/math" xmlns:a14="http://schemas.microsoft.com/office/drawing/2010/main" xmlns:ma14="http://schemas.microsoft.com/office/mac/drawingml/2011/main" val="1"/>
             </a:ext>
           </a:extLst>
         </p:spPr>
@@ -13964,7 +13964,7 @@
           </a:ln>
           <a:extLst>
             <a:ext uri="{C572A759-6A51-4108-AA02-DFA0A04FC94B}">
-              <ma14:wrappingTextBoxFlag xmlns:ma14="http://schemas.microsoft.com/office/mac/drawingml/2011/main" xmlns:a14="http://schemas.microsoft.com/office/drawing/2010/main" xmlns:m="http://schemas.openxmlformats.org/officeDocument/2006/math" xmlns="" val="1"/>
+              <ma14:wrappingTextBoxFlag xmlns="" xmlns:m="http://schemas.openxmlformats.org/officeDocument/2006/math" xmlns:a14="http://schemas.microsoft.com/office/drawing/2010/main" xmlns:ma14="http://schemas.microsoft.com/office/mac/drawingml/2011/main" val="1"/>
             </a:ext>
           </a:extLst>
         </p:spPr>
@@ -14640,7 +14640,7 @@
           </a:ln>
           <a:extLst>
             <a:ext uri="{C572A759-6A51-4108-AA02-DFA0A04FC94B}">
-              <ma14:wrappingTextBoxFlag xmlns:ma14="http://schemas.microsoft.com/office/mac/drawingml/2011/main" xmlns:a14="http://schemas.microsoft.com/office/drawing/2010/main" xmlns:m="http://schemas.openxmlformats.org/officeDocument/2006/math" xmlns="" val="1"/>
+              <ma14:wrappingTextBoxFlag xmlns="" xmlns:m="http://schemas.openxmlformats.org/officeDocument/2006/math" xmlns:a14="http://schemas.microsoft.com/office/drawing/2010/main" xmlns:ma14="http://schemas.microsoft.com/office/mac/drawingml/2011/main" val="1"/>
             </a:ext>
           </a:extLst>
         </p:spPr>
@@ -14739,7 +14739,7 @@
           </a:ln>
           <a:extLst>
             <a:ext uri="{C572A759-6A51-4108-AA02-DFA0A04FC94B}">
-              <ma14:wrappingTextBoxFlag xmlns:ma14="http://schemas.microsoft.com/office/mac/drawingml/2011/main" xmlns:a14="http://schemas.microsoft.com/office/drawing/2010/main" xmlns:m="http://schemas.openxmlformats.org/officeDocument/2006/math" xmlns="" val="1"/>
+              <ma14:wrappingTextBoxFlag xmlns="" xmlns:m="http://schemas.openxmlformats.org/officeDocument/2006/math" xmlns:a14="http://schemas.microsoft.com/office/drawing/2010/main" xmlns:ma14="http://schemas.microsoft.com/office/mac/drawingml/2011/main" val="1"/>
             </a:ext>
           </a:extLst>
         </p:spPr>
@@ -14858,7 +14858,7 @@
           </a:ln>
           <a:extLst>
             <a:ext uri="{C572A759-6A51-4108-AA02-DFA0A04FC94B}">
-              <ma14:wrappingTextBoxFlag xmlns:ma14="http://schemas.microsoft.com/office/mac/drawingml/2011/main" xmlns:a14="http://schemas.microsoft.com/office/drawing/2010/main" xmlns:m="http://schemas.openxmlformats.org/officeDocument/2006/math" xmlns="" val="1"/>
+              <ma14:wrappingTextBoxFlag xmlns="" xmlns:m="http://schemas.openxmlformats.org/officeDocument/2006/math" xmlns:a14="http://schemas.microsoft.com/office/drawing/2010/main" xmlns:ma14="http://schemas.microsoft.com/office/mac/drawingml/2011/main" val="1"/>
             </a:ext>
           </a:extLst>
         </p:spPr>
@@ -15155,7 +15155,7 @@
             <a:effectLst/>
             <a:extLst>
               <a:ext uri="{C572A759-6A51-4108-AA02-DFA0A04FC94B}">
-                <ma14:wrappingTextBoxFlag xmlns="" xmlns:m="http://schemas.openxmlformats.org/officeDocument/2006/math" xmlns:a14="http://schemas.microsoft.com/office/drawing/2010/main" xmlns:ma14="http://schemas.microsoft.com/office/mac/drawingml/2011/main" val="1"/>
+                <ma14:wrappingTextBoxFlag xmlns:ma14="http://schemas.microsoft.com/office/mac/drawingml/2011/main" xmlns:a14="http://schemas.microsoft.com/office/drawing/2010/main" xmlns:m="http://schemas.openxmlformats.org/officeDocument/2006/math" xmlns="" val="1"/>
               </a:ext>
             </a:extLst>
           </p:spPr>
@@ -15298,7 +15298,7 @@
             <a:effectLst/>
             <a:extLst>
               <a:ext uri="{C572A759-6A51-4108-AA02-DFA0A04FC94B}">
-                <ma14:wrappingTextBoxFlag xmlns="" xmlns:m="http://schemas.openxmlformats.org/officeDocument/2006/math" xmlns:a14="http://schemas.microsoft.com/office/drawing/2010/main" xmlns:ma14="http://schemas.microsoft.com/office/mac/drawingml/2011/main" val="1"/>
+                <ma14:wrappingTextBoxFlag xmlns:ma14="http://schemas.microsoft.com/office/mac/drawingml/2011/main" xmlns:a14="http://schemas.microsoft.com/office/drawing/2010/main" xmlns:m="http://schemas.openxmlformats.org/officeDocument/2006/math" xmlns="" val="1"/>
               </a:ext>
             </a:extLst>
           </p:spPr>
@@ -15426,7 +15426,7 @@
               <a:effectLst/>
               <a:extLst>
                 <a:ext uri="{C572A759-6A51-4108-AA02-DFA0A04FC94B}">
-                  <ma14:wrappingTextBoxFlag xmlns="" xmlns:m="http://schemas.openxmlformats.org/officeDocument/2006/math" xmlns:a14="http://schemas.microsoft.com/office/drawing/2010/main" xmlns:ma14="http://schemas.microsoft.com/office/mac/drawingml/2011/main" val="1"/>
+                  <ma14:wrappingTextBoxFlag xmlns:ma14="http://schemas.microsoft.com/office/mac/drawingml/2011/main" xmlns:a14="http://schemas.microsoft.com/office/drawing/2010/main" xmlns:m="http://schemas.openxmlformats.org/officeDocument/2006/math" xmlns="" val="1"/>
                 </a:ext>
               </a:extLst>
             </p:spPr>
@@ -15538,7 +15538,7 @@
               <a:effectLst/>
               <a:extLst>
                 <a:ext uri="{C572A759-6A51-4108-AA02-DFA0A04FC94B}">
-                  <ma14:wrappingTextBoxFlag xmlns="" xmlns:m="http://schemas.openxmlformats.org/officeDocument/2006/math" xmlns:a14="http://schemas.microsoft.com/office/drawing/2010/main" xmlns:ma14="http://schemas.microsoft.com/office/mac/drawingml/2011/main" val="1"/>
+                  <ma14:wrappingTextBoxFlag xmlns:ma14="http://schemas.microsoft.com/office/mac/drawingml/2011/main" xmlns:a14="http://schemas.microsoft.com/office/drawing/2010/main" xmlns:m="http://schemas.openxmlformats.org/officeDocument/2006/math" xmlns="" val="1"/>
                 </a:ext>
               </a:extLst>
             </p:spPr>
@@ -15590,7 +15590,7 @@
             <a:effectLst/>
             <a:extLst>
               <a:ext uri="{C572A759-6A51-4108-AA02-DFA0A04FC94B}">
-                <ma14:wrappingTextBoxFlag xmlns="" xmlns:m="http://schemas.openxmlformats.org/officeDocument/2006/math" xmlns:a14="http://schemas.microsoft.com/office/drawing/2010/main" xmlns:ma14="http://schemas.microsoft.com/office/mac/drawingml/2011/main" val="1"/>
+                <ma14:wrappingTextBoxFlag xmlns:ma14="http://schemas.microsoft.com/office/mac/drawingml/2011/main" xmlns:a14="http://schemas.microsoft.com/office/drawing/2010/main" xmlns:m="http://schemas.openxmlformats.org/officeDocument/2006/math" xmlns="" val="1"/>
               </a:ext>
             </a:extLst>
           </p:spPr>
@@ -15712,7 +15712,7 @@
             <a:effectLst/>
             <a:extLst>
               <a:ext uri="{C572A759-6A51-4108-AA02-DFA0A04FC94B}">
-                <ma14:wrappingTextBoxFlag xmlns="" xmlns:m="http://schemas.openxmlformats.org/officeDocument/2006/math" xmlns:a14="http://schemas.microsoft.com/office/drawing/2010/main" xmlns:ma14="http://schemas.microsoft.com/office/mac/drawingml/2011/main" val="1"/>
+                <ma14:wrappingTextBoxFlag xmlns:ma14="http://schemas.microsoft.com/office/mac/drawingml/2011/main" xmlns:a14="http://schemas.microsoft.com/office/drawing/2010/main" xmlns:m="http://schemas.openxmlformats.org/officeDocument/2006/math" xmlns="" val="1"/>
               </a:ext>
             </a:extLst>
           </p:spPr>
@@ -15788,7 +15788,7 @@
             <a:effectLst/>
             <a:extLst>
               <a:ext uri="{C572A759-6A51-4108-AA02-DFA0A04FC94B}">
-                <ma14:wrappingTextBoxFlag xmlns="" xmlns:m="http://schemas.openxmlformats.org/officeDocument/2006/math" xmlns:a14="http://schemas.microsoft.com/office/drawing/2010/main" xmlns:ma14="http://schemas.microsoft.com/office/mac/drawingml/2011/main" val="1"/>
+                <ma14:wrappingTextBoxFlag xmlns:ma14="http://schemas.microsoft.com/office/mac/drawingml/2011/main" xmlns:a14="http://schemas.microsoft.com/office/drawing/2010/main" xmlns:m="http://schemas.openxmlformats.org/officeDocument/2006/math" xmlns="" val="1"/>
               </a:ext>
             </a:extLst>
           </p:spPr>
@@ -15910,7 +15910,7 @@
             <a:effectLst/>
             <a:extLst>
               <a:ext uri="{C572A759-6A51-4108-AA02-DFA0A04FC94B}">
-                <ma14:wrappingTextBoxFlag xmlns="" xmlns:m="http://schemas.openxmlformats.org/officeDocument/2006/math" xmlns:a14="http://schemas.microsoft.com/office/drawing/2010/main" xmlns:ma14="http://schemas.microsoft.com/office/mac/drawingml/2011/main" val="1"/>
+                <ma14:wrappingTextBoxFlag xmlns:ma14="http://schemas.microsoft.com/office/mac/drawingml/2011/main" xmlns:a14="http://schemas.microsoft.com/office/drawing/2010/main" xmlns:m="http://schemas.openxmlformats.org/officeDocument/2006/math" xmlns="" val="1"/>
               </a:ext>
             </a:extLst>
           </p:spPr>
@@ -15966,7 +15966,7 @@
             <a:effectLst/>
             <a:extLst>
               <a:ext uri="{C572A759-6A51-4108-AA02-DFA0A04FC94B}">
-                <ma14:wrappingTextBoxFlag xmlns="" xmlns:m="http://schemas.openxmlformats.org/officeDocument/2006/math" xmlns:a14="http://schemas.microsoft.com/office/drawing/2010/main" xmlns:ma14="http://schemas.microsoft.com/office/mac/drawingml/2011/main" val="1"/>
+                <ma14:wrappingTextBoxFlag xmlns:ma14="http://schemas.microsoft.com/office/mac/drawingml/2011/main" xmlns:a14="http://schemas.microsoft.com/office/drawing/2010/main" xmlns:m="http://schemas.openxmlformats.org/officeDocument/2006/math" xmlns="" val="1"/>
               </a:ext>
             </a:extLst>
           </p:spPr>
@@ -16088,7 +16088,7 @@
             <a:effectLst/>
             <a:extLst>
               <a:ext uri="{C572A759-6A51-4108-AA02-DFA0A04FC94B}">
-                <ma14:wrappingTextBoxFlag xmlns="" xmlns:m="http://schemas.openxmlformats.org/officeDocument/2006/math" xmlns:a14="http://schemas.microsoft.com/office/drawing/2010/main" xmlns:ma14="http://schemas.microsoft.com/office/mac/drawingml/2011/main" val="1"/>
+                <ma14:wrappingTextBoxFlag xmlns:ma14="http://schemas.microsoft.com/office/mac/drawingml/2011/main" xmlns:a14="http://schemas.microsoft.com/office/drawing/2010/main" xmlns:m="http://schemas.openxmlformats.org/officeDocument/2006/math" xmlns="" val="1"/>
               </a:ext>
             </a:extLst>
           </p:spPr>
@@ -16139,7 +16139,7 @@
             <a:effectLst/>
             <a:extLst>
               <a:ext uri="{C572A759-6A51-4108-AA02-DFA0A04FC94B}">
-                <ma14:wrappingTextBoxFlag xmlns="" xmlns:m="http://schemas.openxmlformats.org/officeDocument/2006/math" xmlns:a14="http://schemas.microsoft.com/office/drawing/2010/main" xmlns:ma14="http://schemas.microsoft.com/office/mac/drawingml/2011/main" val="1"/>
+                <ma14:wrappingTextBoxFlag xmlns:ma14="http://schemas.microsoft.com/office/mac/drawingml/2011/main" xmlns:a14="http://schemas.microsoft.com/office/drawing/2010/main" xmlns:m="http://schemas.openxmlformats.org/officeDocument/2006/math" xmlns="" val="1"/>
               </a:ext>
             </a:extLst>
           </p:spPr>
@@ -16265,7 +16265,7 @@
             <a:effectLst/>
             <a:extLst>
               <a:ext uri="{C572A759-6A51-4108-AA02-DFA0A04FC94B}">
-                <ma14:wrappingTextBoxFlag xmlns="" xmlns:m="http://schemas.openxmlformats.org/officeDocument/2006/math" xmlns:a14="http://schemas.microsoft.com/office/drawing/2010/main" xmlns:ma14="http://schemas.microsoft.com/office/mac/drawingml/2011/main" val="1"/>
+                <ma14:wrappingTextBoxFlag xmlns:ma14="http://schemas.microsoft.com/office/mac/drawingml/2011/main" xmlns:a14="http://schemas.microsoft.com/office/drawing/2010/main" xmlns:m="http://schemas.openxmlformats.org/officeDocument/2006/math" xmlns="" val="1"/>
               </a:ext>
             </a:extLst>
           </p:spPr>
@@ -16321,7 +16321,7 @@
             <a:effectLst/>
             <a:extLst>
               <a:ext uri="{C572A759-6A51-4108-AA02-DFA0A04FC94B}">
-                <ma14:wrappingTextBoxFlag xmlns="" xmlns:m="http://schemas.openxmlformats.org/officeDocument/2006/math" xmlns:a14="http://schemas.microsoft.com/office/drawing/2010/main" xmlns:ma14="http://schemas.microsoft.com/office/mac/drawingml/2011/main" val="1"/>
+                <ma14:wrappingTextBoxFlag xmlns:ma14="http://schemas.microsoft.com/office/mac/drawingml/2011/main" xmlns:a14="http://schemas.microsoft.com/office/drawing/2010/main" xmlns:m="http://schemas.openxmlformats.org/officeDocument/2006/math" xmlns="" val="1"/>
               </a:ext>
             </a:extLst>
           </p:spPr>
@@ -16443,7 +16443,7 @@
             <a:effectLst/>
             <a:extLst>
               <a:ext uri="{C572A759-6A51-4108-AA02-DFA0A04FC94B}">
-                <ma14:wrappingTextBoxFlag xmlns="" xmlns:m="http://schemas.openxmlformats.org/officeDocument/2006/math" xmlns:a14="http://schemas.microsoft.com/office/drawing/2010/main" xmlns:ma14="http://schemas.microsoft.com/office/mac/drawingml/2011/main" val="1"/>
+                <ma14:wrappingTextBoxFlag xmlns:ma14="http://schemas.microsoft.com/office/mac/drawingml/2011/main" xmlns:a14="http://schemas.microsoft.com/office/drawing/2010/main" xmlns:m="http://schemas.openxmlformats.org/officeDocument/2006/math" xmlns="" val="1"/>
               </a:ext>
             </a:extLst>
           </p:spPr>
@@ -16566,7 +16566,7 @@
               <a:effectLst/>
               <a:extLst>
                 <a:ext uri="{C572A759-6A51-4108-AA02-DFA0A04FC94B}">
-                  <ma14:wrappingTextBoxFlag xmlns="" xmlns:m="http://schemas.openxmlformats.org/officeDocument/2006/math" xmlns:a14="http://schemas.microsoft.com/office/drawing/2010/main" xmlns:ma14="http://schemas.microsoft.com/office/mac/drawingml/2011/main" val="1"/>
+                  <ma14:wrappingTextBoxFlag xmlns:ma14="http://schemas.microsoft.com/office/mac/drawingml/2011/main" xmlns:a14="http://schemas.microsoft.com/office/drawing/2010/main" xmlns:m="http://schemas.openxmlformats.org/officeDocument/2006/math" xmlns="" val="1"/>
                 </a:ext>
               </a:extLst>
             </p:spPr>
@@ -16678,7 +16678,7 @@
               <a:effectLst/>
               <a:extLst>
                 <a:ext uri="{C572A759-6A51-4108-AA02-DFA0A04FC94B}">
-                  <ma14:wrappingTextBoxFlag xmlns="" xmlns:m="http://schemas.openxmlformats.org/officeDocument/2006/math" xmlns:a14="http://schemas.microsoft.com/office/drawing/2010/main" xmlns:ma14="http://schemas.microsoft.com/office/mac/drawingml/2011/main" val="1"/>
+                  <ma14:wrappingTextBoxFlag xmlns:ma14="http://schemas.microsoft.com/office/mac/drawingml/2011/main" xmlns:a14="http://schemas.microsoft.com/office/drawing/2010/main" xmlns:m="http://schemas.openxmlformats.org/officeDocument/2006/math" xmlns="" val="1"/>
                 </a:ext>
               </a:extLst>
             </p:spPr>
@@ -16729,7 +16729,7 @@
             <a:effectLst/>
             <a:extLst>
               <a:ext uri="{C572A759-6A51-4108-AA02-DFA0A04FC94B}">
-                <ma14:wrappingTextBoxFlag xmlns="" xmlns:m="http://schemas.openxmlformats.org/officeDocument/2006/math" xmlns:a14="http://schemas.microsoft.com/office/drawing/2010/main" xmlns:ma14="http://schemas.microsoft.com/office/mac/drawingml/2011/main" val="1"/>
+                <ma14:wrappingTextBoxFlag xmlns:ma14="http://schemas.microsoft.com/office/mac/drawingml/2011/main" xmlns:a14="http://schemas.microsoft.com/office/drawing/2010/main" xmlns:m="http://schemas.openxmlformats.org/officeDocument/2006/math" xmlns="" val="1"/>
               </a:ext>
             </a:extLst>
           </p:spPr>
@@ -16851,7 +16851,7 @@
             <a:effectLst/>
             <a:extLst>
               <a:ext uri="{C572A759-6A51-4108-AA02-DFA0A04FC94B}">
-                <ma14:wrappingTextBoxFlag xmlns="" xmlns:m="http://schemas.openxmlformats.org/officeDocument/2006/math" xmlns:a14="http://schemas.microsoft.com/office/drawing/2010/main" xmlns:ma14="http://schemas.microsoft.com/office/mac/drawingml/2011/main" val="1"/>
+                <ma14:wrappingTextBoxFlag xmlns:ma14="http://schemas.microsoft.com/office/mac/drawingml/2011/main" xmlns:a14="http://schemas.microsoft.com/office/drawing/2010/main" xmlns:m="http://schemas.openxmlformats.org/officeDocument/2006/math" xmlns="" val="1"/>
               </a:ext>
             </a:extLst>
           </p:spPr>
@@ -16962,7 +16962,7 @@
               <a:effectLst/>
               <a:extLst>
                 <a:ext uri="{C572A759-6A51-4108-AA02-DFA0A04FC94B}">
-                  <ma14:wrappingTextBoxFlag xmlns="" xmlns:m="http://schemas.openxmlformats.org/officeDocument/2006/math" xmlns:a14="http://schemas.microsoft.com/office/drawing/2010/main" xmlns:ma14="http://schemas.microsoft.com/office/mac/drawingml/2011/main" val="1"/>
+                  <ma14:wrappingTextBoxFlag xmlns:ma14="http://schemas.microsoft.com/office/mac/drawingml/2011/main" xmlns:a14="http://schemas.microsoft.com/office/drawing/2010/main" xmlns:m="http://schemas.openxmlformats.org/officeDocument/2006/math" xmlns="" val="1"/>
                 </a:ext>
               </a:extLst>
             </p:spPr>
@@ -17073,7 +17073,7 @@
               <a:effectLst/>
               <a:extLst>
                 <a:ext uri="{C572A759-6A51-4108-AA02-DFA0A04FC94B}">
-                  <ma14:wrappingTextBoxFlag xmlns="" xmlns:m="http://schemas.openxmlformats.org/officeDocument/2006/math" xmlns:a14="http://schemas.microsoft.com/office/drawing/2010/main" xmlns:ma14="http://schemas.microsoft.com/office/mac/drawingml/2011/main" val="1"/>
+                  <ma14:wrappingTextBoxFlag xmlns:ma14="http://schemas.microsoft.com/office/mac/drawingml/2011/main" xmlns:a14="http://schemas.microsoft.com/office/drawing/2010/main" xmlns:m="http://schemas.openxmlformats.org/officeDocument/2006/math" xmlns="" val="1"/>
                 </a:ext>
               </a:extLst>
             </p:spPr>
@@ -17124,7 +17124,7 @@
             <a:effectLst/>
             <a:extLst>
               <a:ext uri="{C572A759-6A51-4108-AA02-DFA0A04FC94B}">
-                <ma14:wrappingTextBoxFlag xmlns="" xmlns:m="http://schemas.openxmlformats.org/officeDocument/2006/math" xmlns:a14="http://schemas.microsoft.com/office/drawing/2010/main" xmlns:ma14="http://schemas.microsoft.com/office/mac/drawingml/2011/main" val="1"/>
+                <ma14:wrappingTextBoxFlag xmlns:ma14="http://schemas.microsoft.com/office/mac/drawingml/2011/main" xmlns:a14="http://schemas.microsoft.com/office/drawing/2010/main" xmlns:m="http://schemas.openxmlformats.org/officeDocument/2006/math" xmlns="" val="1"/>
               </a:ext>
             </a:extLst>
           </p:spPr>
@@ -17246,7 +17246,7 @@
             <a:effectLst/>
             <a:extLst>
               <a:ext uri="{C572A759-6A51-4108-AA02-DFA0A04FC94B}">
-                <ma14:wrappingTextBoxFlag xmlns="" xmlns:m="http://schemas.openxmlformats.org/officeDocument/2006/math" xmlns:a14="http://schemas.microsoft.com/office/drawing/2010/main" xmlns:ma14="http://schemas.microsoft.com/office/mac/drawingml/2011/main" val="1"/>
+                <ma14:wrappingTextBoxFlag xmlns:ma14="http://schemas.microsoft.com/office/mac/drawingml/2011/main" xmlns:a14="http://schemas.microsoft.com/office/drawing/2010/main" xmlns:m="http://schemas.openxmlformats.org/officeDocument/2006/math" xmlns="" val="1"/>
               </a:ext>
             </a:extLst>
           </p:spPr>
@@ -17370,7 +17370,7 @@
               <a:effectLst/>
               <a:extLst>
                 <a:ext uri="{C572A759-6A51-4108-AA02-DFA0A04FC94B}">
-                  <ma14:wrappingTextBoxFlag xmlns="" xmlns:m="http://schemas.openxmlformats.org/officeDocument/2006/math" xmlns:a14="http://schemas.microsoft.com/office/drawing/2010/main" xmlns:ma14="http://schemas.microsoft.com/office/mac/drawingml/2011/main" val="1"/>
+                  <ma14:wrappingTextBoxFlag xmlns:ma14="http://schemas.microsoft.com/office/mac/drawingml/2011/main" xmlns:a14="http://schemas.microsoft.com/office/drawing/2010/main" xmlns:m="http://schemas.openxmlformats.org/officeDocument/2006/math" xmlns="" val="1"/>
                 </a:ext>
               </a:extLst>
             </p:spPr>
@@ -17481,7 +17481,7 @@
               <a:effectLst/>
               <a:extLst>
                 <a:ext uri="{C572A759-6A51-4108-AA02-DFA0A04FC94B}">
-                  <ma14:wrappingTextBoxFlag xmlns="" xmlns:m="http://schemas.openxmlformats.org/officeDocument/2006/math" xmlns:a14="http://schemas.microsoft.com/office/drawing/2010/main" xmlns:ma14="http://schemas.microsoft.com/office/mac/drawingml/2011/main" val="1"/>
+                  <ma14:wrappingTextBoxFlag xmlns:ma14="http://schemas.microsoft.com/office/mac/drawingml/2011/main" xmlns:a14="http://schemas.microsoft.com/office/drawing/2010/main" xmlns:m="http://schemas.openxmlformats.org/officeDocument/2006/math" xmlns="" val="1"/>
                 </a:ext>
               </a:extLst>
             </p:spPr>
@@ -17533,7 +17533,7 @@
             <a:effectLst/>
             <a:extLst>
               <a:ext uri="{C572A759-6A51-4108-AA02-DFA0A04FC94B}">
-                <ma14:wrappingTextBoxFlag xmlns="" xmlns:m="http://schemas.openxmlformats.org/officeDocument/2006/math" xmlns:a14="http://schemas.microsoft.com/office/drawing/2010/main" xmlns:ma14="http://schemas.microsoft.com/office/mac/drawingml/2011/main" val="1"/>
+                <ma14:wrappingTextBoxFlag xmlns:ma14="http://schemas.microsoft.com/office/mac/drawingml/2011/main" xmlns:a14="http://schemas.microsoft.com/office/drawing/2010/main" xmlns:m="http://schemas.openxmlformats.org/officeDocument/2006/math" xmlns="" val="1"/>
               </a:ext>
             </a:extLst>
           </p:spPr>
@@ -17586,7 +17586,7 @@
           </a:ln>
           <a:extLst>
             <a:ext uri="{C572A759-6A51-4108-AA02-DFA0A04FC94B}">
-              <ma14:wrappingTextBoxFlag xmlns="" xmlns:m="http://schemas.openxmlformats.org/officeDocument/2006/math" xmlns:a14="http://schemas.microsoft.com/office/drawing/2010/main" xmlns:ma14="http://schemas.microsoft.com/office/mac/drawingml/2011/main" val="1"/>
+              <ma14:wrappingTextBoxFlag xmlns:ma14="http://schemas.microsoft.com/office/mac/drawingml/2011/main" xmlns:a14="http://schemas.microsoft.com/office/drawing/2010/main" xmlns:m="http://schemas.openxmlformats.org/officeDocument/2006/math" xmlns="" val="1"/>
             </a:ext>
           </a:extLst>
         </p:spPr>
@@ -17743,7 +17743,7 @@
           </a:ln>
           <a:extLst>
             <a:ext uri="{C572A759-6A51-4108-AA02-DFA0A04FC94B}">
-              <ma14:wrappingTextBoxFlag xmlns="" xmlns:m="http://schemas.openxmlformats.org/officeDocument/2006/math" xmlns:a14="http://schemas.microsoft.com/office/drawing/2010/main" xmlns:ma14="http://schemas.microsoft.com/office/mac/drawingml/2011/main" val="1"/>
+              <ma14:wrappingTextBoxFlag xmlns:ma14="http://schemas.microsoft.com/office/mac/drawingml/2011/main" xmlns:a14="http://schemas.microsoft.com/office/drawing/2010/main" xmlns:m="http://schemas.openxmlformats.org/officeDocument/2006/math" xmlns="" val="1"/>
             </a:ext>
           </a:extLst>
         </p:spPr>
@@ -17815,7 +17815,7 @@
           </a:ln>
           <a:extLst>
             <a:ext uri="{C572A759-6A51-4108-AA02-DFA0A04FC94B}">
-              <ma14:wrappingTextBoxFlag xmlns="" xmlns:m="http://schemas.openxmlformats.org/officeDocument/2006/math" xmlns:a14="http://schemas.microsoft.com/office/drawing/2010/main" xmlns:ma14="http://schemas.microsoft.com/office/mac/drawingml/2011/main" val="1"/>
+              <ma14:wrappingTextBoxFlag xmlns:ma14="http://schemas.microsoft.com/office/mac/drawingml/2011/main" xmlns:a14="http://schemas.microsoft.com/office/drawing/2010/main" xmlns:m="http://schemas.openxmlformats.org/officeDocument/2006/math" xmlns="" val="1"/>
             </a:ext>
           </a:extLst>
         </p:spPr>
@@ -17877,7 +17877,7 @@
         <p:spPr>
           <a:xfrm>
             <a:off x="1042429" y="3472739"/>
-            <a:ext cx="1936345" cy="711201"/>
+            <a:ext cx="1936345" cy="738664"/>
           </a:xfrm>
           <a:prstGeom prst="rect">
             <a:avLst/>
@@ -17887,7 +17887,7 @@
           </a:ln>
           <a:extLst>
             <a:ext uri="{C572A759-6A51-4108-AA02-DFA0A04FC94B}">
-              <ma14:wrappingTextBoxFlag xmlns="" xmlns:m="http://schemas.openxmlformats.org/officeDocument/2006/math" xmlns:a14="http://schemas.microsoft.com/office/drawing/2010/main" xmlns:ma14="http://schemas.microsoft.com/office/mac/drawingml/2011/main" val="1"/>
+              <ma14:wrappingTextBoxFlag xmlns:ma14="http://schemas.microsoft.com/office/mac/drawingml/2011/main" xmlns:a14="http://schemas.microsoft.com/office/drawing/2010/main" xmlns:m="http://schemas.openxmlformats.org/officeDocument/2006/math" xmlns="" val="1"/>
             </a:ext>
           </a:extLst>
         </p:spPr>
@@ -18011,7 +18011,7 @@
                   <a:srgbClr val="0000FF"/>
                 </a:solidFill>
               </a:uFill>
-              <a:hlinkClick r:id="rId5"/>
+              <a:hlinkClick r:id="rId6"/>
             </a:endParaRPr>
           </a:p>
         </p:txBody>
@@ -18072,7 +18072,7 @@
           </a:ln>
           <a:extLst>
             <a:ext uri="{C572A759-6A51-4108-AA02-DFA0A04FC94B}">
-              <ma14:wrappingTextBoxFlag xmlns="" xmlns:m="http://schemas.openxmlformats.org/officeDocument/2006/math" xmlns:a14="http://schemas.microsoft.com/office/drawing/2010/main" xmlns:ma14="http://schemas.microsoft.com/office/mac/drawingml/2011/main" val="1"/>
+              <ma14:wrappingTextBoxFlag xmlns:ma14="http://schemas.microsoft.com/office/mac/drawingml/2011/main" xmlns:a14="http://schemas.microsoft.com/office/drawing/2010/main" xmlns:m="http://schemas.openxmlformats.org/officeDocument/2006/math" xmlns="" val="1"/>
             </a:ext>
           </a:extLst>
         </p:spPr>
@@ -18119,13 +18119,13 @@
           <p:nvPr/>
         </p:nvPicPr>
         <p:blipFill>
-          <a:blip r:embed="rId6">
+          <a:blip r:embed="rId7">
             <a:extLst>
               <a:ext uri="{28A0092B-C50C-407E-A947-70E740481C1C}">
                 <a14:useLocalDpi xmlns:a14="http://schemas.microsoft.com/office/drawing/2010/main" val="0"/>
               </a:ext>
               <a:ext uri="{96DAC541-7B7A-43D3-8B79-37D633B846F1}">
-                <asvg:svgBlip xmlns:asvg="http://schemas.microsoft.com/office/drawing/2016/SVG/main" r:embed="rId7"/>
+                <asvg:svgBlip xmlns:asvg="http://schemas.microsoft.com/office/drawing/2016/SVG/main" r:embed="rId8"/>
               </a:ext>
             </a:extLst>
           </a:blip>
@@ -18162,7 +18162,7 @@
           </a:ln>
           <a:extLst>
             <a:ext uri="{C572A759-6A51-4108-AA02-DFA0A04FC94B}">
-              <ma14:wrappingTextBoxFlag xmlns="" xmlns:m="http://schemas.openxmlformats.org/officeDocument/2006/math" xmlns:a14="http://schemas.microsoft.com/office/drawing/2010/main" xmlns:ma14="http://schemas.microsoft.com/office/mac/drawingml/2011/main" val="1"/>
+              <ma14:wrappingTextBoxFlag xmlns:ma14="http://schemas.microsoft.com/office/mac/drawingml/2011/main" xmlns:a14="http://schemas.microsoft.com/office/drawing/2010/main" xmlns:m="http://schemas.openxmlformats.org/officeDocument/2006/math" xmlns="" val="1"/>
             </a:ext>
           </a:extLst>
         </p:spPr>
@@ -18211,7 +18211,7 @@
           </a:ln>
           <a:extLst>
             <a:ext uri="{C572A759-6A51-4108-AA02-DFA0A04FC94B}">
-              <ma14:wrappingTextBoxFlag xmlns="" xmlns:m="http://schemas.openxmlformats.org/officeDocument/2006/math" xmlns:a14="http://schemas.microsoft.com/office/drawing/2010/main" xmlns:ma14="http://schemas.microsoft.com/office/mac/drawingml/2011/main" val="1"/>
+              <ma14:wrappingTextBoxFlag xmlns:ma14="http://schemas.microsoft.com/office/mac/drawingml/2011/main" xmlns:a14="http://schemas.microsoft.com/office/drawing/2010/main" xmlns:m="http://schemas.openxmlformats.org/officeDocument/2006/math" xmlns="" val="1"/>
             </a:ext>
           </a:extLst>
         </p:spPr>
@@ -18262,7 +18262,7 @@
           </a:ln>
           <a:extLst>
             <a:ext uri="{C572A759-6A51-4108-AA02-DFA0A04FC94B}">
-              <ma14:wrappingTextBoxFlag xmlns="" xmlns:m="http://schemas.openxmlformats.org/officeDocument/2006/math" xmlns:a14="http://schemas.microsoft.com/office/drawing/2010/main" xmlns:ma14="http://schemas.microsoft.com/office/mac/drawingml/2011/main" val="1"/>
+              <ma14:wrappingTextBoxFlag xmlns:ma14="http://schemas.microsoft.com/office/mac/drawingml/2011/main" xmlns:a14="http://schemas.microsoft.com/office/drawing/2010/main" xmlns:m="http://schemas.openxmlformats.org/officeDocument/2006/math" xmlns="" val="1"/>
             </a:ext>
           </a:extLst>
         </p:spPr>
@@ -18319,7 +18319,7 @@
           </a:ln>
           <a:extLst>
             <a:ext uri="{C572A759-6A51-4108-AA02-DFA0A04FC94B}">
-              <ma14:wrappingTextBoxFlag xmlns="" xmlns:m="http://schemas.openxmlformats.org/officeDocument/2006/math" xmlns:a14="http://schemas.microsoft.com/office/drawing/2010/main" xmlns:ma14="http://schemas.microsoft.com/office/mac/drawingml/2011/main" val="1"/>
+              <ma14:wrappingTextBoxFlag xmlns:ma14="http://schemas.microsoft.com/office/mac/drawingml/2011/main" xmlns:a14="http://schemas.microsoft.com/office/drawing/2010/main" xmlns:m="http://schemas.openxmlformats.org/officeDocument/2006/math" xmlns="" val="1"/>
             </a:ext>
           </a:extLst>
         </p:spPr>
@@ -18393,13 +18393,13 @@
           <p:nvPr/>
         </p:nvPicPr>
         <p:blipFill>
-          <a:blip r:embed="rId8" cstate="print">
+          <a:blip r:embed="rId9" cstate="print">
             <a:extLst>
               <a:ext uri="{28A0092B-C50C-407E-A947-70E740481C1C}">
                 <a14:useLocalDpi xmlns:a14="http://schemas.microsoft.com/office/drawing/2010/main" val="0"/>
               </a:ext>
               <a:ext uri="{96DAC541-7B7A-43D3-8B79-37D633B846F1}">
-                <asvg:svgBlip xmlns:asvg="http://schemas.microsoft.com/office/drawing/2016/SVG/main" r:embed="rId9"/>
+                <asvg:svgBlip xmlns:asvg="http://schemas.microsoft.com/office/drawing/2016/SVG/main" r:embed="rId10"/>
               </a:ext>
             </a:extLst>
           </a:blip>
@@ -18432,13 +18432,13 @@
           <p:nvPr/>
         </p:nvPicPr>
         <p:blipFill>
-          <a:blip r:embed="rId10" cstate="print">
+          <a:blip r:embed="rId11" cstate="print">
             <a:extLst>
               <a:ext uri="{28A0092B-C50C-407E-A947-70E740481C1C}">
                 <a14:useLocalDpi xmlns:a14="http://schemas.microsoft.com/office/drawing/2010/main" val="0"/>
               </a:ext>
               <a:ext uri="{96DAC541-7B7A-43D3-8B79-37D633B846F1}">
-                <asvg:svgBlip xmlns:asvg="http://schemas.microsoft.com/office/drawing/2016/SVG/main" r:embed="rId11"/>
+                <asvg:svgBlip xmlns:asvg="http://schemas.microsoft.com/office/drawing/2016/SVG/main" r:embed="rId12"/>
               </a:ext>
             </a:extLst>
           </a:blip>
@@ -18562,7 +18562,7 @@
             <a:effectLst/>
             <a:extLst>
               <a:ext uri="{C572A759-6A51-4108-AA02-DFA0A04FC94B}">
-                <ma14:wrappingTextBoxFlag xmlns="" xmlns:m="http://schemas.openxmlformats.org/officeDocument/2006/math" xmlns:a14="http://schemas.microsoft.com/office/drawing/2010/main" xmlns:ma14="http://schemas.microsoft.com/office/mac/drawingml/2011/main" val="1"/>
+                <ma14:wrappingTextBoxFlag xmlns:ma14="http://schemas.microsoft.com/office/mac/drawingml/2011/main" xmlns:a14="http://schemas.microsoft.com/office/drawing/2010/main" xmlns:m="http://schemas.openxmlformats.org/officeDocument/2006/math" xmlns="" val="1"/>
               </a:ext>
             </a:extLst>
           </p:spPr>
@@ -18624,7 +18624,7 @@
             <a:effectLst/>
             <a:extLst>
               <a:ext uri="{C572A759-6A51-4108-AA02-DFA0A04FC94B}">
-                <ma14:wrappingTextBoxFlag xmlns="" xmlns:m="http://schemas.openxmlformats.org/officeDocument/2006/math" xmlns:a14="http://schemas.microsoft.com/office/drawing/2010/main" xmlns:ma14="http://schemas.microsoft.com/office/mac/drawingml/2011/main" val="1"/>
+                <ma14:wrappingTextBoxFlag xmlns:ma14="http://schemas.microsoft.com/office/mac/drawingml/2011/main" xmlns:a14="http://schemas.microsoft.com/office/drawing/2010/main" xmlns:m="http://schemas.openxmlformats.org/officeDocument/2006/math" xmlns="" val="1"/>
               </a:ext>
             </a:extLst>
           </p:spPr>
@@ -18686,7 +18686,7 @@
           <p:nvPr/>
         </p:nvPicPr>
         <p:blipFill>
-          <a:blip r:embed="rId12" cstate="print">
+          <a:blip r:embed="rId13" cstate="print">
             <a:extLst>
               <a:ext uri="{28A0092B-C50C-407E-A947-70E740481C1C}">
                 <a14:useLocalDpi xmlns:a14="http://schemas.microsoft.com/office/drawing/2010/main" val="0"/>
@@ -19161,7 +19161,7 @@
           <a:effectLst/>
           <a:extLst>
             <a:ext uri="{C572A759-6A51-4108-AA02-DFA0A04FC94B}">
-              <ma14:wrappingTextBoxFlag xmlns:ma14="http://schemas.microsoft.com/office/mac/drawingml/2011/main" xmlns:a14="http://schemas.microsoft.com/office/drawing/2010/main" xmlns:m="http://schemas.openxmlformats.org/officeDocument/2006/math" xmlns="" val="1"/>
+              <ma14:wrappingTextBoxFlag xmlns="" xmlns:m="http://schemas.openxmlformats.org/officeDocument/2006/math" xmlns:a14="http://schemas.microsoft.com/office/drawing/2010/main" xmlns:ma14="http://schemas.microsoft.com/office/mac/drawingml/2011/main" val="1"/>
             </a:ext>
           </a:extLst>
         </p:spPr>
@@ -19210,7 +19210,7 @@
           </a:ln>
           <a:extLst>
             <a:ext uri="{C572A759-6A51-4108-AA02-DFA0A04FC94B}">
-              <ma14:wrappingTextBoxFlag xmlns:ma14="http://schemas.microsoft.com/office/mac/drawingml/2011/main" xmlns:a14="http://schemas.microsoft.com/office/drawing/2010/main" xmlns:m="http://schemas.openxmlformats.org/officeDocument/2006/math" xmlns="" val="1"/>
+              <ma14:wrappingTextBoxFlag xmlns="" xmlns:m="http://schemas.openxmlformats.org/officeDocument/2006/math" xmlns:a14="http://schemas.microsoft.com/office/drawing/2010/main" xmlns:ma14="http://schemas.microsoft.com/office/mac/drawingml/2011/main" val="1"/>
             </a:ext>
           </a:extLst>
         </p:spPr>
@@ -19283,7 +19283,7 @@
           <a:effectLst/>
           <a:extLst>
             <a:ext uri="{C572A759-6A51-4108-AA02-DFA0A04FC94B}">
-              <ma14:wrappingTextBoxFlag xmlns:ma14="http://schemas.microsoft.com/office/mac/drawingml/2011/main" xmlns:a14="http://schemas.microsoft.com/office/drawing/2010/main" xmlns:m="http://schemas.openxmlformats.org/officeDocument/2006/math" xmlns="" val="1"/>
+              <ma14:wrappingTextBoxFlag xmlns="" xmlns:m="http://schemas.openxmlformats.org/officeDocument/2006/math" xmlns:a14="http://schemas.microsoft.com/office/drawing/2010/main" xmlns:ma14="http://schemas.microsoft.com/office/mac/drawingml/2011/main" val="1"/>
             </a:ext>
           </a:extLst>
         </p:spPr>
@@ -19617,7 +19617,7 @@
           </a:ln>
           <a:extLst>
             <a:ext uri="{C572A759-6A51-4108-AA02-DFA0A04FC94B}">
-              <ma14:wrappingTextBoxFlag xmlns:ma14="http://schemas.microsoft.com/office/mac/drawingml/2011/main" xmlns:a14="http://schemas.microsoft.com/office/drawing/2010/main" xmlns:m="http://schemas.openxmlformats.org/officeDocument/2006/math" xmlns="" val="1"/>
+              <ma14:wrappingTextBoxFlag xmlns="" xmlns:m="http://schemas.openxmlformats.org/officeDocument/2006/math" xmlns:a14="http://schemas.microsoft.com/office/drawing/2010/main" xmlns:ma14="http://schemas.microsoft.com/office/mac/drawingml/2011/main" val="1"/>
             </a:ext>
           </a:extLst>
         </p:spPr>
@@ -19914,7 +19914,7 @@
           </a:ln>
           <a:extLst>
             <a:ext uri="{C572A759-6A51-4108-AA02-DFA0A04FC94B}">
-              <ma14:wrappingTextBoxFlag xmlns:ma14="http://schemas.microsoft.com/office/mac/drawingml/2011/main" xmlns:a14="http://schemas.microsoft.com/office/drawing/2010/main" xmlns:m="http://schemas.openxmlformats.org/officeDocument/2006/math" xmlns="" val="1"/>
+              <ma14:wrappingTextBoxFlag xmlns="" xmlns:m="http://schemas.openxmlformats.org/officeDocument/2006/math" xmlns:a14="http://schemas.microsoft.com/office/drawing/2010/main" xmlns:ma14="http://schemas.microsoft.com/office/mac/drawingml/2011/main" val="1"/>
             </a:ext>
           </a:extLst>
         </p:spPr>
@@ -20448,7 +20448,7 @@
           </a:ln>
           <a:extLst>
             <a:ext uri="{C572A759-6A51-4108-AA02-DFA0A04FC94B}">
-              <ma14:wrappingTextBoxFlag xmlns:ma14="http://schemas.microsoft.com/office/mac/drawingml/2011/main" xmlns:a14="http://schemas.microsoft.com/office/drawing/2010/main" xmlns:m="http://schemas.openxmlformats.org/officeDocument/2006/math" xmlns="" val="1"/>
+              <ma14:wrappingTextBoxFlag xmlns="" xmlns:m="http://schemas.openxmlformats.org/officeDocument/2006/math" xmlns:a14="http://schemas.microsoft.com/office/drawing/2010/main" xmlns:ma14="http://schemas.microsoft.com/office/mac/drawingml/2011/main" val="1"/>
             </a:ext>
           </a:extLst>
         </p:spPr>

</xml_diff>